<commit_message>
added cross-talk and fidelity
</commit_message>
<xml_diff>
--- a/pySEAFOM_updates.pptx
+++ b/pySEAFOM_updates.pptx
@@ -124,7 +124,7 @@
 <file path=ppt/revisionInfo.xml><?xml version="1.0" encoding="utf-8"?>
 <p1510:revInfo xmlns:a="http://schemas.openxmlformats.org/drawingml/2006/main" xmlns:r="http://schemas.openxmlformats.org/officeDocument/2006/relationships" xmlns:p1510="http://schemas.microsoft.com/office/powerpoint/2015/10/main">
   <p1510:revLst>
-    <p1510:client id="{BB04EFC6-8268-4F75-9FC2-149BB3B3C991}" v="384" dt="2025-11-19T15:19:26.937"/>
+    <p1510:client id="{C2F2CB6F-16AD-4657-ABB9-2079F8BF5977}" v="77" dt="2026-01-09T20:04:37.126"/>
   </p1510:revLst>
 </p1510:revInfo>
 </file>
@@ -144,22 +144,6 @@
           <pc:docMk/>
           <pc:sldMk cId="997169851" sldId="257"/>
         </pc:sldMkLst>
-        <pc:picChg chg="add del mod">
-          <ac:chgData name="Moradi, Peyman" userId="dba91eb0-4a36-42e9-bb56-2c55a234965d" providerId="ADAL" clId="{BB04EFC6-8268-4F75-9FC2-149BB3B3C991}" dt="2025-11-19T13:54:49.297" v="570" actId="478"/>
-          <ac:picMkLst>
-            <pc:docMk/>
-            <pc:sldMk cId="997169851" sldId="257"/>
-            <ac:picMk id="2" creationId="{B824849D-0576-B0FC-64B0-C3702FF6DB7E}"/>
-          </ac:picMkLst>
-        </pc:picChg>
-        <pc:picChg chg="del">
-          <ac:chgData name="Moradi, Peyman" userId="dba91eb0-4a36-42e9-bb56-2c55a234965d" providerId="ADAL" clId="{BB04EFC6-8268-4F75-9FC2-149BB3B3C991}" dt="2025-11-19T13:54:18.619" v="563" actId="478"/>
-          <ac:picMkLst>
-            <pc:docMk/>
-            <pc:sldMk cId="997169851" sldId="257"/>
-            <ac:picMk id="1026" creationId="{9CF6A9A3-FD57-82D0-76A3-49C23B93197C}"/>
-          </ac:picMkLst>
-        </pc:picChg>
       </pc:sldChg>
       <pc:sldChg chg="delSp modSp mod">
         <pc:chgData name="Moradi, Peyman" userId="dba91eb0-4a36-42e9-bb56-2c55a234965d" providerId="ADAL" clId="{BB04EFC6-8268-4F75-9FC2-149BB3B3C991}" dt="2025-11-19T15:10:36.713" v="616" actId="21"/>
@@ -167,14 +151,6 @@
           <pc:docMk/>
           <pc:sldMk cId="3609631159" sldId="258"/>
         </pc:sldMkLst>
-        <pc:spChg chg="del">
-          <ac:chgData name="Moradi, Peyman" userId="dba91eb0-4a36-42e9-bb56-2c55a234965d" providerId="ADAL" clId="{BB04EFC6-8268-4F75-9FC2-149BB3B3C991}" dt="2025-11-19T15:10:36.713" v="616" actId="21"/>
-          <ac:spMkLst>
-            <pc:docMk/>
-            <pc:sldMk cId="3609631159" sldId="258"/>
-            <ac:spMk id="2" creationId="{218C56B6-D9EB-C32A-C584-FD1B26AE6B6A}"/>
-          </ac:spMkLst>
-        </pc:spChg>
         <pc:graphicFrameChg chg="modGraphic">
           <ac:chgData name="Moradi, Peyman" userId="dba91eb0-4a36-42e9-bb56-2c55a234965d" providerId="ADAL" clId="{BB04EFC6-8268-4F75-9FC2-149BB3B3C991}" dt="2025-11-19T12:38:59.452" v="369" actId="403"/>
           <ac:graphicFrameMkLst>
@@ -198,54 +174,6 @@
             <ac:spMk id="2" creationId="{22D6B876-51A5-CDD2-898A-E4BB297A725F}"/>
           </ac:spMkLst>
         </pc:spChg>
-        <pc:spChg chg="add del mod">
-          <ac:chgData name="Moradi, Peyman" userId="dba91eb0-4a36-42e9-bb56-2c55a234965d" providerId="ADAL" clId="{BB04EFC6-8268-4F75-9FC2-149BB3B3C991}" dt="2025-11-19T15:15:39.045" v="705" actId="12084"/>
-          <ac:spMkLst>
-            <pc:docMk/>
-            <pc:sldMk cId="348206209" sldId="259"/>
-            <ac:spMk id="3" creationId="{218C56B6-D9EB-C32A-C584-FD1B26AE6B6A}"/>
-          </ac:spMkLst>
-        </pc:spChg>
-        <pc:spChg chg="add del mod">
-          <ac:chgData name="Moradi, Peyman" userId="dba91eb0-4a36-42e9-bb56-2c55a234965d" providerId="ADAL" clId="{BB04EFC6-8268-4F75-9FC2-149BB3B3C991}" dt="2025-11-19T15:12:23.533" v="672" actId="478"/>
-          <ac:spMkLst>
-            <pc:docMk/>
-            <pc:sldMk cId="348206209" sldId="259"/>
-            <ac:spMk id="5" creationId="{B0D19B97-E0D4-AAB3-87DA-C518F31A89B7}"/>
-          </ac:spMkLst>
-        </pc:spChg>
-        <pc:spChg chg="add">
-          <ac:chgData name="Moradi, Peyman" userId="dba91eb0-4a36-42e9-bb56-2c55a234965d" providerId="ADAL" clId="{BB04EFC6-8268-4F75-9FC2-149BB3B3C991}" dt="2025-11-19T15:13:55.669" v="674"/>
-          <ac:spMkLst>
-            <pc:docMk/>
-            <pc:sldMk cId="348206209" sldId="259"/>
-            <ac:spMk id="6" creationId="{22EDDBEA-25DB-6A90-2140-08424289D9AB}"/>
-          </ac:spMkLst>
-        </pc:spChg>
-        <pc:spChg chg="add">
-          <ac:chgData name="Moradi, Peyman" userId="dba91eb0-4a36-42e9-bb56-2c55a234965d" providerId="ADAL" clId="{BB04EFC6-8268-4F75-9FC2-149BB3B3C991}" dt="2025-11-19T15:14:00.643" v="675"/>
-          <ac:spMkLst>
-            <pc:docMk/>
-            <pc:sldMk cId="348206209" sldId="259"/>
-            <ac:spMk id="7" creationId="{C8A6D4F2-3865-5EEA-85CF-2545873CE7F6}"/>
-          </ac:spMkLst>
-        </pc:spChg>
-        <pc:spChg chg="add">
-          <ac:chgData name="Moradi, Peyman" userId="dba91eb0-4a36-42e9-bb56-2c55a234965d" providerId="ADAL" clId="{BB04EFC6-8268-4F75-9FC2-149BB3B3C991}" dt="2025-11-19T15:15:19.522" v="700"/>
-          <ac:spMkLst>
-            <pc:docMk/>
-            <pc:sldMk cId="348206209" sldId="259"/>
-            <ac:spMk id="8" creationId="{2FA286AE-1DD1-0B0D-FE6A-D69D8E98BFF2}"/>
-          </ac:spMkLst>
-        </pc:spChg>
-        <pc:spChg chg="del">
-          <ac:chgData name="Moradi, Peyman" userId="dba91eb0-4a36-42e9-bb56-2c55a234965d" providerId="ADAL" clId="{BB04EFC6-8268-4F75-9FC2-149BB3B3C991}" dt="2025-11-19T13:28:10.030" v="409" actId="478"/>
-          <ac:spMkLst>
-            <pc:docMk/>
-            <pc:sldMk cId="348206209" sldId="259"/>
-            <ac:spMk id="16" creationId="{9889454A-F07F-C0EE-B64E-D2B82809BFB0}"/>
-          </ac:spMkLst>
-        </pc:spChg>
         <pc:graphicFrameChg chg="add mod modGraphic">
           <ac:chgData name="Moradi, Peyman" userId="dba91eb0-4a36-42e9-bb56-2c55a234965d" providerId="ADAL" clId="{BB04EFC6-8268-4F75-9FC2-149BB3B3C991}" dt="2025-11-19T15:18:28.962" v="780" actId="14100"/>
           <ac:graphicFrameMkLst>
@@ -262,22 +190,6 @@
             <ac:graphicFrameMk id="10" creationId="{04FFF0D5-86E4-BFB4-A048-E34CF6C0B9DB}"/>
           </ac:graphicFrameMkLst>
         </pc:graphicFrameChg>
-        <pc:picChg chg="del">
-          <ac:chgData name="Moradi, Peyman" userId="dba91eb0-4a36-42e9-bb56-2c55a234965d" providerId="ADAL" clId="{BB04EFC6-8268-4F75-9FC2-149BB3B3C991}" dt="2025-11-19T13:28:08.761" v="408" actId="478"/>
-          <ac:picMkLst>
-            <pc:docMk/>
-            <pc:sldMk cId="348206209" sldId="259"/>
-            <ac:picMk id="24" creationId="{5F67D1E5-CB05-C2C0-B51F-EB3ABD01D627}"/>
-          </ac:picMkLst>
-        </pc:picChg>
-        <pc:picChg chg="add">
-          <ac:chgData name="Moradi, Peyman" userId="dba91eb0-4a36-42e9-bb56-2c55a234965d" providerId="ADAL" clId="{BB04EFC6-8268-4F75-9FC2-149BB3B3C991}" dt="2025-11-19T15:14:07.529" v="676"/>
-          <ac:picMkLst>
-            <pc:docMk/>
-            <pc:sldMk cId="348206209" sldId="259"/>
-            <ac:picMk id="1030" creationId="{E5A6E971-FDAC-388C-DE33-CC3D1B6D4ECD}"/>
-          </ac:picMkLst>
-        </pc:picChg>
         <pc:picChg chg="add mod">
           <ac:chgData name="Moradi, Peyman" userId="dba91eb0-4a36-42e9-bb56-2c55a234965d" providerId="ADAL" clId="{BB04EFC6-8268-4F75-9FC2-149BB3B3C991}" dt="2025-11-19T15:19:20.401" v="800" actId="1076"/>
           <ac:picMkLst>
@@ -301,14 +213,6 @@
             <ac:spMk id="3" creationId="{DD77DABC-AAF1-EE8C-CBC3-473EB5ADCA85}"/>
           </ac:spMkLst>
         </pc:spChg>
-        <pc:picChg chg="add del mod">
-          <ac:chgData name="Moradi, Peyman" userId="dba91eb0-4a36-42e9-bb56-2c55a234965d" providerId="ADAL" clId="{BB04EFC6-8268-4F75-9FC2-149BB3B3C991}" dt="2025-11-19T13:54:47.604" v="569" actId="478"/>
-          <ac:picMkLst>
-            <pc:docMk/>
-            <pc:sldMk cId="3903256587" sldId="261"/>
-            <ac:picMk id="1026" creationId="{4E5ED9D5-32B3-3A42-05E0-1E4B9929E0A3}"/>
-          </ac:picMkLst>
-        </pc:picChg>
       </pc:sldChg>
       <pc:sldChg chg="addSp delSp modSp mod">
         <pc:chgData name="Moradi, Peyman" userId="dba91eb0-4a36-42e9-bb56-2c55a234965d" providerId="ADAL" clId="{BB04EFC6-8268-4F75-9FC2-149BB3B3C991}" dt="2025-11-19T15:50:15.941" v="803" actId="404"/>
@@ -348,14 +252,6 @@
             <ac:spMk id="7" creationId="{77D0BFEA-E1DE-DBB0-4626-7D50AAA747A3}"/>
           </ac:spMkLst>
         </pc:spChg>
-        <pc:spChg chg="add del mod">
-          <ac:chgData name="Moradi, Peyman" userId="dba91eb0-4a36-42e9-bb56-2c55a234965d" providerId="ADAL" clId="{BB04EFC6-8268-4F75-9FC2-149BB3B3C991}" dt="2025-11-19T12:34:47.343" v="316"/>
-          <ac:spMkLst>
-            <pc:docMk/>
-            <pc:sldMk cId="2701834378" sldId="263"/>
-            <ac:spMk id="8" creationId="{511E5C3F-3DFC-5F56-4A0F-C1CF58038917}"/>
-          </ac:spMkLst>
-        </pc:spChg>
         <pc:grpChg chg="add mod">
           <ac:chgData name="Moradi, Peyman" userId="dba91eb0-4a36-42e9-bb56-2c55a234965d" providerId="ADAL" clId="{BB04EFC6-8268-4F75-9FC2-149BB3B3C991}" dt="2025-11-19T12:36:29.948" v="364" actId="1035"/>
           <ac:grpSpMkLst>
@@ -379,36 +275,12 @@
           <pc:docMk/>
           <pc:sldMk cId="178843416" sldId="264"/>
         </pc:sldMkLst>
-        <pc:spChg chg="del mod">
-          <ac:chgData name="Moradi, Peyman" userId="dba91eb0-4a36-42e9-bb56-2c55a234965d" providerId="ADAL" clId="{BB04EFC6-8268-4F75-9FC2-149BB3B3C991}" dt="2025-11-19T13:27:20.886" v="392" actId="478"/>
-          <ac:spMkLst>
-            <pc:docMk/>
-            <pc:sldMk cId="178843416" sldId="264"/>
-            <ac:spMk id="2" creationId="{5B336B75-0C3C-F623-DB84-3285F7BDA922}"/>
-          </ac:spMkLst>
-        </pc:spChg>
-        <pc:spChg chg="add del">
-          <ac:chgData name="Moradi, Peyman" userId="dba91eb0-4a36-42e9-bb56-2c55a234965d" providerId="ADAL" clId="{BB04EFC6-8268-4F75-9FC2-149BB3B3C991}" dt="2025-11-19T13:27:07.339" v="387" actId="478"/>
-          <ac:spMkLst>
-            <pc:docMk/>
-            <pc:sldMk cId="178843416" sldId="264"/>
-            <ac:spMk id="3" creationId="{A3518B08-4792-D8EE-265B-205DA03D1A6D}"/>
-          </ac:spMkLst>
-        </pc:spChg>
         <pc:spChg chg="add mod">
           <ac:chgData name="Moradi, Peyman" userId="dba91eb0-4a36-42e9-bb56-2c55a234965d" providerId="ADAL" clId="{BB04EFC6-8268-4F75-9FC2-149BB3B3C991}" dt="2025-11-19T13:27:25.665" v="395" actId="403"/>
           <ac:spMkLst>
             <pc:docMk/>
             <pc:sldMk cId="178843416" sldId="264"/>
             <ac:spMk id="8" creationId="{D309792C-9703-002E-6000-DA4BE63B6216}"/>
-          </ac:spMkLst>
-        </pc:spChg>
-        <pc:spChg chg="add del mod">
-          <ac:chgData name="Moradi, Peyman" userId="dba91eb0-4a36-42e9-bb56-2c55a234965d" providerId="ADAL" clId="{BB04EFC6-8268-4F75-9FC2-149BB3B3C991}" dt="2025-11-19T13:27:23.116" v="393" actId="478"/>
-          <ac:spMkLst>
-            <pc:docMk/>
-            <pc:sldMk cId="178843416" sldId="264"/>
-            <ac:spMk id="10" creationId="{21258FB4-E340-597D-79EF-78611745C121}"/>
           </ac:spMkLst>
         </pc:spChg>
         <pc:spChg chg="add mod">
@@ -419,14 +291,6 @@
             <ac:spMk id="12" creationId="{DDF99BFB-3ACB-57E1-8080-72F34CCFA474}"/>
           </ac:spMkLst>
         </pc:spChg>
-        <pc:picChg chg="add del mod ord">
-          <ac:chgData name="Moradi, Peyman" userId="dba91eb0-4a36-42e9-bb56-2c55a234965d" providerId="ADAL" clId="{BB04EFC6-8268-4F75-9FC2-149BB3B3C991}" dt="2025-11-19T13:26:56.157" v="382" actId="22"/>
-          <ac:picMkLst>
-            <pc:docMk/>
-            <pc:sldMk cId="178843416" sldId="264"/>
-            <ac:picMk id="5" creationId="{53A07A8C-DFD9-A5EB-4D00-069B2C8AA5E5}"/>
-          </ac:picMkLst>
-        </pc:picChg>
         <pc:picChg chg="add mod ord">
           <ac:chgData name="Moradi, Peyman" userId="dba91eb0-4a36-42e9-bb56-2c55a234965d" providerId="ADAL" clId="{BB04EFC6-8268-4F75-9FC2-149BB3B3C991}" dt="2025-11-19T13:27:45.128" v="399" actId="1076"/>
           <ac:picMkLst>
@@ -442,22 +306,6 @@
           <pc:docMk/>
           <pc:sldMk cId="4178740839" sldId="265"/>
         </pc:sldMkLst>
-        <pc:spChg chg="del mod">
-          <ac:chgData name="Moradi, Peyman" userId="dba91eb0-4a36-42e9-bb56-2c55a234965d" providerId="ADAL" clId="{BB04EFC6-8268-4F75-9FC2-149BB3B3C991}" dt="2025-11-19T13:28:45.743" v="432" actId="478"/>
-          <ac:spMkLst>
-            <pc:docMk/>
-            <pc:sldMk cId="4178740839" sldId="265"/>
-            <ac:spMk id="2" creationId="{4B7D4116-0C69-19EB-308C-82A1C1342E26}"/>
-          </ac:spMkLst>
-        </pc:spChg>
-        <pc:spChg chg="del">
-          <ac:chgData name="Moradi, Peyman" userId="dba91eb0-4a36-42e9-bb56-2c55a234965d" providerId="ADAL" clId="{BB04EFC6-8268-4F75-9FC2-149BB3B3C991}" dt="2025-11-19T13:28:29.513" v="426" actId="478"/>
-          <ac:spMkLst>
-            <pc:docMk/>
-            <pc:sldMk cId="4178740839" sldId="265"/>
-            <ac:spMk id="3" creationId="{39490E50-DF51-0523-FB2A-414FD1A4B464}"/>
-          </ac:spMkLst>
-        </pc:spChg>
         <pc:spChg chg="add mod">
           <ac:chgData name="Moradi, Peyman" userId="dba91eb0-4a36-42e9-bb56-2c55a234965d" providerId="ADAL" clId="{BB04EFC6-8268-4F75-9FC2-149BB3B3C991}" dt="2025-11-19T13:55:33.907" v="585" actId="20577"/>
           <ac:spMkLst>
@@ -466,28 +314,12 @@
             <ac:spMk id="4" creationId="{ACA91D11-76A7-43B7-ED6D-050256E5C1D9}"/>
           </ac:spMkLst>
         </pc:spChg>
-        <pc:spChg chg="add del mod">
-          <ac:chgData name="Moradi, Peyman" userId="dba91eb0-4a36-42e9-bb56-2c55a234965d" providerId="ADAL" clId="{BB04EFC6-8268-4F75-9FC2-149BB3B3C991}" dt="2025-11-19T13:28:49.019" v="433" actId="478"/>
-          <ac:spMkLst>
-            <pc:docMk/>
-            <pc:sldMk cId="4178740839" sldId="265"/>
-            <ac:spMk id="6" creationId="{92FDD811-30DC-C4E4-4380-C432EE606550}"/>
-          </ac:spMkLst>
-        </pc:spChg>
         <pc:picChg chg="add mod">
           <ac:chgData name="Moradi, Peyman" userId="dba91eb0-4a36-42e9-bb56-2c55a234965d" providerId="ADAL" clId="{BB04EFC6-8268-4F75-9FC2-149BB3B3C991}" dt="2025-11-19T13:29:01.689" v="437" actId="1076"/>
           <ac:picMkLst>
             <pc:docMk/>
             <pc:sldMk cId="4178740839" sldId="265"/>
             <ac:picMk id="8" creationId="{AA818E3A-38ED-908A-8800-150E885C0D8F}"/>
-          </ac:picMkLst>
-        </pc:picChg>
-        <pc:picChg chg="add del mod">
-          <ac:chgData name="Moradi, Peyman" userId="dba91eb0-4a36-42e9-bb56-2c55a234965d" providerId="ADAL" clId="{BB04EFC6-8268-4F75-9FC2-149BB3B3C991}" dt="2025-11-19T13:30:29.532" v="444" actId="478"/>
-          <ac:picMkLst>
-            <pc:docMk/>
-            <pc:sldMk cId="4178740839" sldId="265"/>
-            <ac:picMk id="10" creationId="{49676578-A1F5-1E69-937A-59988619C8A3}"/>
           </ac:picMkLst>
         </pc:picChg>
         <pc:picChg chg="add mod">
@@ -513,52 +345,12 @@
             <ac:spMk id="4" creationId="{88F8AC78-AEF7-1AE4-6FE2-0B25B9B25E6D}"/>
           </ac:spMkLst>
         </pc:spChg>
-        <pc:picChg chg="add del mod">
-          <ac:chgData name="Moradi, Peyman" userId="dba91eb0-4a36-42e9-bb56-2c55a234965d" providerId="ADAL" clId="{BB04EFC6-8268-4F75-9FC2-149BB3B3C991}" dt="2025-11-19T13:48:15.272" v="488" actId="478"/>
-          <ac:picMkLst>
-            <pc:docMk/>
-            <pc:sldMk cId="1528255773" sldId="266"/>
-            <ac:picMk id="3" creationId="{DEF3932A-5FB0-B84A-4164-C8A08C48F302}"/>
-          </ac:picMkLst>
-        </pc:picChg>
-        <pc:picChg chg="add del mod">
-          <ac:chgData name="Moradi, Peyman" userId="dba91eb0-4a36-42e9-bb56-2c55a234965d" providerId="ADAL" clId="{BB04EFC6-8268-4F75-9FC2-149BB3B3C991}" dt="2025-11-19T13:45:23.960" v="479" actId="478"/>
-          <ac:picMkLst>
-            <pc:docMk/>
-            <pc:sldMk cId="1528255773" sldId="266"/>
-            <ac:picMk id="6" creationId="{28455AFE-A822-9787-5D63-ABADE7842801}"/>
-          </ac:picMkLst>
-        </pc:picChg>
-        <pc:picChg chg="del">
-          <ac:chgData name="Moradi, Peyman" userId="dba91eb0-4a36-42e9-bb56-2c55a234965d" providerId="ADAL" clId="{BB04EFC6-8268-4F75-9FC2-149BB3B3C991}" dt="2025-11-19T13:43:01.714" v="466" actId="478"/>
-          <ac:picMkLst>
-            <pc:docMk/>
-            <pc:sldMk cId="1528255773" sldId="266"/>
-            <ac:picMk id="8" creationId="{522519C1-C4F8-2606-7461-F9863081EFB7}"/>
-          </ac:picMkLst>
-        </pc:picChg>
-        <pc:picChg chg="add del mod">
-          <ac:chgData name="Moradi, Peyman" userId="dba91eb0-4a36-42e9-bb56-2c55a234965d" providerId="ADAL" clId="{BB04EFC6-8268-4F75-9FC2-149BB3B3C991}" dt="2025-11-19T13:45:24.343" v="480" actId="478"/>
-          <ac:picMkLst>
-            <pc:docMk/>
-            <pc:sldMk cId="1528255773" sldId="266"/>
-            <ac:picMk id="9" creationId="{87471FDE-B92F-0F85-8430-B5EA8DCE5945}"/>
-          </ac:picMkLst>
-        </pc:picChg>
         <pc:picChg chg="add mod">
           <ac:chgData name="Moradi, Peyman" userId="dba91eb0-4a36-42e9-bb56-2c55a234965d" providerId="ADAL" clId="{BB04EFC6-8268-4F75-9FC2-149BB3B3C991}" dt="2025-11-19T13:45:42.992" v="483" actId="1076"/>
           <ac:picMkLst>
             <pc:docMk/>
             <pc:sldMk cId="1528255773" sldId="266"/>
             <ac:picMk id="11" creationId="{A149FA92-0621-FC2A-85C0-3E9E2FE8A91F}"/>
-          </ac:picMkLst>
-        </pc:picChg>
-        <pc:picChg chg="del">
-          <ac:chgData name="Moradi, Peyman" userId="dba91eb0-4a36-42e9-bb56-2c55a234965d" providerId="ADAL" clId="{BB04EFC6-8268-4F75-9FC2-149BB3B3C991}" dt="2025-11-19T13:43:14.720" v="470" actId="478"/>
-          <ac:picMkLst>
-            <pc:docMk/>
-            <pc:sldMk cId="1528255773" sldId="266"/>
-            <ac:picMk id="12" creationId="{AA572B59-C8C1-3B2C-DEC4-2A5FCAF50BB6}"/>
           </ac:picMkLst>
         </pc:picChg>
         <pc:picChg chg="add mod">
@@ -591,24 +383,6 @@
             <pc:sldMasterMk cId="4273989651" sldId="2147483648"/>
             <pc:sldLayoutMk cId="3198248103" sldId="2147483650"/>
           </pc:sldLayoutMkLst>
-          <pc:spChg chg="del">
-            <ac:chgData name="Moradi, Peyman" userId="dba91eb0-4a36-42e9-bb56-2c55a234965d" providerId="ADAL" clId="{BB04EFC6-8268-4F75-9FC2-149BB3B3C991}" dt="2025-11-19T13:54:36.494" v="566" actId="478"/>
-            <ac:spMkLst>
-              <pc:docMk/>
-              <pc:sldMasterMk cId="4273989651" sldId="2147483648"/>
-              <pc:sldLayoutMk cId="3198248103" sldId="2147483650"/>
-              <ac:spMk id="8" creationId="{3BE7B532-D608-3BBC-1CE4-2BF51BB263E4}"/>
-            </ac:spMkLst>
-          </pc:spChg>
-          <pc:picChg chg="add mod">
-            <ac:chgData name="Moradi, Peyman" userId="dba91eb0-4a36-42e9-bb56-2c55a234965d" providerId="ADAL" clId="{BB04EFC6-8268-4F75-9FC2-149BB3B3C991}" dt="2025-11-19T13:54:34.327" v="565"/>
-            <ac:picMkLst>
-              <pc:docMk/>
-              <pc:sldMasterMk cId="4273989651" sldId="2147483648"/>
-              <pc:sldLayoutMk cId="3198248103" sldId="2147483650"/>
-              <ac:picMk id="7" creationId="{6B39DBDF-D865-2610-F805-DC533E83A53E}"/>
-            </ac:picMkLst>
-          </pc:picChg>
           <pc:picChg chg="add mod">
             <ac:chgData name="Moradi, Peyman" userId="dba91eb0-4a36-42e9-bb56-2c55a234965d" providerId="ADAL" clId="{BB04EFC6-8268-4F75-9FC2-149BB3B3C991}" dt="2025-11-19T13:54:38.953" v="568" actId="14100"/>
             <ac:picMkLst>
@@ -620,6 +394,46 @@
           </pc:picChg>
         </pc:sldLayoutChg>
       </pc:sldMasterChg>
+    </pc:docChg>
+  </pc:docChgLst>
+  <pc:docChgLst>
+    <pc:chgData name="Moradi, Peyman" userId="dba91eb0-4a36-42e9-bb56-2c55a234965d" providerId="ADAL" clId="{C2F2CB6F-16AD-4657-ABB9-2079F8BF5977}"/>
+    <pc:docChg chg="modSld">
+      <pc:chgData name="Moradi, Peyman" userId="dba91eb0-4a36-42e9-bb56-2c55a234965d" providerId="ADAL" clId="{C2F2CB6F-16AD-4657-ABB9-2079F8BF5977}" dt="2026-01-11T19:47:19.296" v="70" actId="1076"/>
+      <pc:docMkLst>
+        <pc:docMk/>
+      </pc:docMkLst>
+      <pc:sldChg chg="addSp modSp mod">
+        <pc:chgData name="Moradi, Peyman" userId="dba91eb0-4a36-42e9-bb56-2c55a234965d" providerId="ADAL" clId="{C2F2CB6F-16AD-4657-ABB9-2079F8BF5977}" dt="2026-01-11T19:47:19.296" v="70" actId="1076"/>
+        <pc:sldMkLst>
+          <pc:docMk/>
+          <pc:sldMk cId="348206209" sldId="259"/>
+        </pc:sldMkLst>
+        <pc:graphicFrameChg chg="mod">
+          <ac:chgData name="Moradi, Peyman" userId="dba91eb0-4a36-42e9-bb56-2c55a234965d" providerId="ADAL" clId="{C2F2CB6F-16AD-4657-ABB9-2079F8BF5977}" dt="2026-01-09T20:04:16.371" v="34" actId="20577"/>
+          <ac:graphicFrameMkLst>
+            <pc:docMk/>
+            <pc:sldMk cId="348206209" sldId="259"/>
+            <ac:graphicFrameMk id="10" creationId="{04FFF0D5-86E4-BFB4-A048-E34CF6C0B9DB}"/>
+          </ac:graphicFrameMkLst>
+        </pc:graphicFrameChg>
+        <pc:picChg chg="add mod">
+          <ac:chgData name="Moradi, Peyman" userId="dba91eb0-4a36-42e9-bb56-2c55a234965d" providerId="ADAL" clId="{C2F2CB6F-16AD-4657-ABB9-2079F8BF5977}" dt="2026-01-11T19:47:19.296" v="70" actId="1076"/>
+          <ac:picMkLst>
+            <pc:docMk/>
+            <pc:sldMk cId="348206209" sldId="259"/>
+            <ac:picMk id="5" creationId="{4F541BD6-DD7D-990B-BC10-2FFD4339654B}"/>
+          </ac:picMkLst>
+        </pc:picChg>
+        <pc:picChg chg="mod">
+          <ac:chgData name="Moradi, Peyman" userId="dba91eb0-4a36-42e9-bb56-2c55a234965d" providerId="ADAL" clId="{C2F2CB6F-16AD-4657-ABB9-2079F8BF5977}" dt="2026-01-09T20:04:37.126" v="68" actId="1038"/>
+          <ac:picMkLst>
+            <pc:docMk/>
+            <pc:sldMk cId="348206209" sldId="259"/>
+            <ac:picMk id="1032" creationId="{DD8C88D5-2ECC-586E-F688-6577B864EA43}"/>
+          </ac:picMkLst>
+        </pc:picChg>
+      </pc:sldChg>
     </pc:docChg>
   </pc:docChgLst>
   <pc:docChgLst>
@@ -693,22 +507,6 @@
           <pc:docMk/>
           <pc:sldMk cId="3609631159" sldId="258"/>
         </pc:sldMkLst>
-        <pc:spChg chg="mod">
-          <ac:chgData name="Moradi, Peyman" userId="dba91eb0-4a36-42e9-bb56-2c55a234965d" providerId="ADAL" clId="{5EE2AE56-8586-43CA-90CA-F979252C708F}" dt="2025-09-21T14:23:28.365" v="244" actId="6549"/>
-          <ac:spMkLst>
-            <pc:docMk/>
-            <pc:sldMk cId="3609631159" sldId="258"/>
-            <ac:spMk id="6" creationId="{DAA0E0B6-C72F-45D3-B145-1DEAC3DFB930}"/>
-          </ac:spMkLst>
-        </pc:spChg>
-        <pc:graphicFrameChg chg="mod">
-          <ac:chgData name="Moradi, Peyman" userId="dba91eb0-4a36-42e9-bb56-2c55a234965d" providerId="ADAL" clId="{5EE2AE56-8586-43CA-90CA-F979252C708F}" dt="2025-09-17T21:07:43.579" v="0" actId="20577"/>
-          <ac:graphicFrameMkLst>
-            <pc:docMk/>
-            <pc:sldMk cId="3609631159" sldId="258"/>
-            <ac:graphicFrameMk id="5" creationId="{34D34C36-F082-C7B3-1633-8E43E374AAC9}"/>
-          </ac:graphicFrameMkLst>
-        </pc:graphicFrameChg>
       </pc:sldChg>
       <pc:sldChg chg="addSp delSp modSp mod">
         <pc:chgData name="Moradi, Peyman" userId="dba91eb0-4a36-42e9-bb56-2c55a234965d" providerId="ADAL" clId="{5EE2AE56-8586-43CA-90CA-F979252C708F}" dt="2025-09-21T14:23:14.324" v="239" actId="478"/>
@@ -716,22 +514,6 @@
           <pc:docMk/>
           <pc:sldMk cId="348206209" sldId="259"/>
         </pc:sldMkLst>
-        <pc:spChg chg="mod">
-          <ac:chgData name="Moradi, Peyman" userId="dba91eb0-4a36-42e9-bb56-2c55a234965d" providerId="ADAL" clId="{5EE2AE56-8586-43CA-90CA-F979252C708F}" dt="2025-09-21T14:23:12.621" v="238" actId="113"/>
-          <ac:spMkLst>
-            <pc:docMk/>
-            <pc:sldMk cId="348206209" sldId="259"/>
-            <ac:spMk id="4" creationId="{E3199A79-7AF1-F97A-782A-9810527253DD}"/>
-          </ac:spMkLst>
-        </pc:spChg>
-        <pc:graphicFrameChg chg="mod">
-          <ac:chgData name="Moradi, Peyman" userId="dba91eb0-4a36-42e9-bb56-2c55a234965d" providerId="ADAL" clId="{5EE2AE56-8586-43CA-90CA-F979252C708F}" dt="2025-09-17T21:37:25.954" v="99" actId="1076"/>
-          <ac:graphicFrameMkLst>
-            <pc:docMk/>
-            <pc:sldMk cId="348206209" sldId="259"/>
-            <ac:graphicFrameMk id="10" creationId="{04FFF0D5-86E4-BFB4-A048-E34CF6C0B9DB}"/>
-          </ac:graphicFrameMkLst>
-        </pc:graphicFrameChg>
       </pc:sldChg>
       <pc:sldChg chg="modSp mod ord">
         <pc:chgData name="Moradi, Peyman" userId="dba91eb0-4a36-42e9-bb56-2c55a234965d" providerId="ADAL" clId="{5EE2AE56-8586-43CA-90CA-F979252C708F}" dt="2025-09-22T09:56:56.118" v="773"/>
@@ -739,38 +521,6 @@
           <pc:docMk/>
           <pc:sldMk cId="334279111" sldId="260"/>
         </pc:sldMkLst>
-        <pc:spChg chg="mod">
-          <ac:chgData name="Moradi, Peyman" userId="dba91eb0-4a36-42e9-bb56-2c55a234965d" providerId="ADAL" clId="{5EE2AE56-8586-43CA-90CA-F979252C708F}" dt="2025-09-22T09:56:53.971" v="771"/>
-          <ac:spMkLst>
-            <pc:docMk/>
-            <pc:sldMk cId="334279111" sldId="260"/>
-            <ac:spMk id="4" creationId="{25248021-8C4D-4545-1C50-0F99E80F9571}"/>
-          </ac:spMkLst>
-        </pc:spChg>
-        <pc:spChg chg="mod">
-          <ac:chgData name="Moradi, Peyman" userId="dba91eb0-4a36-42e9-bb56-2c55a234965d" providerId="ADAL" clId="{5EE2AE56-8586-43CA-90CA-F979252C708F}" dt="2025-09-21T15:08:05.188" v="714" actId="6549"/>
-          <ac:spMkLst>
-            <pc:docMk/>
-            <pc:sldMk cId="334279111" sldId="260"/>
-            <ac:spMk id="6" creationId="{C8ED3E5B-012F-E0FD-5740-79B2A558B48F}"/>
-          </ac:spMkLst>
-        </pc:spChg>
-        <pc:spChg chg="mod">
-          <ac:chgData name="Moradi, Peyman" userId="dba91eb0-4a36-42e9-bb56-2c55a234965d" providerId="ADAL" clId="{5EE2AE56-8586-43CA-90CA-F979252C708F}" dt="2025-09-17T21:57:13.154" v="180" actId="1076"/>
-          <ac:spMkLst>
-            <pc:docMk/>
-            <pc:sldMk cId="334279111" sldId="260"/>
-            <ac:spMk id="10" creationId="{6C86A15B-99FD-7707-18AB-239DB8EC06B3}"/>
-          </ac:spMkLst>
-        </pc:spChg>
-        <pc:spChg chg="mod">
-          <ac:chgData name="Moradi, Peyman" userId="dba91eb0-4a36-42e9-bb56-2c55a234965d" providerId="ADAL" clId="{5EE2AE56-8586-43CA-90CA-F979252C708F}" dt="2025-09-17T21:57:13.154" v="180" actId="1076"/>
-          <ac:spMkLst>
-            <pc:docMk/>
-            <pc:sldMk cId="334279111" sldId="260"/>
-            <ac:spMk id="12" creationId="{E404D254-23C9-6C22-90AF-951228A7961D}"/>
-          </ac:spMkLst>
-        </pc:spChg>
       </pc:sldChg>
       <pc:sldChg chg="modSp new mod">
         <pc:chgData name="Moradi, Peyman" userId="dba91eb0-4a36-42e9-bb56-2c55a234965d" providerId="ADAL" clId="{5EE2AE56-8586-43CA-90CA-F979252C708F}" dt="2025-09-21T14:21:30.038" v="208" actId="20577"/>
@@ -778,22 +528,6 @@
           <pc:docMk/>
           <pc:sldMk cId="3903256587" sldId="261"/>
         </pc:sldMkLst>
-        <pc:spChg chg="mod">
-          <ac:chgData name="Moradi, Peyman" userId="dba91eb0-4a36-42e9-bb56-2c55a234965d" providerId="ADAL" clId="{5EE2AE56-8586-43CA-90CA-F979252C708F}" dt="2025-09-21T14:21:30.038" v="208" actId="20577"/>
-          <ac:spMkLst>
-            <pc:docMk/>
-            <pc:sldMk cId="3903256587" sldId="261"/>
-            <ac:spMk id="2" creationId="{60E50550-3F99-F07B-B5C8-A346582972C3}"/>
-          </ac:spMkLst>
-        </pc:spChg>
-        <pc:spChg chg="mod">
-          <ac:chgData name="Moradi, Peyman" userId="dba91eb0-4a36-42e9-bb56-2c55a234965d" providerId="ADAL" clId="{5EE2AE56-8586-43CA-90CA-F979252C708F}" dt="2025-09-21T14:21:24.720" v="200" actId="20577"/>
-          <ac:spMkLst>
-            <pc:docMk/>
-            <pc:sldMk cId="3903256587" sldId="261"/>
-            <ac:spMk id="3" creationId="{DD77DABC-AAF1-EE8C-CBC3-473EB5ADCA85}"/>
-          </ac:spMkLst>
-        </pc:spChg>
       </pc:sldChg>
       <pc:sldChg chg="delSp modSp new mod">
         <pc:chgData name="Moradi, Peyman" userId="dba91eb0-4a36-42e9-bb56-2c55a234965d" providerId="ADAL" clId="{5EE2AE56-8586-43CA-90CA-F979252C708F}" dt="2025-09-21T14:21:46.908" v="221" actId="1076"/>
@@ -801,14 +535,6 @@
           <pc:docMk/>
           <pc:sldMk cId="1090240246" sldId="262"/>
         </pc:sldMkLst>
-        <pc:spChg chg="mod">
-          <ac:chgData name="Moradi, Peyman" userId="dba91eb0-4a36-42e9-bb56-2c55a234965d" providerId="ADAL" clId="{5EE2AE56-8586-43CA-90CA-F979252C708F}" dt="2025-09-21T14:21:46.908" v="221" actId="1076"/>
-          <ac:spMkLst>
-            <pc:docMk/>
-            <pc:sldMk cId="1090240246" sldId="262"/>
-            <ac:spMk id="2" creationId="{70700271-B1B3-61F3-9AE2-8878BC06B3F9}"/>
-          </ac:spMkLst>
-        </pc:spChg>
       </pc:sldChg>
       <pc:sldChg chg="addSp delSp modSp add mod">
         <pc:chgData name="Moradi, Peyman" userId="dba91eb0-4a36-42e9-bb56-2c55a234965d" providerId="ADAL" clId="{5EE2AE56-8586-43CA-90CA-F979252C708F}" dt="2025-09-22T09:56:42.168" v="770" actId="20577"/>
@@ -816,22 +542,6 @@
           <pc:docMk/>
           <pc:sldMk cId="2701834378" sldId="263"/>
         </pc:sldMkLst>
-        <pc:spChg chg="mod">
-          <ac:chgData name="Moradi, Peyman" userId="dba91eb0-4a36-42e9-bb56-2c55a234965d" providerId="ADAL" clId="{5EE2AE56-8586-43CA-90CA-F979252C708F}" dt="2025-09-22T09:56:42.168" v="770" actId="20577"/>
-          <ac:spMkLst>
-            <pc:docMk/>
-            <pc:sldMk cId="2701834378" sldId="263"/>
-            <ac:spMk id="4" creationId="{18E6EFF1-1DF3-4285-3413-8486395A3965}"/>
-          </ac:spMkLst>
-        </pc:spChg>
-        <pc:graphicFrameChg chg="add mod modGraphic">
-          <ac:chgData name="Moradi, Peyman" userId="dba91eb0-4a36-42e9-bb56-2c55a234965d" providerId="ADAL" clId="{5EE2AE56-8586-43CA-90CA-F979252C708F}" dt="2025-09-22T09:56:31.278" v="763" actId="1076"/>
-          <ac:graphicFrameMkLst>
-            <pc:docMk/>
-            <pc:sldMk cId="2701834378" sldId="263"/>
-            <ac:graphicFrameMk id="5" creationId="{908E90FC-1670-F7B7-C787-26BECD49125B}"/>
-          </ac:graphicFrameMkLst>
-        </pc:graphicFrameChg>
       </pc:sldChg>
       <pc:sldMasterChg chg="modSldLayout">
         <pc:chgData name="Moradi, Peyman" userId="dba91eb0-4a36-42e9-bb56-2c55a234965d" providerId="ADAL" clId="{5EE2AE56-8586-43CA-90CA-F979252C708F}" dt="2025-09-21T14:22:52.181" v="232" actId="1076"/>
@@ -846,15 +556,6 @@
             <pc:sldMasterMk cId="4273989651" sldId="2147483648"/>
             <pc:sldLayoutMk cId="3198248103" sldId="2147483650"/>
           </pc:sldLayoutMkLst>
-          <pc:spChg chg="mod">
-            <ac:chgData name="Moradi, Peyman" userId="dba91eb0-4a36-42e9-bb56-2c55a234965d" providerId="ADAL" clId="{5EE2AE56-8586-43CA-90CA-F979252C708F}" dt="2025-09-21T14:22:33.737" v="229" actId="1076"/>
-            <ac:spMkLst>
-              <pc:docMk/>
-              <pc:sldMasterMk cId="4273989651" sldId="2147483648"/>
-              <pc:sldLayoutMk cId="3198248103" sldId="2147483650"/>
-              <ac:spMk id="3" creationId="{B309AB6F-2D50-F760-2936-FCEA6D614876}"/>
-            </ac:spMkLst>
-          </pc:spChg>
         </pc:sldLayoutChg>
       </pc:sldMasterChg>
     </pc:docChg>
@@ -7597,22 +7298,79 @@
       <dgm:prSet custT="1"/>
       <dgm:spPr>
         <a:solidFill>
-          <a:schemeClr val="bg2">
-            <a:lumMod val="75000"/>
-          </a:schemeClr>
+          <a:srgbClr val="4EA72E"/>
         </a:solidFill>
+        <a:ln w="19050" cap="flat" cmpd="sng" algn="ctr">
+          <a:solidFill>
+            <a:prstClr val="white">
+              <a:hueOff val="0"/>
+              <a:satOff val="0"/>
+              <a:lumOff val="0"/>
+              <a:alphaOff val="0"/>
+            </a:prstClr>
+          </a:solidFill>
+          <a:prstDash val="solid"/>
+          <a:miter lim="800000"/>
+        </a:ln>
+        <a:effectLst/>
       </dgm:spPr>
       <dgm:t>
-        <a:bodyPr/>
+        <a:bodyPr spcFirstLastPara="0" vert="horz" wrap="square" lIns="6985" tIns="6985" rIns="6985" bIns="6985" numCol="1" spcCol="1270" anchor="ctr" anchorCtr="0"/>
         <a:lstStyle/>
         <a:p>
-          <a:pPr>
+          <a:pPr marL="0" lvl="0" indent="0" algn="ctr" defTabSz="488950">
+            <a:lnSpc>
+              <a:spcPct val="90000"/>
+            </a:lnSpc>
+            <a:spcBef>
+              <a:spcPct val="0"/>
+            </a:spcBef>
+            <a:spcAft>
+              <a:spcPct val="35000"/>
+            </a:spcAft>
             <a:buFont typeface="+mj-lt"/>
-            <a:buAutoNum type="arabicPeriod"/>
+            <a:buNone/>
           </a:pPr>
           <a:r>
-            <a:rPr lang="en-US" sz="1100" b="1" dirty="0"/>
-            <a:t>2. Dynamic Range </a:t>
+            <a:rPr lang="en-US" sz="1100" b="1" kern="1200" dirty="0">
+              <a:solidFill>
+                <a:prstClr val="white"/>
+              </a:solidFill>
+              <a:latin typeface="Aptos" panose="02110004020202020204"/>
+              <a:ea typeface="+mn-ea"/>
+              <a:cs typeface="+mn-cs"/>
+            </a:rPr>
+            <a:t>2. Dynamic Range</a:t>
+          </a:r>
+        </a:p>
+        <a:p>
+          <a:pPr marL="0" lvl="0" indent="0" algn="ctr" defTabSz="488950">
+            <a:lnSpc>
+              <a:spcPct val="90000"/>
+            </a:lnSpc>
+            <a:spcBef>
+              <a:spcPct val="0"/>
+            </a:spcBef>
+            <a:spcAft>
+              <a:spcPct val="35000"/>
+            </a:spcAft>
+            <a:buFont typeface="+mj-lt"/>
+            <a:buNone/>
+          </a:pPr>
+          <a:r>
+            <a:rPr lang="en-US" sz="1100" b="0" i="0" kern="1200" dirty="0"/>
+            <a:t>✓</a:t>
+          </a:r>
+          <a:r>
+            <a:rPr lang="en-US" sz="1100" b="1" kern="1200" dirty="0">
+              <a:solidFill>
+                <a:prstClr val="white"/>
+              </a:solidFill>
+              <a:latin typeface="Aptos" panose="02110004020202020204"/>
+              <a:ea typeface="+mn-ea"/>
+              <a:cs typeface="+mn-cs"/>
+            </a:rPr>
+            <a:t> </a:t>
           </a:r>
         </a:p>
       </dgm:t>
@@ -7685,98 +7443,6 @@
         </a:p>
       </dgm:t>
     </dgm:pt>
-    <dgm:pt modelId="{B311C7DA-215E-4A76-B9AE-F52C8B8E90BF}">
-      <dgm:prSet custT="1"/>
-      <dgm:spPr>
-        <a:solidFill>
-          <a:schemeClr val="bg2">
-            <a:lumMod val="75000"/>
-          </a:schemeClr>
-        </a:solidFill>
-      </dgm:spPr>
-      <dgm:t>
-        <a:bodyPr/>
-        <a:lstStyle/>
-        <a:p>
-          <a:pPr>
-            <a:buFont typeface="+mj-lt"/>
-            <a:buAutoNum type="arabicPeriod"/>
-          </a:pPr>
-          <a:r>
-            <a:rPr lang="en-US" sz="1100" b="1" dirty="0"/>
-            <a:t>4. Fidelity </a:t>
-          </a:r>
-        </a:p>
-      </dgm:t>
-    </dgm:pt>
-    <dgm:pt modelId="{3C647417-AC70-4DC2-9A8F-BB36BCFF5FB3}" type="parTrans" cxnId="{8E20D94D-5FAC-421F-8A6E-E3A4EDC2352F}">
-      <dgm:prSet custT="1"/>
-      <dgm:spPr/>
-      <dgm:t>
-        <a:bodyPr/>
-        <a:lstStyle/>
-        <a:p>
-          <a:endParaRPr lang="en-US" sz="1050" b="1"/>
-        </a:p>
-      </dgm:t>
-    </dgm:pt>
-    <dgm:pt modelId="{1C87FBD4-FB80-42D9-A0AC-B96026EFC3D5}" type="sibTrans" cxnId="{8E20D94D-5FAC-421F-8A6E-E3A4EDC2352F}">
-      <dgm:prSet/>
-      <dgm:spPr/>
-      <dgm:t>
-        <a:bodyPr/>
-        <a:lstStyle/>
-        <a:p>
-          <a:endParaRPr lang="en-US" sz="4000" b="1"/>
-        </a:p>
-      </dgm:t>
-    </dgm:pt>
-    <dgm:pt modelId="{96356C93-ACBD-4C98-AC6F-B3EBBAC351C2}">
-      <dgm:prSet custT="1"/>
-      <dgm:spPr>
-        <a:solidFill>
-          <a:schemeClr val="bg2">
-            <a:lumMod val="75000"/>
-          </a:schemeClr>
-        </a:solidFill>
-      </dgm:spPr>
-      <dgm:t>
-        <a:bodyPr/>
-        <a:lstStyle/>
-        <a:p>
-          <a:pPr>
-            <a:buFont typeface="+mj-lt"/>
-            <a:buAutoNum type="arabicPeriod"/>
-          </a:pPr>
-          <a:r>
-            <a:rPr lang="en-US" sz="1100" b="1" dirty="0"/>
-            <a:t>5. Loss Budget</a:t>
-          </a:r>
-        </a:p>
-      </dgm:t>
-    </dgm:pt>
-    <dgm:pt modelId="{839CA1CD-6099-47BB-AEDB-77CADC7B2E5F}" type="parTrans" cxnId="{FE7D02E9-647A-447A-B4F9-C25DC0B851AE}">
-      <dgm:prSet custT="1"/>
-      <dgm:spPr/>
-      <dgm:t>
-        <a:bodyPr/>
-        <a:lstStyle/>
-        <a:p>
-          <a:endParaRPr lang="en-US" sz="1050" b="1"/>
-        </a:p>
-      </dgm:t>
-    </dgm:pt>
-    <dgm:pt modelId="{5318B47F-548E-4BE3-A234-006B63878B71}" type="sibTrans" cxnId="{FE7D02E9-647A-447A-B4F9-C25DC0B851AE}">
-      <dgm:prSet/>
-      <dgm:spPr/>
-      <dgm:t>
-        <a:bodyPr/>
-        <a:lstStyle/>
-        <a:p>
-          <a:endParaRPr lang="en-US" sz="4000" b="1"/>
-        </a:p>
-      </dgm:t>
-    </dgm:pt>
     <dgm:pt modelId="{5AE3CAE3-FE28-43AE-BE4A-8BCBE734CEE7}">
       <dgm:prSet custT="1"/>
       <dgm:spPr>
@@ -7823,140 +7489,6 @@
         </a:p>
       </dgm:t>
     </dgm:pt>
-    <dgm:pt modelId="{80F2DED1-F559-4647-8C7A-A03A8EF67DD6}">
-      <dgm:prSet custT="1"/>
-      <dgm:spPr>
-        <a:solidFill>
-          <a:schemeClr val="bg2">
-            <a:lumMod val="75000"/>
-          </a:schemeClr>
-        </a:solidFill>
-      </dgm:spPr>
-      <dgm:t>
-        <a:bodyPr/>
-        <a:lstStyle/>
-        <a:p>
-          <a:pPr>
-            <a:buFont typeface="+mj-lt"/>
-            <a:buAutoNum type="arabicPeriod"/>
-          </a:pPr>
-          <a:r>
-            <a:rPr lang="en-US" sz="1100" b="1" dirty="0"/>
-            <a:t>7. Cross Talk </a:t>
-          </a:r>
-        </a:p>
-      </dgm:t>
-    </dgm:pt>
-    <dgm:pt modelId="{0053B921-7E42-47BA-B24C-BAB571B37B72}" type="parTrans" cxnId="{E600A6EB-B91F-4B60-B092-9167FD13F009}">
-      <dgm:prSet custT="1"/>
-      <dgm:spPr/>
-      <dgm:t>
-        <a:bodyPr/>
-        <a:lstStyle/>
-        <a:p>
-          <a:endParaRPr lang="en-US" sz="1050" b="1"/>
-        </a:p>
-      </dgm:t>
-    </dgm:pt>
-    <dgm:pt modelId="{5D3CC2AB-FAA9-43AD-87CD-41437ABEFD5D}" type="sibTrans" cxnId="{E600A6EB-B91F-4B60-B092-9167FD13F009}">
-      <dgm:prSet/>
-      <dgm:spPr/>
-      <dgm:t>
-        <a:bodyPr/>
-        <a:lstStyle/>
-        <a:p>
-          <a:endParaRPr lang="en-US" sz="4000" b="1"/>
-        </a:p>
-      </dgm:t>
-    </dgm:pt>
-    <dgm:pt modelId="{68BCF387-B8AB-4B21-9D43-D5EDCB05F115}">
-      <dgm:prSet custT="1"/>
-      <dgm:spPr>
-        <a:solidFill>
-          <a:schemeClr val="bg2">
-            <a:lumMod val="75000"/>
-          </a:schemeClr>
-        </a:solidFill>
-      </dgm:spPr>
-      <dgm:t>
-        <a:bodyPr/>
-        <a:lstStyle/>
-        <a:p>
-          <a:pPr>
-            <a:buFont typeface="+mj-lt"/>
-            <a:buAutoNum type="arabicPeriod"/>
-          </a:pPr>
-          <a:r>
-            <a:rPr lang="en-US" sz="1100" b="1" dirty="0"/>
-            <a:t>8. LF DAS</a:t>
-          </a:r>
-        </a:p>
-      </dgm:t>
-    </dgm:pt>
-    <dgm:pt modelId="{3CE88A07-8810-4ABE-832C-96C59ACE1645}" type="parTrans" cxnId="{F30B57D5-A9E8-4B79-AEB3-6FBA2B3A78F0}">
-      <dgm:prSet custT="1"/>
-      <dgm:spPr/>
-      <dgm:t>
-        <a:bodyPr/>
-        <a:lstStyle/>
-        <a:p>
-          <a:endParaRPr lang="en-US" sz="1050" b="1"/>
-        </a:p>
-      </dgm:t>
-    </dgm:pt>
-    <dgm:pt modelId="{EDBCF259-D5F0-45A5-A67D-683FB0BAF28E}" type="sibTrans" cxnId="{F30B57D5-A9E8-4B79-AEB3-6FBA2B3A78F0}">
-      <dgm:prSet/>
-      <dgm:spPr/>
-      <dgm:t>
-        <a:bodyPr/>
-        <a:lstStyle/>
-        <a:p>
-          <a:endParaRPr lang="en-US" sz="4000" b="1"/>
-        </a:p>
-      </dgm:t>
-    </dgm:pt>
-    <dgm:pt modelId="{295372FF-4ED1-4E94-A8EA-153373A1B235}">
-      <dgm:prSet custT="1"/>
-      <dgm:spPr>
-        <a:solidFill>
-          <a:schemeClr val="bg2">
-            <a:lumMod val="75000"/>
-          </a:schemeClr>
-        </a:solidFill>
-      </dgm:spPr>
-      <dgm:t>
-        <a:bodyPr/>
-        <a:lstStyle/>
-        <a:p>
-          <a:r>
-            <a:rPr lang="en-US" sz="1100" b="1" dirty="0"/>
-            <a:t>…</a:t>
-          </a:r>
-        </a:p>
-      </dgm:t>
-    </dgm:pt>
-    <dgm:pt modelId="{3964A17D-1F81-4323-A3DE-DECE5C0363A8}" type="parTrans" cxnId="{8A875B4F-87B4-43A7-8EF3-B6D99461C7E2}">
-      <dgm:prSet custT="1"/>
-      <dgm:spPr/>
-      <dgm:t>
-        <a:bodyPr/>
-        <a:lstStyle/>
-        <a:p>
-          <a:endParaRPr lang="en-US" sz="900" b="1"/>
-        </a:p>
-      </dgm:t>
-    </dgm:pt>
-    <dgm:pt modelId="{D9D4DB6B-11D3-46A8-B452-1CA437AE55FB}" type="sibTrans" cxnId="{8A875B4F-87B4-43A7-8EF3-B6D99461C7E2}">
-      <dgm:prSet/>
-      <dgm:spPr/>
-      <dgm:t>
-        <a:bodyPr/>
-        <a:lstStyle/>
-        <a:p>
-          <a:endParaRPr lang="en-US" sz="3200" b="1"/>
-        </a:p>
-      </dgm:t>
-    </dgm:pt>
     <dgm:pt modelId="{F11269FF-AE4B-4E34-AD0E-37A12D1B3070}">
       <dgm:prSet custT="1"/>
       <dgm:spPr>
@@ -7980,10 +7512,7 @@
             <a:rPr lang="en-US" sz="1100" b="0" i="0" dirty="0"/>
             <a:t>✓</a:t>
           </a:r>
-          <a:r>
-            <a:rPr lang="en-US" sz="1100" b="1" dirty="0"/>
-            <a:t>  </a:t>
-          </a:r>
+          <a:endParaRPr lang="en-US" sz="1100" b="1" dirty="0"/>
         </a:p>
       </dgm:t>
     </dgm:pt>
@@ -8006,6 +7535,267 @@
         <a:lstStyle/>
         <a:p>
           <a:endParaRPr lang="en-US" sz="1600"/>
+        </a:p>
+      </dgm:t>
+    </dgm:pt>
+    <dgm:pt modelId="{9276693D-18BD-4E6A-98A8-CD3AC8A0169F}">
+      <dgm:prSet custT="1"/>
+      <dgm:spPr>
+        <a:solidFill>
+          <a:schemeClr val="accent6"/>
+        </a:solidFill>
+      </dgm:spPr>
+      <dgm:t>
+        <a:bodyPr/>
+        <a:lstStyle/>
+        <a:p>
+          <a:pPr>
+            <a:buFont typeface="+mj-lt"/>
+            <a:buAutoNum type="arabicPeriod"/>
+          </a:pPr>
+          <a:r>
+            <a:rPr lang="en-US" sz="1100" b="1" dirty="0"/>
+            <a:t>5. Loss Budget</a:t>
+          </a:r>
+        </a:p>
+        <a:p>
+          <a:pPr>
+            <a:buFont typeface="+mj-lt"/>
+            <a:buAutoNum type="arabicPeriod"/>
+          </a:pPr>
+          <a:r>
+            <a:rPr lang="en-US" sz="1100" b="0" i="0" dirty="0"/>
+            <a:t>✓</a:t>
+          </a:r>
+          <a:r>
+            <a:rPr lang="en-US" sz="1100" b="1" dirty="0"/>
+            <a:t> </a:t>
+          </a:r>
+        </a:p>
+      </dgm:t>
+    </dgm:pt>
+    <dgm:pt modelId="{AC75B354-EAB7-44F9-A1F5-C819F398FE79}" type="parTrans" cxnId="{1CFA5964-286E-4BE2-BF23-B83915218287}">
+      <dgm:prSet/>
+      <dgm:spPr/>
+      <dgm:t>
+        <a:bodyPr/>
+        <a:lstStyle/>
+        <a:p>
+          <a:endParaRPr lang="en-US"/>
+        </a:p>
+      </dgm:t>
+    </dgm:pt>
+    <dgm:pt modelId="{E4B4EBE0-1E55-4365-8D15-5E47862355C5}" type="sibTrans" cxnId="{1CFA5964-286E-4BE2-BF23-B83915218287}">
+      <dgm:prSet/>
+      <dgm:spPr/>
+      <dgm:t>
+        <a:bodyPr/>
+        <a:lstStyle/>
+        <a:p>
+          <a:endParaRPr lang="en-US"/>
+        </a:p>
+      </dgm:t>
+    </dgm:pt>
+    <dgm:pt modelId="{0AAC9302-6561-4DEF-82F8-2F08F6FCB9E7}">
+      <dgm:prSet custT="1"/>
+      <dgm:spPr>
+        <a:solidFill>
+          <a:srgbClr val="4EA72E"/>
+        </a:solidFill>
+        <a:ln w="19050" cap="flat" cmpd="sng" algn="ctr">
+          <a:solidFill>
+            <a:prstClr val="white">
+              <a:hueOff val="0"/>
+              <a:satOff val="0"/>
+              <a:lumOff val="0"/>
+              <a:alphaOff val="0"/>
+            </a:prstClr>
+          </a:solidFill>
+          <a:prstDash val="solid"/>
+          <a:miter lim="800000"/>
+        </a:ln>
+        <a:effectLst/>
+      </dgm:spPr>
+      <dgm:t>
+        <a:bodyPr spcFirstLastPara="0" vert="horz" wrap="square" lIns="6985" tIns="6985" rIns="6985" bIns="6985" numCol="1" spcCol="1270" anchor="ctr" anchorCtr="0"/>
+        <a:lstStyle/>
+        <a:p>
+          <a:pPr marL="0" lvl="0" indent="0" algn="ctr" defTabSz="488950">
+            <a:lnSpc>
+              <a:spcPct val="90000"/>
+            </a:lnSpc>
+            <a:spcBef>
+              <a:spcPct val="0"/>
+            </a:spcBef>
+            <a:spcAft>
+              <a:spcPct val="35000"/>
+            </a:spcAft>
+            <a:buFont typeface="+mj-lt"/>
+            <a:buNone/>
+          </a:pPr>
+          <a:r>
+            <a:rPr lang="en-US" sz="1100" b="1" kern="1200" dirty="0">
+              <a:solidFill>
+                <a:prstClr val="white"/>
+              </a:solidFill>
+              <a:latin typeface="Aptos" panose="02110004020202020204"/>
+              <a:ea typeface="+mn-ea"/>
+              <a:cs typeface="+mn-cs"/>
+            </a:rPr>
+            <a:t>4. Fidelity</a:t>
+          </a:r>
+        </a:p>
+        <a:p>
+          <a:pPr marL="0" lvl="0" indent="0" algn="ctr" defTabSz="488950">
+            <a:lnSpc>
+              <a:spcPct val="90000"/>
+            </a:lnSpc>
+            <a:spcBef>
+              <a:spcPct val="0"/>
+            </a:spcBef>
+            <a:spcAft>
+              <a:spcPct val="35000"/>
+            </a:spcAft>
+            <a:buFont typeface="+mj-lt"/>
+            <a:buNone/>
+          </a:pPr>
+          <a:r>
+            <a:rPr lang="en-US" sz="1100" b="0" i="0" kern="1200" dirty="0"/>
+            <a:t>✓</a:t>
+          </a:r>
+          <a:endParaRPr lang="en-US" sz="1100" b="1" kern="1200" dirty="0">
+            <a:solidFill>
+              <a:prstClr val="white"/>
+            </a:solidFill>
+            <a:latin typeface="Aptos" panose="02110004020202020204"/>
+            <a:ea typeface="+mn-ea"/>
+            <a:cs typeface="+mn-cs"/>
+          </a:endParaRPr>
+        </a:p>
+      </dgm:t>
+    </dgm:pt>
+    <dgm:pt modelId="{50EF01FF-9F4A-44BE-AF75-01ADE32A4BD1}" type="parTrans" cxnId="{ACB607CB-1027-46B0-B941-9D6C782BBBC4}">
+      <dgm:prSet/>
+      <dgm:spPr/>
+      <dgm:t>
+        <a:bodyPr/>
+        <a:lstStyle/>
+        <a:p>
+          <a:endParaRPr lang="en-US"/>
+        </a:p>
+      </dgm:t>
+    </dgm:pt>
+    <dgm:pt modelId="{04F11AFB-DBAA-4145-A497-078B1B896D4E}" type="sibTrans" cxnId="{ACB607CB-1027-46B0-B941-9D6C782BBBC4}">
+      <dgm:prSet/>
+      <dgm:spPr/>
+      <dgm:t>
+        <a:bodyPr/>
+        <a:lstStyle/>
+        <a:p>
+          <a:endParaRPr lang="en-US"/>
+        </a:p>
+      </dgm:t>
+    </dgm:pt>
+    <dgm:pt modelId="{5F80989D-4BBF-474F-AA54-878ABB0C0F60}">
+      <dgm:prSet custT="1"/>
+      <dgm:spPr>
+        <a:solidFill>
+          <a:srgbClr val="4EA72E"/>
+        </a:solidFill>
+        <a:ln w="19050" cap="flat" cmpd="sng" algn="ctr">
+          <a:solidFill>
+            <a:prstClr val="white">
+              <a:hueOff val="0"/>
+              <a:satOff val="0"/>
+              <a:lumOff val="0"/>
+              <a:alphaOff val="0"/>
+            </a:prstClr>
+          </a:solidFill>
+          <a:prstDash val="solid"/>
+          <a:miter lim="800000"/>
+        </a:ln>
+        <a:effectLst/>
+      </dgm:spPr>
+      <dgm:t>
+        <a:bodyPr spcFirstLastPara="0" vert="horz" wrap="square" lIns="6985" tIns="6985" rIns="6985" bIns="6985" numCol="1" spcCol="1270" anchor="ctr" anchorCtr="0"/>
+        <a:lstStyle/>
+        <a:p>
+          <a:pPr marL="0" lvl="0" indent="0" algn="ctr" defTabSz="488950">
+            <a:lnSpc>
+              <a:spcPct val="90000"/>
+            </a:lnSpc>
+            <a:spcBef>
+              <a:spcPct val="0"/>
+            </a:spcBef>
+            <a:spcAft>
+              <a:spcPct val="35000"/>
+            </a:spcAft>
+            <a:buFont typeface="+mj-lt"/>
+            <a:buNone/>
+          </a:pPr>
+          <a:r>
+            <a:rPr lang="en-US" sz="1100" b="1" kern="1200" dirty="0">
+              <a:solidFill>
+                <a:prstClr val="white"/>
+              </a:solidFill>
+              <a:latin typeface="Aptos" panose="02110004020202020204"/>
+              <a:ea typeface="+mn-ea"/>
+              <a:cs typeface="+mn-cs"/>
+            </a:rPr>
+            <a:t>7. Cross Talk</a:t>
+          </a:r>
+        </a:p>
+        <a:p>
+          <a:pPr marL="0" lvl="0" indent="0" algn="ctr" defTabSz="488950">
+            <a:lnSpc>
+              <a:spcPct val="90000"/>
+            </a:lnSpc>
+            <a:spcBef>
+              <a:spcPct val="0"/>
+            </a:spcBef>
+            <a:spcAft>
+              <a:spcPct val="35000"/>
+            </a:spcAft>
+            <a:buFont typeface="+mj-lt"/>
+            <a:buNone/>
+          </a:pPr>
+          <a:r>
+            <a:rPr lang="en-US" sz="1100" b="0" i="0" kern="1200" dirty="0"/>
+            <a:t>✓</a:t>
+          </a:r>
+          <a:r>
+            <a:rPr lang="en-US" sz="1100" b="1" kern="1200" dirty="0">
+              <a:solidFill>
+                <a:prstClr val="white"/>
+              </a:solidFill>
+              <a:latin typeface="Aptos" panose="02110004020202020204"/>
+              <a:ea typeface="+mn-ea"/>
+              <a:cs typeface="+mn-cs"/>
+            </a:rPr>
+            <a:t> </a:t>
+          </a:r>
+        </a:p>
+      </dgm:t>
+    </dgm:pt>
+    <dgm:pt modelId="{289487A0-EA96-456F-9739-128913BC60F7}" type="parTrans" cxnId="{AF535C3B-733F-49F3-9E7F-F0A993ABA9AF}">
+      <dgm:prSet/>
+      <dgm:spPr/>
+      <dgm:t>
+        <a:bodyPr/>
+        <a:lstStyle/>
+        <a:p>
+          <a:endParaRPr lang="en-US"/>
+        </a:p>
+      </dgm:t>
+    </dgm:pt>
+    <dgm:pt modelId="{4F740DBB-0ACE-4807-A96E-0F8FFB9F6FBF}" type="sibTrans" cxnId="{AF535C3B-733F-49F3-9E7F-F0A993ABA9AF}">
+      <dgm:prSet/>
+      <dgm:spPr/>
+      <dgm:t>
+        <a:bodyPr/>
+        <a:lstStyle/>
+        <a:p>
+          <a:endParaRPr lang="en-US"/>
         </a:p>
       </dgm:t>
     </dgm:pt>
@@ -8025,218 +7815,196 @@
       <dgm:spPr/>
     </dgm:pt>
     <dgm:pt modelId="{A5500CA8-E1AC-4EA2-84FF-778CCAFF54E5}" type="pres">
-      <dgm:prSet presAssocID="{56529125-8434-4C93-921F-7E52EBD6AC44}" presName="Name9" presStyleLbl="parChTrans1D2" presStyleIdx="0" presStyleCnt="9"/>
+      <dgm:prSet presAssocID="{56529125-8434-4C93-921F-7E52EBD6AC44}" presName="Name9" presStyleLbl="parChTrans1D2" presStyleIdx="0" presStyleCnt="7"/>
       <dgm:spPr/>
     </dgm:pt>
     <dgm:pt modelId="{52197289-1EFF-4DFD-8359-D848E03FF289}" type="pres">
-      <dgm:prSet presAssocID="{56529125-8434-4C93-921F-7E52EBD6AC44}" presName="connTx" presStyleLbl="parChTrans1D2" presStyleIdx="0" presStyleCnt="9"/>
+      <dgm:prSet presAssocID="{56529125-8434-4C93-921F-7E52EBD6AC44}" presName="connTx" presStyleLbl="parChTrans1D2" presStyleIdx="0" presStyleCnt="7"/>
       <dgm:spPr/>
     </dgm:pt>
     <dgm:pt modelId="{D641129D-BF39-4F22-BF56-9E2A62EAEF7C}" type="pres">
-      <dgm:prSet presAssocID="{F11269FF-AE4B-4E34-AD0E-37A12D1B3070}" presName="node" presStyleLbl="node1" presStyleIdx="0" presStyleCnt="9">
+      <dgm:prSet presAssocID="{F11269FF-AE4B-4E34-AD0E-37A12D1B3070}" presName="node" presStyleLbl="node1" presStyleIdx="0" presStyleCnt="7">
         <dgm:presLayoutVars>
           <dgm:bulletEnabled val="1"/>
         </dgm:presLayoutVars>
       </dgm:prSet>
       <dgm:spPr/>
     </dgm:pt>
-    <dgm:pt modelId="{3C3F841D-B84E-439D-A70D-DACE222F23B4}" type="pres">
-      <dgm:prSet presAssocID="{4251F846-A5D6-4502-A172-7C452AF5EACD}" presName="Name9" presStyleLbl="parChTrans1D2" presStyleIdx="1" presStyleCnt="9"/>
-      <dgm:spPr/>
-    </dgm:pt>
-    <dgm:pt modelId="{406C70AC-63CB-46A2-A134-1D284C5603F3}" type="pres">
-      <dgm:prSet presAssocID="{4251F846-A5D6-4502-A172-7C452AF5EACD}" presName="connTx" presStyleLbl="parChTrans1D2" presStyleIdx="1" presStyleCnt="9"/>
-      <dgm:spPr/>
-    </dgm:pt>
-    <dgm:pt modelId="{CB79E053-F38E-4A67-BA83-A4800638DD26}" type="pres">
-      <dgm:prSet presAssocID="{D169CF8C-37F4-4D3C-B839-17BE92F2A6E9}" presName="node" presStyleLbl="node1" presStyleIdx="1" presStyleCnt="9">
+    <dgm:pt modelId="{60E69F3E-8134-4538-A3EF-3F6FEA683E0F}" type="pres">
+      <dgm:prSet presAssocID="{AC75B354-EAB7-44F9-A1F5-C819F398FE79}" presName="Name9" presStyleLbl="parChTrans1D2" presStyleIdx="1" presStyleCnt="7"/>
+      <dgm:spPr/>
+    </dgm:pt>
+    <dgm:pt modelId="{6E93971E-9A9F-4D69-AA4E-0592A2D29FE4}" type="pres">
+      <dgm:prSet presAssocID="{AC75B354-EAB7-44F9-A1F5-C819F398FE79}" presName="connTx" presStyleLbl="parChTrans1D2" presStyleIdx="1" presStyleCnt="7"/>
+      <dgm:spPr/>
+    </dgm:pt>
+    <dgm:pt modelId="{C29E633D-FDB3-4A03-AF0D-B36013E3D45B}" type="pres">
+      <dgm:prSet presAssocID="{9276693D-18BD-4E6A-98A8-CD3AC8A0169F}" presName="node" presStyleLbl="node1" presStyleIdx="1" presStyleCnt="7">
         <dgm:presLayoutVars>
           <dgm:bulletEnabled val="1"/>
         </dgm:presLayoutVars>
       </dgm:prSet>
       <dgm:spPr/>
     </dgm:pt>
-    <dgm:pt modelId="{18CBF4D6-765C-4365-B23D-911EEF96DF4B}" type="pres">
-      <dgm:prSet presAssocID="{7E89B98A-1A8B-490B-9141-C5866B0A59E6}" presName="Name9" presStyleLbl="parChTrans1D2" presStyleIdx="2" presStyleCnt="9"/>
-      <dgm:spPr/>
-    </dgm:pt>
-    <dgm:pt modelId="{DCA37DC1-8E0B-4D17-87B9-4DD7390141DB}" type="pres">
-      <dgm:prSet presAssocID="{7E89B98A-1A8B-490B-9141-C5866B0A59E6}" presName="connTx" presStyleLbl="parChTrans1D2" presStyleIdx="2" presStyleCnt="9"/>
-      <dgm:spPr/>
-    </dgm:pt>
-    <dgm:pt modelId="{8726FD26-0446-4A34-A789-F609EFF6B576}" type="pres">
-      <dgm:prSet presAssocID="{EA1DB194-0418-4CBC-A71D-38D26681E52F}" presName="node" presStyleLbl="node1" presStyleIdx="2" presStyleCnt="9">
+    <dgm:pt modelId="{3C3F841D-B84E-439D-A70D-DACE222F23B4}" type="pres">
+      <dgm:prSet presAssocID="{4251F846-A5D6-4502-A172-7C452AF5EACD}" presName="Name9" presStyleLbl="parChTrans1D2" presStyleIdx="2" presStyleCnt="7"/>
+      <dgm:spPr/>
+    </dgm:pt>
+    <dgm:pt modelId="{406C70AC-63CB-46A2-A134-1D284C5603F3}" type="pres">
+      <dgm:prSet presAssocID="{4251F846-A5D6-4502-A172-7C452AF5EACD}" presName="connTx" presStyleLbl="parChTrans1D2" presStyleIdx="2" presStyleCnt="7"/>
+      <dgm:spPr/>
+    </dgm:pt>
+    <dgm:pt modelId="{CB79E053-F38E-4A67-BA83-A4800638DD26}" type="pres">
+      <dgm:prSet presAssocID="{D169CF8C-37F4-4D3C-B839-17BE92F2A6E9}" presName="node" presStyleLbl="node1" presStyleIdx="2" presStyleCnt="7">
         <dgm:presLayoutVars>
           <dgm:bulletEnabled val="1"/>
         </dgm:presLayoutVars>
       </dgm:prSet>
-      <dgm:spPr/>
-    </dgm:pt>
-    <dgm:pt modelId="{A4B0FFB8-DED8-4744-B603-55DEBAECB8CE}" type="pres">
-      <dgm:prSet presAssocID="{3C647417-AC70-4DC2-9A8F-BB36BCFF5FB3}" presName="Name9" presStyleLbl="parChTrans1D2" presStyleIdx="3" presStyleCnt="9"/>
-      <dgm:spPr/>
-    </dgm:pt>
-    <dgm:pt modelId="{D7E68620-8DD9-411B-B5B5-E290D790BC00}" type="pres">
-      <dgm:prSet presAssocID="{3C647417-AC70-4DC2-9A8F-BB36BCFF5FB3}" presName="connTx" presStyleLbl="parChTrans1D2" presStyleIdx="3" presStyleCnt="9"/>
-      <dgm:spPr/>
-    </dgm:pt>
-    <dgm:pt modelId="{3BB251B9-BD13-489B-B206-0E76C451EF7E}" type="pres">
-      <dgm:prSet presAssocID="{B311C7DA-215E-4A76-B9AE-F52C8B8E90BF}" presName="node" presStyleLbl="node1" presStyleIdx="3" presStyleCnt="9">
+      <dgm:spPr>
+        <a:xfrm>
+          <a:off x="5485522" y="548871"/>
+          <a:ext cx="1182304" cy="1182304"/>
+        </a:xfrm>
+        <a:prstGeom prst="ellipse">
+          <a:avLst/>
+        </a:prstGeom>
+      </dgm:spPr>
+    </dgm:pt>
+    <dgm:pt modelId="{21F3E271-E659-4F2A-B5D3-98DDE2FF03DA}" type="pres">
+      <dgm:prSet presAssocID="{50EF01FF-9F4A-44BE-AF75-01ADE32A4BD1}" presName="Name9" presStyleLbl="parChTrans1D2" presStyleIdx="3" presStyleCnt="7"/>
+      <dgm:spPr/>
+    </dgm:pt>
+    <dgm:pt modelId="{AA77F63E-918B-4155-9BFC-21717E1E4A68}" type="pres">
+      <dgm:prSet presAssocID="{50EF01FF-9F4A-44BE-AF75-01ADE32A4BD1}" presName="connTx" presStyleLbl="parChTrans1D2" presStyleIdx="3" presStyleCnt="7"/>
+      <dgm:spPr/>
+    </dgm:pt>
+    <dgm:pt modelId="{381951C3-DC69-4329-A787-F6F20281D3F6}" type="pres">
+      <dgm:prSet presAssocID="{0AAC9302-6561-4DEF-82F8-2F08F6FCB9E7}" presName="node" presStyleLbl="node1" presStyleIdx="3" presStyleCnt="7">
         <dgm:presLayoutVars>
           <dgm:bulletEnabled val="1"/>
         </dgm:presLayoutVars>
       </dgm:prSet>
-      <dgm:spPr/>
-    </dgm:pt>
-    <dgm:pt modelId="{EFE45D1F-EFA7-4252-8882-7D528B4AA36B}" type="pres">
-      <dgm:prSet presAssocID="{839CA1CD-6099-47BB-AEDB-77CADC7B2E5F}" presName="Name9" presStyleLbl="parChTrans1D2" presStyleIdx="4" presStyleCnt="9"/>
-      <dgm:spPr/>
-    </dgm:pt>
-    <dgm:pt modelId="{2DB303AD-3B48-4BF3-802B-A62482607B9F}" type="pres">
-      <dgm:prSet presAssocID="{839CA1CD-6099-47BB-AEDB-77CADC7B2E5F}" presName="connTx" presStyleLbl="parChTrans1D2" presStyleIdx="4" presStyleCnt="9"/>
-      <dgm:spPr/>
-    </dgm:pt>
-    <dgm:pt modelId="{D689BA3C-8DC9-4360-A404-B76D4C638032}" type="pres">
-      <dgm:prSet presAssocID="{96356C93-ACBD-4C98-AC6F-B3EBBAC351C2}" presName="node" presStyleLbl="node1" presStyleIdx="4" presStyleCnt="9">
+      <dgm:spPr>
+        <a:xfrm>
+          <a:off x="5987673" y="3396712"/>
+          <a:ext cx="1182304" cy="1182304"/>
+        </a:xfrm>
+        <a:prstGeom prst="ellipse">
+          <a:avLst/>
+        </a:prstGeom>
+      </dgm:spPr>
+    </dgm:pt>
+    <dgm:pt modelId="{97AB2DA7-3196-4812-85DB-C0730E66FABE}" type="pres">
+      <dgm:prSet presAssocID="{289487A0-EA96-456F-9739-128913BC60F7}" presName="Name9" presStyleLbl="parChTrans1D2" presStyleIdx="4" presStyleCnt="7"/>
+      <dgm:spPr/>
+    </dgm:pt>
+    <dgm:pt modelId="{F5FCA264-2A39-4DAD-9B2A-A854A053E783}" type="pres">
+      <dgm:prSet presAssocID="{289487A0-EA96-456F-9739-128913BC60F7}" presName="connTx" presStyleLbl="parChTrans1D2" presStyleIdx="4" presStyleCnt="7"/>
+      <dgm:spPr/>
+    </dgm:pt>
+    <dgm:pt modelId="{13F65213-867A-4369-9543-F3799FB5E0F8}" type="pres">
+      <dgm:prSet presAssocID="{5F80989D-4BBF-474F-AA54-878ABB0C0F60}" presName="node" presStyleLbl="node1" presStyleIdx="4" presStyleCnt="7">
         <dgm:presLayoutVars>
           <dgm:bulletEnabled val="1"/>
         </dgm:presLayoutVars>
       </dgm:prSet>
-      <dgm:spPr/>
-    </dgm:pt>
-    <dgm:pt modelId="{0B890D38-9A63-42F6-B391-F93CB128C0AE}" type="pres">
-      <dgm:prSet presAssocID="{D0949D85-B545-4504-A7DC-E57327AD8B4D}" presName="Name9" presStyleLbl="parChTrans1D2" presStyleIdx="5" presStyleCnt="9"/>
-      <dgm:spPr/>
-    </dgm:pt>
-    <dgm:pt modelId="{D5893B7E-6692-4C02-8564-ECC24D44F21B}" type="pres">
-      <dgm:prSet presAssocID="{D0949D85-B545-4504-A7DC-E57327AD8B4D}" presName="connTx" presStyleLbl="parChTrans1D2" presStyleIdx="5" presStyleCnt="9"/>
-      <dgm:spPr/>
-    </dgm:pt>
-    <dgm:pt modelId="{01EEE674-D7A4-44BB-95E6-EEE4B45DB353}" type="pres">
-      <dgm:prSet presAssocID="{5AE3CAE3-FE28-43AE-BE4A-8BCBE734CEE7}" presName="node" presStyleLbl="node1" presStyleIdx="5" presStyleCnt="9">
+      <dgm:spPr>
+        <a:xfrm>
+          <a:off x="4808976" y="4385757"/>
+          <a:ext cx="1182304" cy="1182304"/>
+        </a:xfrm>
+        <a:prstGeom prst="ellipse">
+          <a:avLst/>
+        </a:prstGeom>
+      </dgm:spPr>
+    </dgm:pt>
+    <dgm:pt modelId="{18CBF4D6-765C-4365-B23D-911EEF96DF4B}" type="pres">
+      <dgm:prSet presAssocID="{7E89B98A-1A8B-490B-9141-C5866B0A59E6}" presName="Name9" presStyleLbl="parChTrans1D2" presStyleIdx="5" presStyleCnt="7"/>
+      <dgm:spPr/>
+    </dgm:pt>
+    <dgm:pt modelId="{DCA37DC1-8E0B-4D17-87B9-4DD7390141DB}" type="pres">
+      <dgm:prSet presAssocID="{7E89B98A-1A8B-490B-9141-C5866B0A59E6}" presName="connTx" presStyleLbl="parChTrans1D2" presStyleIdx="5" presStyleCnt="7"/>
+      <dgm:spPr/>
+    </dgm:pt>
+    <dgm:pt modelId="{8726FD26-0446-4A34-A789-F609EFF6B576}" type="pres">
+      <dgm:prSet presAssocID="{EA1DB194-0418-4CBC-A71D-38D26681E52F}" presName="node" presStyleLbl="node1" presStyleIdx="5" presStyleCnt="7">
         <dgm:presLayoutVars>
           <dgm:bulletEnabled val="1"/>
         </dgm:presLayoutVars>
       </dgm:prSet>
       <dgm:spPr/>
     </dgm:pt>
-    <dgm:pt modelId="{77D3530B-84AC-4AF5-9D4D-0D2117A63E3D}" type="pres">
-      <dgm:prSet presAssocID="{0053B921-7E42-47BA-B24C-BAB571B37B72}" presName="Name9" presStyleLbl="parChTrans1D2" presStyleIdx="6" presStyleCnt="9"/>
-      <dgm:spPr/>
-    </dgm:pt>
-    <dgm:pt modelId="{4DF5D087-DE94-4E11-B106-613F4AF58AA7}" type="pres">
-      <dgm:prSet presAssocID="{0053B921-7E42-47BA-B24C-BAB571B37B72}" presName="connTx" presStyleLbl="parChTrans1D2" presStyleIdx="6" presStyleCnt="9"/>
-      <dgm:spPr/>
-    </dgm:pt>
-    <dgm:pt modelId="{601EE436-9078-4764-A58D-03556FC85C0E}" type="pres">
-      <dgm:prSet presAssocID="{80F2DED1-F559-4647-8C7A-A03A8EF67DD6}" presName="node" presStyleLbl="node1" presStyleIdx="6" presStyleCnt="9">
+    <dgm:pt modelId="{0B890D38-9A63-42F6-B391-F93CB128C0AE}" type="pres">
+      <dgm:prSet presAssocID="{D0949D85-B545-4504-A7DC-E57327AD8B4D}" presName="Name9" presStyleLbl="parChTrans1D2" presStyleIdx="6" presStyleCnt="7"/>
+      <dgm:spPr/>
+    </dgm:pt>
+    <dgm:pt modelId="{D5893B7E-6692-4C02-8564-ECC24D44F21B}" type="pres">
+      <dgm:prSet presAssocID="{D0949D85-B545-4504-A7DC-E57327AD8B4D}" presName="connTx" presStyleLbl="parChTrans1D2" presStyleIdx="6" presStyleCnt="7"/>
+      <dgm:spPr/>
+    </dgm:pt>
+    <dgm:pt modelId="{01EEE674-D7A4-44BB-95E6-EEE4B45DB353}" type="pres">
+      <dgm:prSet presAssocID="{5AE3CAE3-FE28-43AE-BE4A-8BCBE734CEE7}" presName="node" presStyleLbl="node1" presStyleIdx="6" presStyleCnt="7">
         <dgm:presLayoutVars>
           <dgm:bulletEnabled val="1"/>
         </dgm:presLayoutVars>
       </dgm:prSet>
       <dgm:spPr/>
     </dgm:pt>
-    <dgm:pt modelId="{A65C0F46-E587-4092-997F-FB96F0CDF18F}" type="pres">
-      <dgm:prSet presAssocID="{3CE88A07-8810-4ABE-832C-96C59ACE1645}" presName="Name9" presStyleLbl="parChTrans1D2" presStyleIdx="7" presStyleCnt="9"/>
-      <dgm:spPr/>
-    </dgm:pt>
-    <dgm:pt modelId="{22F44A1F-4693-4E90-8DE4-3158150E7D24}" type="pres">
-      <dgm:prSet presAssocID="{3CE88A07-8810-4ABE-832C-96C59ACE1645}" presName="connTx" presStyleLbl="parChTrans1D2" presStyleIdx="7" presStyleCnt="9"/>
-      <dgm:spPr/>
-    </dgm:pt>
-    <dgm:pt modelId="{1198E2ED-5E7F-476B-8AA1-8FAE860229B8}" type="pres">
-      <dgm:prSet presAssocID="{68BCF387-B8AB-4B21-9D43-D5EDCB05F115}" presName="node" presStyleLbl="node1" presStyleIdx="7" presStyleCnt="9">
-        <dgm:presLayoutVars>
-          <dgm:bulletEnabled val="1"/>
-        </dgm:presLayoutVars>
-      </dgm:prSet>
-      <dgm:spPr/>
-    </dgm:pt>
-    <dgm:pt modelId="{DA526968-C5FA-41DD-A5CF-2F61D26924D2}" type="pres">
-      <dgm:prSet presAssocID="{3964A17D-1F81-4323-A3DE-DECE5C0363A8}" presName="Name9" presStyleLbl="parChTrans1D2" presStyleIdx="8" presStyleCnt="9"/>
-      <dgm:spPr/>
-    </dgm:pt>
-    <dgm:pt modelId="{702C7A52-2DDA-4B97-BFE7-6215896F699F}" type="pres">
-      <dgm:prSet presAssocID="{3964A17D-1F81-4323-A3DE-DECE5C0363A8}" presName="connTx" presStyleLbl="parChTrans1D2" presStyleIdx="8" presStyleCnt="9"/>
-      <dgm:spPr/>
-    </dgm:pt>
-    <dgm:pt modelId="{6D54B3D7-B1BB-468C-B139-A330C534B0A9}" type="pres">
-      <dgm:prSet presAssocID="{295372FF-4ED1-4E94-A8EA-153373A1B235}" presName="node" presStyleLbl="node1" presStyleIdx="8" presStyleCnt="9">
-        <dgm:presLayoutVars>
-          <dgm:bulletEnabled val="1"/>
-        </dgm:presLayoutVars>
-      </dgm:prSet>
-      <dgm:spPr/>
-    </dgm:pt>
   </dgm:ptLst>
   <dgm:cxnLst>
-    <dgm:cxn modelId="{67062F00-1056-4E6B-939E-9E6A12216FDE}" srcId="{A0F00485-747B-48A5-BA46-8B953C12D208}" destId="{EA1DB194-0418-4CBC-A71D-38D26681E52F}" srcOrd="2" destOrd="0" parTransId="{7E89B98A-1A8B-490B-9141-C5866B0A59E6}" sibTransId="{C52DFD15-2C78-4952-8E58-95640A80D599}"/>
-    <dgm:cxn modelId="{E7B96F06-79F9-4AFB-9938-F8B3DA217FC0}" type="presOf" srcId="{80F2DED1-F559-4647-8C7A-A03A8EF67DD6}" destId="{601EE436-9078-4764-A58D-03556FC85C0E}" srcOrd="0" destOrd="0" presId="urn:microsoft.com/office/officeart/2005/8/layout/radial1"/>
-    <dgm:cxn modelId="{6885880A-ADDA-467A-8627-2131CEBA7DFE}" type="presOf" srcId="{839CA1CD-6099-47BB-AEDB-77CADC7B2E5F}" destId="{2DB303AD-3B48-4BF3-802B-A62482607B9F}" srcOrd="1" destOrd="0" presId="urn:microsoft.com/office/officeart/2005/8/layout/radial1"/>
+    <dgm:cxn modelId="{67062F00-1056-4E6B-939E-9E6A12216FDE}" srcId="{A0F00485-747B-48A5-BA46-8B953C12D208}" destId="{EA1DB194-0418-4CBC-A71D-38D26681E52F}" srcOrd="5" destOrd="0" parTransId="{7E89B98A-1A8B-490B-9141-C5866B0A59E6}" sibTransId="{C52DFD15-2C78-4952-8E58-95640A80D599}"/>
     <dgm:cxn modelId="{74F7F50C-38EC-412C-85A8-66ADD63F9E8A}" type="presOf" srcId="{D0949D85-B545-4504-A7DC-E57327AD8B4D}" destId="{0B890D38-9A63-42F6-B391-F93CB128C0AE}" srcOrd="0" destOrd="0" presId="urn:microsoft.com/office/officeart/2005/8/layout/radial1"/>
-    <dgm:cxn modelId="{B80E3621-AE77-4C83-83AF-31DCF1E1BDD1}" type="presOf" srcId="{3C647417-AC70-4DC2-9A8F-BB36BCFF5FB3}" destId="{A4B0FFB8-DED8-4744-B603-55DEBAECB8CE}" srcOrd="0" destOrd="0" presId="urn:microsoft.com/office/officeart/2005/8/layout/radial1"/>
-    <dgm:cxn modelId="{15B63C3B-D207-4C22-A783-A03E4CB2DCD1}" type="presOf" srcId="{295372FF-4ED1-4E94-A8EA-153373A1B235}" destId="{6D54B3D7-B1BB-468C-B139-A330C534B0A9}" srcOrd="0" destOrd="0" presId="urn:microsoft.com/office/officeart/2005/8/layout/radial1"/>
+    <dgm:cxn modelId="{137A1327-7C1B-4AA9-8F9D-0DE11448C333}" type="presOf" srcId="{AC75B354-EAB7-44F9-A1F5-C819F398FE79}" destId="{6E93971E-9A9F-4D69-AA4E-0592A2D29FE4}" srcOrd="1" destOrd="0" presId="urn:microsoft.com/office/officeart/2005/8/layout/radial1"/>
+    <dgm:cxn modelId="{0843ED3A-166A-4CE4-9E2E-8FAA1974E4F7}" type="presOf" srcId="{9276693D-18BD-4E6A-98A8-CD3AC8A0169F}" destId="{C29E633D-FDB3-4A03-AF0D-B36013E3D45B}" srcOrd="0" destOrd="0" presId="urn:microsoft.com/office/officeart/2005/8/layout/radial1"/>
+    <dgm:cxn modelId="{AF535C3B-733F-49F3-9E7F-F0A993ABA9AF}" srcId="{A0F00485-747B-48A5-BA46-8B953C12D208}" destId="{5F80989D-4BBF-474F-AA54-878ABB0C0F60}" srcOrd="4" destOrd="0" parTransId="{289487A0-EA96-456F-9739-128913BC60F7}" sibTransId="{4F740DBB-0ACE-4807-A96E-0F8FFB9F6FBF}"/>
     <dgm:cxn modelId="{F731FB3C-EB1A-437B-9B7E-04D5C44CC693}" type="presOf" srcId="{D0949D85-B545-4504-A7DC-E57327AD8B4D}" destId="{D5893B7E-6692-4C02-8564-ECC24D44F21B}" srcOrd="1" destOrd="0" presId="urn:microsoft.com/office/officeart/2005/8/layout/radial1"/>
     <dgm:cxn modelId="{631CF63D-D9A7-4351-8F3A-F65884BE4A8B}" type="presOf" srcId="{D169CF8C-37F4-4D3C-B839-17BE92F2A6E9}" destId="{CB79E053-F38E-4A67-BA83-A4800638DD26}" srcOrd="0" destOrd="0" presId="urn:microsoft.com/office/officeart/2005/8/layout/radial1"/>
+    <dgm:cxn modelId="{2FE93663-E734-4E8F-88D8-0114ADB80E80}" type="presOf" srcId="{0AAC9302-6561-4DEF-82F8-2F08F6FCB9E7}" destId="{381951C3-DC69-4329-A787-F6F20281D3F6}" srcOrd="0" destOrd="0" presId="urn:microsoft.com/office/officeart/2005/8/layout/radial1"/>
+    <dgm:cxn modelId="{1CFA5964-286E-4BE2-BF23-B83915218287}" srcId="{A0F00485-747B-48A5-BA46-8B953C12D208}" destId="{9276693D-18BD-4E6A-98A8-CD3AC8A0169F}" srcOrd="1" destOrd="0" parTransId="{AC75B354-EAB7-44F9-A1F5-C819F398FE79}" sibTransId="{E4B4EBE0-1E55-4365-8D15-5E47862355C5}"/>
     <dgm:cxn modelId="{CA536666-9866-4CAB-B0D3-987D64C73B58}" type="presOf" srcId="{7E89B98A-1A8B-490B-9141-C5866B0A59E6}" destId="{18CBF4D6-765C-4365-B23D-911EEF96DF4B}" srcOrd="0" destOrd="0" presId="urn:microsoft.com/office/officeart/2005/8/layout/radial1"/>
     <dgm:cxn modelId="{E749D067-C18F-4794-8DC6-F8372A4BDA0F}" type="presOf" srcId="{56529125-8434-4C93-921F-7E52EBD6AC44}" destId="{52197289-1EFF-4DFD-8359-D848E03FF289}" srcOrd="1" destOrd="0" presId="urn:microsoft.com/office/officeart/2005/8/layout/radial1"/>
     <dgm:cxn modelId="{25E46568-C60C-4EE3-B756-B7DC7789C781}" type="presOf" srcId="{F11269FF-AE4B-4E34-AD0E-37A12D1B3070}" destId="{D641129D-BF39-4F22-BF56-9E2A62EAEF7C}" srcOrd="0" destOrd="0" presId="urn:microsoft.com/office/officeart/2005/8/layout/radial1"/>
     <dgm:cxn modelId="{E9205B4C-9F25-4180-89CB-69626C198506}" srcId="{A0F00485-747B-48A5-BA46-8B953C12D208}" destId="{F11269FF-AE4B-4E34-AD0E-37A12D1B3070}" srcOrd="0" destOrd="0" parTransId="{56529125-8434-4C93-921F-7E52EBD6AC44}" sibTransId="{EE5B9790-9664-4327-8F15-126ECF32512B}"/>
-    <dgm:cxn modelId="{8E20D94D-5FAC-421F-8A6E-E3A4EDC2352F}" srcId="{A0F00485-747B-48A5-BA46-8B953C12D208}" destId="{B311C7DA-215E-4A76-B9AE-F52C8B8E90BF}" srcOrd="3" destOrd="0" parTransId="{3C647417-AC70-4DC2-9A8F-BB36BCFF5FB3}" sibTransId="{1C87FBD4-FB80-42D9-A0AC-B96026EFC3D5}"/>
-    <dgm:cxn modelId="{8A875B4F-87B4-43A7-8EF3-B6D99461C7E2}" srcId="{A0F00485-747B-48A5-BA46-8B953C12D208}" destId="{295372FF-4ED1-4E94-A8EA-153373A1B235}" srcOrd="8" destOrd="0" parTransId="{3964A17D-1F81-4323-A3DE-DECE5C0363A8}" sibTransId="{D9D4DB6B-11D3-46A8-B452-1CA437AE55FB}"/>
-    <dgm:cxn modelId="{F25C996F-DC09-4751-9B52-7DF07341E2B8}" type="presOf" srcId="{3CE88A07-8810-4ABE-832C-96C59ACE1645}" destId="{22F44A1F-4693-4E90-8DE4-3158150E7D24}" srcOrd="1" destOrd="0" presId="urn:microsoft.com/office/officeart/2005/8/layout/radial1"/>
-    <dgm:cxn modelId="{7E2B6371-6A06-4A0D-9E22-7DC13CFFDA28}" srcId="{A0F00485-747B-48A5-BA46-8B953C12D208}" destId="{D169CF8C-37F4-4D3C-B839-17BE92F2A6E9}" srcOrd="1" destOrd="0" parTransId="{4251F846-A5D6-4502-A172-7C452AF5EACD}" sibTransId="{CDC99734-453B-4ABC-AD9A-3B662D24AEE7}"/>
-    <dgm:cxn modelId="{08FA4473-0ED7-4D02-B5FD-1F2EA90353A4}" type="presOf" srcId="{96356C93-ACBD-4C98-AC6F-B3EBBAC351C2}" destId="{D689BA3C-8DC9-4360-A404-B76D4C638032}" srcOrd="0" destOrd="0" presId="urn:microsoft.com/office/officeart/2005/8/layout/radial1"/>
-    <dgm:cxn modelId="{6FB98075-3F55-4227-861E-2940F9744A3A}" type="presOf" srcId="{0053B921-7E42-47BA-B24C-BAB571B37B72}" destId="{4DF5D087-DE94-4E11-B106-613F4AF58AA7}" srcOrd="1" destOrd="0" presId="urn:microsoft.com/office/officeart/2005/8/layout/radial1"/>
-    <dgm:cxn modelId="{E3C5C37E-AB62-4B71-A862-DF1856EE275E}" type="presOf" srcId="{3CE88A07-8810-4ABE-832C-96C59ACE1645}" destId="{A65C0F46-E587-4092-997F-FB96F0CDF18F}" srcOrd="0" destOrd="0" presId="urn:microsoft.com/office/officeart/2005/8/layout/radial1"/>
-    <dgm:cxn modelId="{E217CB81-5DB8-4100-9C76-B4D03F8F24C9}" type="presOf" srcId="{3964A17D-1F81-4323-A3DE-DECE5C0363A8}" destId="{DA526968-C5FA-41DD-A5CF-2F61D26924D2}" srcOrd="0" destOrd="0" presId="urn:microsoft.com/office/officeart/2005/8/layout/radial1"/>
+    <dgm:cxn modelId="{7E2B6371-6A06-4A0D-9E22-7DC13CFFDA28}" srcId="{A0F00485-747B-48A5-BA46-8B953C12D208}" destId="{D169CF8C-37F4-4D3C-B839-17BE92F2A6E9}" srcOrd="2" destOrd="0" parTransId="{4251F846-A5D6-4502-A172-7C452AF5EACD}" sibTransId="{CDC99734-453B-4ABC-AD9A-3B662D24AEE7}"/>
+    <dgm:cxn modelId="{54099F74-5011-4E65-ADE7-8C1CD012BB18}" type="presOf" srcId="{289487A0-EA96-456F-9739-128913BC60F7}" destId="{F5FCA264-2A39-4DAD-9B2A-A854A053E783}" srcOrd="1" destOrd="0" presId="urn:microsoft.com/office/officeart/2005/8/layout/radial1"/>
     <dgm:cxn modelId="{4B4DE486-5150-4F19-B654-6B145458E1F0}" type="presOf" srcId="{7E89B98A-1A8B-490B-9141-C5866B0A59E6}" destId="{DCA37DC1-8E0B-4D17-87B9-4DD7390141DB}" srcOrd="1" destOrd="0" presId="urn:microsoft.com/office/officeart/2005/8/layout/radial1"/>
     <dgm:cxn modelId="{DDF88F87-0A6A-4C92-8F08-007063158EB6}" type="presOf" srcId="{5CB66685-683C-4DF0-8AB4-3FD46DD78B5A}" destId="{B282CD55-80AA-4736-94EB-595F4BA0CA63}" srcOrd="0" destOrd="0" presId="urn:microsoft.com/office/officeart/2005/8/layout/radial1"/>
     <dgm:cxn modelId="{F8759987-C014-4D4B-AE6A-8D206C44EA2A}" srcId="{5CB66685-683C-4DF0-8AB4-3FD46DD78B5A}" destId="{A0F00485-747B-48A5-BA46-8B953C12D208}" srcOrd="0" destOrd="0" parTransId="{278E96FD-817D-427D-9B8C-A14E379A75EA}" sibTransId="{B9792CD5-E8CC-48BE-9FC9-AB4A934C8308}"/>
-    <dgm:cxn modelId="{A3F71A89-2148-412D-83A4-BE2E57618CDB}" srcId="{A0F00485-747B-48A5-BA46-8B953C12D208}" destId="{5AE3CAE3-FE28-43AE-BE4A-8BCBE734CEE7}" srcOrd="5" destOrd="0" parTransId="{D0949D85-B545-4504-A7DC-E57327AD8B4D}" sibTransId="{3B4B1124-2A98-45CE-9BA0-523C422B834E}"/>
-    <dgm:cxn modelId="{9A3B0C96-D9DB-40B6-99E1-525B23B9A95C}" type="presOf" srcId="{839CA1CD-6099-47BB-AEDB-77CADC7B2E5F}" destId="{EFE45D1F-EFA7-4252-8882-7D528B4AA36B}" srcOrd="0" destOrd="0" presId="urn:microsoft.com/office/officeart/2005/8/layout/radial1"/>
+    <dgm:cxn modelId="{A3F71A89-2148-412D-83A4-BE2E57618CDB}" srcId="{A0F00485-747B-48A5-BA46-8B953C12D208}" destId="{5AE3CAE3-FE28-43AE-BE4A-8BCBE734CEE7}" srcOrd="6" destOrd="0" parTransId="{D0949D85-B545-4504-A7DC-E57327AD8B4D}" sibTransId="{3B4B1124-2A98-45CE-9BA0-523C422B834E}"/>
+    <dgm:cxn modelId="{88700E97-16E0-4938-905B-E55E140882EA}" type="presOf" srcId="{5F80989D-4BBF-474F-AA54-878ABB0C0F60}" destId="{13F65213-867A-4369-9543-F3799FB5E0F8}" srcOrd="0" destOrd="0" presId="urn:microsoft.com/office/officeart/2005/8/layout/radial1"/>
     <dgm:cxn modelId="{17602798-90A6-40FA-80F7-321490EFA96E}" type="presOf" srcId="{4251F846-A5D6-4502-A172-7C452AF5EACD}" destId="{406C70AC-63CB-46A2-A134-1D284C5603F3}" srcOrd="1" destOrd="0" presId="urn:microsoft.com/office/officeart/2005/8/layout/radial1"/>
-    <dgm:cxn modelId="{F12D559B-3A3B-45BA-873A-99EEBEA08A93}" type="presOf" srcId="{B311C7DA-215E-4A76-B9AE-F52C8B8E90BF}" destId="{3BB251B9-BD13-489B-B206-0E76C451EF7E}" srcOrd="0" destOrd="0" presId="urn:microsoft.com/office/officeart/2005/8/layout/radial1"/>
     <dgm:cxn modelId="{F239029C-BB44-4051-8662-62A1C24B64F9}" type="presOf" srcId="{4251F846-A5D6-4502-A172-7C452AF5EACD}" destId="{3C3F841D-B84E-439D-A70D-DACE222F23B4}" srcOrd="0" destOrd="0" presId="urn:microsoft.com/office/officeart/2005/8/layout/radial1"/>
-    <dgm:cxn modelId="{8E6DD7AE-C758-4258-9BCA-24F5B96E53AE}" type="presOf" srcId="{3C647417-AC70-4DC2-9A8F-BB36BCFF5FB3}" destId="{D7E68620-8DD9-411B-B5B5-E290D790BC00}" srcOrd="1" destOrd="0" presId="urn:microsoft.com/office/officeart/2005/8/layout/radial1"/>
+    <dgm:cxn modelId="{65C4ADA4-6453-4ED0-A99C-2DBF73167821}" type="presOf" srcId="{50EF01FF-9F4A-44BE-AF75-01ADE32A4BD1}" destId="{21F3E271-E659-4F2A-B5D3-98DDE2FF03DA}" srcOrd="0" destOrd="0" presId="urn:microsoft.com/office/officeart/2005/8/layout/radial1"/>
     <dgm:cxn modelId="{7980C2BA-4385-4229-8C4C-7BFA3EC484C4}" type="presOf" srcId="{5AE3CAE3-FE28-43AE-BE4A-8BCBE734CEE7}" destId="{01EEE674-D7A4-44BB-95E6-EEE4B45DB353}" srcOrd="0" destOrd="0" presId="urn:microsoft.com/office/officeart/2005/8/layout/radial1"/>
-    <dgm:cxn modelId="{816DCFC7-5560-4DE9-89BF-7051386D603A}" type="presOf" srcId="{68BCF387-B8AB-4B21-9D43-D5EDCB05F115}" destId="{1198E2ED-5E7F-476B-8AA1-8FAE860229B8}" srcOrd="0" destOrd="0" presId="urn:microsoft.com/office/officeart/2005/8/layout/radial1"/>
-    <dgm:cxn modelId="{78F941CD-5371-4F22-BA6C-E852763FBF76}" type="presOf" srcId="{3964A17D-1F81-4323-A3DE-DECE5C0363A8}" destId="{702C7A52-2DDA-4B97-BFE7-6215896F699F}" srcOrd="1" destOrd="0" presId="urn:microsoft.com/office/officeart/2005/8/layout/radial1"/>
+    <dgm:cxn modelId="{B6B4E5BD-CB8F-477C-BC8E-D303EC1BFED8}" type="presOf" srcId="{50EF01FF-9F4A-44BE-AF75-01ADE32A4BD1}" destId="{AA77F63E-918B-4155-9BFC-21717E1E4A68}" srcOrd="1" destOrd="0" presId="urn:microsoft.com/office/officeart/2005/8/layout/radial1"/>
+    <dgm:cxn modelId="{ACB607CB-1027-46B0-B941-9D6C782BBBC4}" srcId="{A0F00485-747B-48A5-BA46-8B953C12D208}" destId="{0AAC9302-6561-4DEF-82F8-2F08F6FCB9E7}" srcOrd="3" destOrd="0" parTransId="{50EF01FF-9F4A-44BE-AF75-01ADE32A4BD1}" sibTransId="{04F11AFB-DBAA-4145-A497-078B1B896D4E}"/>
     <dgm:cxn modelId="{7DC3A5CD-5750-4815-BC7B-16F263362BF6}" type="presOf" srcId="{56529125-8434-4C93-921F-7E52EBD6AC44}" destId="{A5500CA8-E1AC-4EA2-84FF-778CCAFF54E5}" srcOrd="0" destOrd="0" presId="urn:microsoft.com/office/officeart/2005/8/layout/radial1"/>
-    <dgm:cxn modelId="{F30B57D5-A9E8-4B79-AEB3-6FBA2B3A78F0}" srcId="{A0F00485-747B-48A5-BA46-8B953C12D208}" destId="{68BCF387-B8AB-4B21-9D43-D5EDCB05F115}" srcOrd="7" destOrd="0" parTransId="{3CE88A07-8810-4ABE-832C-96C59ACE1645}" sibTransId="{EDBCF259-D5F0-45A5-A67D-683FB0BAF28E}"/>
-    <dgm:cxn modelId="{94B6B7D6-3BDE-491D-9DB6-A45326E43141}" type="presOf" srcId="{0053B921-7E42-47BA-B24C-BAB571B37B72}" destId="{77D3530B-84AC-4AF5-9D4D-0D2117A63E3D}" srcOrd="0" destOrd="0" presId="urn:microsoft.com/office/officeart/2005/8/layout/radial1"/>
-    <dgm:cxn modelId="{FE7D02E9-647A-447A-B4F9-C25DC0B851AE}" srcId="{A0F00485-747B-48A5-BA46-8B953C12D208}" destId="{96356C93-ACBD-4C98-AC6F-B3EBBAC351C2}" srcOrd="4" destOrd="0" parTransId="{839CA1CD-6099-47BB-AEDB-77CADC7B2E5F}" sibTransId="{5318B47F-548E-4BE3-A234-006B63878B71}"/>
     <dgm:cxn modelId="{1F4E36EB-629A-4707-BE0F-922853D0E6AB}" type="presOf" srcId="{EA1DB194-0418-4CBC-A71D-38D26681E52F}" destId="{8726FD26-0446-4A34-A789-F609EFF6B576}" srcOrd="0" destOrd="0" presId="urn:microsoft.com/office/officeart/2005/8/layout/radial1"/>
-    <dgm:cxn modelId="{E600A6EB-B91F-4B60-B092-9167FD13F009}" srcId="{A0F00485-747B-48A5-BA46-8B953C12D208}" destId="{80F2DED1-F559-4647-8C7A-A03A8EF67DD6}" srcOrd="6" destOrd="0" parTransId="{0053B921-7E42-47BA-B24C-BAB571B37B72}" sibTransId="{5D3CC2AB-FAA9-43AD-87CD-41437ABEFD5D}"/>
+    <dgm:cxn modelId="{62257CF6-EB28-4596-A3BD-5CAD927D9EE5}" type="presOf" srcId="{AC75B354-EAB7-44F9-A1F5-C819F398FE79}" destId="{60E69F3E-8134-4538-A3EF-3F6FEA683E0F}" srcOrd="0" destOrd="0" presId="urn:microsoft.com/office/officeart/2005/8/layout/radial1"/>
     <dgm:cxn modelId="{C53336FA-AFD4-4F26-9007-715281A31F2B}" type="presOf" srcId="{A0F00485-747B-48A5-BA46-8B953C12D208}" destId="{BC0312DF-477E-413D-98D4-5ED43BAC11FB}" srcOrd="0" destOrd="0" presId="urn:microsoft.com/office/officeart/2005/8/layout/radial1"/>
+    <dgm:cxn modelId="{1642A9FE-460C-478B-BB8B-DE1F5792D439}" type="presOf" srcId="{289487A0-EA96-456F-9739-128913BC60F7}" destId="{97AB2DA7-3196-4812-85DB-C0730E66FABE}" srcOrd="0" destOrd="0" presId="urn:microsoft.com/office/officeart/2005/8/layout/radial1"/>
     <dgm:cxn modelId="{D0438EE6-1AAB-43CC-8283-7861108584D6}" type="presParOf" srcId="{B282CD55-80AA-4736-94EB-595F4BA0CA63}" destId="{BC0312DF-477E-413D-98D4-5ED43BAC11FB}" srcOrd="0" destOrd="0" presId="urn:microsoft.com/office/officeart/2005/8/layout/radial1"/>
     <dgm:cxn modelId="{F9B9C0FC-9CC5-492E-A47D-86D9C75887CE}" type="presParOf" srcId="{B282CD55-80AA-4736-94EB-595F4BA0CA63}" destId="{A5500CA8-E1AC-4EA2-84FF-778CCAFF54E5}" srcOrd="1" destOrd="0" presId="urn:microsoft.com/office/officeart/2005/8/layout/radial1"/>
     <dgm:cxn modelId="{920123B3-CFF1-42F5-A910-F684B6BE7113}" type="presParOf" srcId="{A5500CA8-E1AC-4EA2-84FF-778CCAFF54E5}" destId="{52197289-1EFF-4DFD-8359-D848E03FF289}" srcOrd="0" destOrd="0" presId="urn:microsoft.com/office/officeart/2005/8/layout/radial1"/>
     <dgm:cxn modelId="{784693AD-78D7-41B5-8566-D53EF70433CF}" type="presParOf" srcId="{B282CD55-80AA-4736-94EB-595F4BA0CA63}" destId="{D641129D-BF39-4F22-BF56-9E2A62EAEF7C}" srcOrd="2" destOrd="0" presId="urn:microsoft.com/office/officeart/2005/8/layout/radial1"/>
-    <dgm:cxn modelId="{56144FE1-7C44-4652-B318-CA701218618E}" type="presParOf" srcId="{B282CD55-80AA-4736-94EB-595F4BA0CA63}" destId="{3C3F841D-B84E-439D-A70D-DACE222F23B4}" srcOrd="3" destOrd="0" presId="urn:microsoft.com/office/officeart/2005/8/layout/radial1"/>
+    <dgm:cxn modelId="{7D24E3CF-7B13-4AAB-95FA-7A187EDAFE2D}" type="presParOf" srcId="{B282CD55-80AA-4736-94EB-595F4BA0CA63}" destId="{60E69F3E-8134-4538-A3EF-3F6FEA683E0F}" srcOrd="3" destOrd="0" presId="urn:microsoft.com/office/officeart/2005/8/layout/radial1"/>
+    <dgm:cxn modelId="{9BCD2FF2-FB5A-4F99-A4A3-D4AA8FB8574B}" type="presParOf" srcId="{60E69F3E-8134-4538-A3EF-3F6FEA683E0F}" destId="{6E93971E-9A9F-4D69-AA4E-0592A2D29FE4}" srcOrd="0" destOrd="0" presId="urn:microsoft.com/office/officeart/2005/8/layout/radial1"/>
+    <dgm:cxn modelId="{ACEADD76-917A-4C54-9687-8DE7825B9039}" type="presParOf" srcId="{B282CD55-80AA-4736-94EB-595F4BA0CA63}" destId="{C29E633D-FDB3-4A03-AF0D-B36013E3D45B}" srcOrd="4" destOrd="0" presId="urn:microsoft.com/office/officeart/2005/8/layout/radial1"/>
+    <dgm:cxn modelId="{56144FE1-7C44-4652-B318-CA701218618E}" type="presParOf" srcId="{B282CD55-80AA-4736-94EB-595F4BA0CA63}" destId="{3C3F841D-B84E-439D-A70D-DACE222F23B4}" srcOrd="5" destOrd="0" presId="urn:microsoft.com/office/officeart/2005/8/layout/radial1"/>
     <dgm:cxn modelId="{8064F459-1299-41E7-BF8E-AC3E6C939EE8}" type="presParOf" srcId="{3C3F841D-B84E-439D-A70D-DACE222F23B4}" destId="{406C70AC-63CB-46A2-A134-1D284C5603F3}" srcOrd="0" destOrd="0" presId="urn:microsoft.com/office/officeart/2005/8/layout/radial1"/>
-    <dgm:cxn modelId="{BD34191B-F6BF-4EC7-96F0-A0EC510C2A53}" type="presParOf" srcId="{B282CD55-80AA-4736-94EB-595F4BA0CA63}" destId="{CB79E053-F38E-4A67-BA83-A4800638DD26}" srcOrd="4" destOrd="0" presId="urn:microsoft.com/office/officeart/2005/8/layout/radial1"/>
-    <dgm:cxn modelId="{25E8AA2B-66A5-448F-B060-D607A18BDE5F}" type="presParOf" srcId="{B282CD55-80AA-4736-94EB-595F4BA0CA63}" destId="{18CBF4D6-765C-4365-B23D-911EEF96DF4B}" srcOrd="5" destOrd="0" presId="urn:microsoft.com/office/officeart/2005/8/layout/radial1"/>
+    <dgm:cxn modelId="{BD34191B-F6BF-4EC7-96F0-A0EC510C2A53}" type="presParOf" srcId="{B282CD55-80AA-4736-94EB-595F4BA0CA63}" destId="{CB79E053-F38E-4A67-BA83-A4800638DD26}" srcOrd="6" destOrd="0" presId="urn:microsoft.com/office/officeart/2005/8/layout/radial1"/>
+    <dgm:cxn modelId="{FABAA5DE-3C48-4234-BB14-11F3929FE088}" type="presParOf" srcId="{B282CD55-80AA-4736-94EB-595F4BA0CA63}" destId="{21F3E271-E659-4F2A-B5D3-98DDE2FF03DA}" srcOrd="7" destOrd="0" presId="urn:microsoft.com/office/officeart/2005/8/layout/radial1"/>
+    <dgm:cxn modelId="{E423AE49-BC48-4E58-8ED8-CE171F657A2E}" type="presParOf" srcId="{21F3E271-E659-4F2A-B5D3-98DDE2FF03DA}" destId="{AA77F63E-918B-4155-9BFC-21717E1E4A68}" srcOrd="0" destOrd="0" presId="urn:microsoft.com/office/officeart/2005/8/layout/radial1"/>
+    <dgm:cxn modelId="{4706C92A-AFDF-4D00-B3FD-62FDF18DAAFE}" type="presParOf" srcId="{B282CD55-80AA-4736-94EB-595F4BA0CA63}" destId="{381951C3-DC69-4329-A787-F6F20281D3F6}" srcOrd="8" destOrd="0" presId="urn:microsoft.com/office/officeart/2005/8/layout/radial1"/>
+    <dgm:cxn modelId="{5F276127-3C4C-4719-A78B-245D688CF404}" type="presParOf" srcId="{B282CD55-80AA-4736-94EB-595F4BA0CA63}" destId="{97AB2DA7-3196-4812-85DB-C0730E66FABE}" srcOrd="9" destOrd="0" presId="urn:microsoft.com/office/officeart/2005/8/layout/radial1"/>
+    <dgm:cxn modelId="{1E08D3D6-C283-4528-B3F6-B0E597EE4A5E}" type="presParOf" srcId="{97AB2DA7-3196-4812-85DB-C0730E66FABE}" destId="{F5FCA264-2A39-4DAD-9B2A-A854A053E783}" srcOrd="0" destOrd="0" presId="urn:microsoft.com/office/officeart/2005/8/layout/radial1"/>
+    <dgm:cxn modelId="{5402EADA-84D6-44BD-9284-4739557ED8C9}" type="presParOf" srcId="{B282CD55-80AA-4736-94EB-595F4BA0CA63}" destId="{13F65213-867A-4369-9543-F3799FB5E0F8}" srcOrd="10" destOrd="0" presId="urn:microsoft.com/office/officeart/2005/8/layout/radial1"/>
+    <dgm:cxn modelId="{25E8AA2B-66A5-448F-B060-D607A18BDE5F}" type="presParOf" srcId="{B282CD55-80AA-4736-94EB-595F4BA0CA63}" destId="{18CBF4D6-765C-4365-B23D-911EEF96DF4B}" srcOrd="11" destOrd="0" presId="urn:microsoft.com/office/officeart/2005/8/layout/radial1"/>
     <dgm:cxn modelId="{80D6CD37-7E80-4F65-B043-380CB6E66DC7}" type="presParOf" srcId="{18CBF4D6-765C-4365-B23D-911EEF96DF4B}" destId="{DCA37DC1-8E0B-4D17-87B9-4DD7390141DB}" srcOrd="0" destOrd="0" presId="urn:microsoft.com/office/officeart/2005/8/layout/radial1"/>
-    <dgm:cxn modelId="{82B4E223-E9FC-4026-B42B-2AC71A1B09C3}" type="presParOf" srcId="{B282CD55-80AA-4736-94EB-595F4BA0CA63}" destId="{8726FD26-0446-4A34-A789-F609EFF6B576}" srcOrd="6" destOrd="0" presId="urn:microsoft.com/office/officeart/2005/8/layout/radial1"/>
-    <dgm:cxn modelId="{C5BD537A-6D5B-4DF0-8B9C-629CB0E4218D}" type="presParOf" srcId="{B282CD55-80AA-4736-94EB-595F4BA0CA63}" destId="{A4B0FFB8-DED8-4744-B603-55DEBAECB8CE}" srcOrd="7" destOrd="0" presId="urn:microsoft.com/office/officeart/2005/8/layout/radial1"/>
-    <dgm:cxn modelId="{FCC06011-BC36-4FFC-8A9F-F08740C95BFB}" type="presParOf" srcId="{A4B0FFB8-DED8-4744-B603-55DEBAECB8CE}" destId="{D7E68620-8DD9-411B-B5B5-E290D790BC00}" srcOrd="0" destOrd="0" presId="urn:microsoft.com/office/officeart/2005/8/layout/radial1"/>
-    <dgm:cxn modelId="{E5E2336F-D7DE-4D2D-985C-9D35B6B61B4D}" type="presParOf" srcId="{B282CD55-80AA-4736-94EB-595F4BA0CA63}" destId="{3BB251B9-BD13-489B-B206-0E76C451EF7E}" srcOrd="8" destOrd="0" presId="urn:microsoft.com/office/officeart/2005/8/layout/radial1"/>
-    <dgm:cxn modelId="{D86E406E-6E53-4498-8E9A-BA00C588623B}" type="presParOf" srcId="{B282CD55-80AA-4736-94EB-595F4BA0CA63}" destId="{EFE45D1F-EFA7-4252-8882-7D528B4AA36B}" srcOrd="9" destOrd="0" presId="urn:microsoft.com/office/officeart/2005/8/layout/radial1"/>
-    <dgm:cxn modelId="{603D23F2-6598-4286-BA13-86862159268D}" type="presParOf" srcId="{EFE45D1F-EFA7-4252-8882-7D528B4AA36B}" destId="{2DB303AD-3B48-4BF3-802B-A62482607B9F}" srcOrd="0" destOrd="0" presId="urn:microsoft.com/office/officeart/2005/8/layout/radial1"/>
-    <dgm:cxn modelId="{99B06484-57B9-48BF-B4F4-C02610512868}" type="presParOf" srcId="{B282CD55-80AA-4736-94EB-595F4BA0CA63}" destId="{D689BA3C-8DC9-4360-A404-B76D4C638032}" srcOrd="10" destOrd="0" presId="urn:microsoft.com/office/officeart/2005/8/layout/radial1"/>
-    <dgm:cxn modelId="{DEC1566C-FCF0-4668-9E34-65DEF5ABC027}" type="presParOf" srcId="{B282CD55-80AA-4736-94EB-595F4BA0CA63}" destId="{0B890D38-9A63-42F6-B391-F93CB128C0AE}" srcOrd="11" destOrd="0" presId="urn:microsoft.com/office/officeart/2005/8/layout/radial1"/>
+    <dgm:cxn modelId="{82B4E223-E9FC-4026-B42B-2AC71A1B09C3}" type="presParOf" srcId="{B282CD55-80AA-4736-94EB-595F4BA0CA63}" destId="{8726FD26-0446-4A34-A789-F609EFF6B576}" srcOrd="12" destOrd="0" presId="urn:microsoft.com/office/officeart/2005/8/layout/radial1"/>
+    <dgm:cxn modelId="{DEC1566C-FCF0-4668-9E34-65DEF5ABC027}" type="presParOf" srcId="{B282CD55-80AA-4736-94EB-595F4BA0CA63}" destId="{0B890D38-9A63-42F6-B391-F93CB128C0AE}" srcOrd="13" destOrd="0" presId="urn:microsoft.com/office/officeart/2005/8/layout/radial1"/>
     <dgm:cxn modelId="{666DA491-ED13-4981-8288-41E4A9880B50}" type="presParOf" srcId="{0B890D38-9A63-42F6-B391-F93CB128C0AE}" destId="{D5893B7E-6692-4C02-8564-ECC24D44F21B}" srcOrd="0" destOrd="0" presId="urn:microsoft.com/office/officeart/2005/8/layout/radial1"/>
-    <dgm:cxn modelId="{9ED3238D-57A7-42B2-B37A-7CD20883CE24}" type="presParOf" srcId="{B282CD55-80AA-4736-94EB-595F4BA0CA63}" destId="{01EEE674-D7A4-44BB-95E6-EEE4B45DB353}" srcOrd="12" destOrd="0" presId="urn:microsoft.com/office/officeart/2005/8/layout/radial1"/>
-    <dgm:cxn modelId="{6399081B-BF79-4160-90E8-673CB158E1D0}" type="presParOf" srcId="{B282CD55-80AA-4736-94EB-595F4BA0CA63}" destId="{77D3530B-84AC-4AF5-9D4D-0D2117A63E3D}" srcOrd="13" destOrd="0" presId="urn:microsoft.com/office/officeart/2005/8/layout/radial1"/>
-    <dgm:cxn modelId="{0862AC62-81A1-48CD-9A46-D9AB771244D6}" type="presParOf" srcId="{77D3530B-84AC-4AF5-9D4D-0D2117A63E3D}" destId="{4DF5D087-DE94-4E11-B106-613F4AF58AA7}" srcOrd="0" destOrd="0" presId="urn:microsoft.com/office/officeart/2005/8/layout/radial1"/>
-    <dgm:cxn modelId="{9276EA80-1CE0-47FA-BC6D-561FE033DB17}" type="presParOf" srcId="{B282CD55-80AA-4736-94EB-595F4BA0CA63}" destId="{601EE436-9078-4764-A58D-03556FC85C0E}" srcOrd="14" destOrd="0" presId="urn:microsoft.com/office/officeart/2005/8/layout/radial1"/>
-    <dgm:cxn modelId="{A7993A63-05FF-492A-8431-844698D6C62E}" type="presParOf" srcId="{B282CD55-80AA-4736-94EB-595F4BA0CA63}" destId="{A65C0F46-E587-4092-997F-FB96F0CDF18F}" srcOrd="15" destOrd="0" presId="urn:microsoft.com/office/officeart/2005/8/layout/radial1"/>
-    <dgm:cxn modelId="{98D90EDB-AE8D-4422-82B2-254B74A55DA5}" type="presParOf" srcId="{A65C0F46-E587-4092-997F-FB96F0CDF18F}" destId="{22F44A1F-4693-4E90-8DE4-3158150E7D24}" srcOrd="0" destOrd="0" presId="urn:microsoft.com/office/officeart/2005/8/layout/radial1"/>
-    <dgm:cxn modelId="{F57D316C-01A5-4AE8-8C9F-9A9126190C06}" type="presParOf" srcId="{B282CD55-80AA-4736-94EB-595F4BA0CA63}" destId="{1198E2ED-5E7F-476B-8AA1-8FAE860229B8}" srcOrd="16" destOrd="0" presId="urn:microsoft.com/office/officeart/2005/8/layout/radial1"/>
-    <dgm:cxn modelId="{EE51AE11-49E6-44F9-A33A-9CD0AFEC9595}" type="presParOf" srcId="{B282CD55-80AA-4736-94EB-595F4BA0CA63}" destId="{DA526968-C5FA-41DD-A5CF-2F61D26924D2}" srcOrd="17" destOrd="0" presId="urn:microsoft.com/office/officeart/2005/8/layout/radial1"/>
-    <dgm:cxn modelId="{B5F89751-034D-4C20-B0DA-16FA578292E2}" type="presParOf" srcId="{DA526968-C5FA-41DD-A5CF-2F61D26924D2}" destId="{702C7A52-2DDA-4B97-BFE7-6215896F699F}" srcOrd="0" destOrd="0" presId="urn:microsoft.com/office/officeart/2005/8/layout/radial1"/>
-    <dgm:cxn modelId="{095CADFD-7E4E-4152-A039-FFD58EBF5999}" type="presParOf" srcId="{B282CD55-80AA-4736-94EB-595F4BA0CA63}" destId="{6D54B3D7-B1BB-468C-B139-A330C534B0A9}" srcOrd="18" destOrd="0" presId="urn:microsoft.com/office/officeart/2005/8/layout/radial1"/>
+    <dgm:cxn modelId="{9ED3238D-57A7-42B2-B37A-7CD20883CE24}" type="presParOf" srcId="{B282CD55-80AA-4736-94EB-595F4BA0CA63}" destId="{01EEE674-D7A4-44BB-95E6-EEE4B45DB353}" srcOrd="14" destOrd="0" presId="urn:microsoft.com/office/officeart/2005/8/layout/radial1"/>
   </dgm:cxnLst>
   <dgm:bg/>
   <dgm:whole/>
@@ -12149,8 +11917,8 @@
       </dsp:nvSpPr>
       <dsp:spPr>
         <a:xfrm>
-          <a:off x="4039635" y="2272012"/>
-          <a:ext cx="1182304" cy="1182304"/>
+          <a:off x="3910636" y="2182226"/>
+          <a:ext cx="1440302" cy="1440302"/>
         </a:xfrm>
         <a:prstGeom prst="ellipse">
           <a:avLst/>
@@ -12213,8 +11981,8 @@
         </a:p>
       </dsp:txBody>
       <dsp:txXfrm>
-        <a:off x="4212779" y="2445156"/>
-        <a:ext cx="836016" cy="836016"/>
+        <a:off x="4121563" y="2393153"/>
+        <a:ext cx="1018448" cy="1018448"/>
       </dsp:txXfrm>
     </dsp:sp>
     <dsp:sp modelId="{A5500CA8-E1AC-4EA2-84FF-778CCAFF54E5}">
@@ -12224,8 +11992,8 @@
       </dsp:nvSpPr>
       <dsp:spPr>
         <a:xfrm rot="16200000">
-          <a:off x="4097240" y="1726975"/>
-          <a:ext cx="1067095" cy="22978"/>
+          <a:off x="4270054" y="1807497"/>
+          <a:ext cx="721467" cy="27992"/>
         </a:xfrm>
         <a:custGeom>
           <a:avLst/>
@@ -12236,10 +12004,10 @@
           <a:pathLst>
             <a:path>
               <a:moveTo>
-                <a:pt x="0" y="11489"/>
+                <a:pt x="0" y="13996"/>
               </a:moveTo>
               <a:lnTo>
-                <a:pt x="1067095" y="11489"/>
+                <a:pt x="721467" y="13996"/>
               </a:lnTo>
             </a:path>
           </a:pathLst>
@@ -12293,8 +12061,8 @@
         </a:p>
       </dsp:txBody>
       <dsp:txXfrm>
-        <a:off x="4604110" y="1711787"/>
-        <a:ext cx="53354" cy="53354"/>
+        <a:off x="4612751" y="1803456"/>
+        <a:ext cx="36073" cy="36073"/>
       </dsp:txXfrm>
     </dsp:sp>
     <dsp:sp modelId="{D641129D-BF39-4F22-BF56-9E2A62EAEF7C}">
@@ -12304,8 +12072,8 @@
       </dsp:nvSpPr>
       <dsp:spPr>
         <a:xfrm>
-          <a:off x="4039635" y="22612"/>
-          <a:ext cx="1182304" cy="1182304"/>
+          <a:off x="3910636" y="20456"/>
+          <a:ext cx="1440302" cy="1440302"/>
         </a:xfrm>
         <a:prstGeom prst="ellipse">
           <a:avLst/>
@@ -12368,26 +12136,23 @@
             <a:rPr lang="en-US" sz="1100" b="0" i="0" kern="1200" dirty="0"/>
             <a:t>✓</a:t>
           </a:r>
-          <a:r>
-            <a:rPr lang="en-US" sz="1100" b="1" kern="1200" dirty="0"/>
-            <a:t>  </a:t>
-          </a:r>
+          <a:endParaRPr lang="en-US" sz="1100" b="1" kern="1200" dirty="0"/>
         </a:p>
       </dsp:txBody>
       <dsp:txXfrm>
-        <a:off x="4212779" y="195756"/>
-        <a:ext cx="836016" cy="836016"/>
+        <a:off x="4121563" y="231383"/>
+        <a:ext cx="1018448" cy="1018448"/>
       </dsp:txXfrm>
     </dsp:sp>
-    <dsp:sp modelId="{3C3F841D-B84E-439D-A70D-DACE222F23B4}">
+    <dsp:sp modelId="{60E69F3E-8134-4538-A3EF-3F6FEA683E0F}">
       <dsp:nvSpPr>
         <dsp:cNvPr id="0" name=""/>
         <dsp:cNvSpPr/>
       </dsp:nvSpPr>
       <dsp:spPr>
-        <a:xfrm rot="18600000">
-          <a:off x="4820183" y="1990105"/>
-          <a:ext cx="1067095" cy="22978"/>
+        <a:xfrm rot="19285714">
+          <a:off x="5115124" y="2214461"/>
+          <a:ext cx="721467" cy="27992"/>
         </a:xfrm>
         <a:custGeom>
           <a:avLst/>
@@ -12398,10 +12163,10 @@
           <a:pathLst>
             <a:path>
               <a:moveTo>
-                <a:pt x="0" y="11489"/>
+                <a:pt x="0" y="13996"/>
               </a:moveTo>
               <a:lnTo>
-                <a:pt x="1067095" y="11489"/>
+                <a:pt x="721467" y="13996"/>
               </a:lnTo>
             </a:path>
           </a:pathLst>
@@ -12439,6 +12204,183 @@
         </a:bodyPr>
         <a:lstStyle/>
         <a:p>
+          <a:pPr marL="0" lvl="0" indent="0" algn="ctr" defTabSz="222250">
+            <a:lnSpc>
+              <a:spcPct val="90000"/>
+            </a:lnSpc>
+            <a:spcBef>
+              <a:spcPct val="0"/>
+            </a:spcBef>
+            <a:spcAft>
+              <a:spcPct val="35000"/>
+            </a:spcAft>
+            <a:buNone/>
+          </a:pPr>
+          <a:endParaRPr lang="en-US" sz="500" kern="1200"/>
+        </a:p>
+      </dsp:txBody>
+      <dsp:txXfrm>
+        <a:off x="5457821" y="2210420"/>
+        <a:ext cx="36073" cy="36073"/>
+      </dsp:txXfrm>
+    </dsp:sp>
+    <dsp:sp modelId="{C29E633D-FDB3-4A03-AF0D-B36013E3D45B}">
+      <dsp:nvSpPr>
+        <dsp:cNvPr id="0" name=""/>
+        <dsp:cNvSpPr/>
+      </dsp:nvSpPr>
+      <dsp:spPr>
+        <a:xfrm>
+          <a:off x="5600776" y="834385"/>
+          <a:ext cx="1440302" cy="1440302"/>
+        </a:xfrm>
+        <a:prstGeom prst="ellipse">
+          <a:avLst/>
+        </a:prstGeom>
+        <a:solidFill>
+          <a:schemeClr val="accent6"/>
+        </a:solidFill>
+        <a:ln w="19050" cap="flat" cmpd="sng" algn="ctr">
+          <a:solidFill>
+            <a:schemeClr val="lt1">
+              <a:hueOff val="0"/>
+              <a:satOff val="0"/>
+              <a:lumOff val="0"/>
+              <a:alphaOff val="0"/>
+            </a:schemeClr>
+          </a:solidFill>
+          <a:prstDash val="solid"/>
+          <a:miter lim="800000"/>
+        </a:ln>
+        <a:effectLst/>
+      </dsp:spPr>
+      <dsp:style>
+        <a:lnRef idx="2">
+          <a:scrgbClr r="0" g="0" b="0"/>
+        </a:lnRef>
+        <a:fillRef idx="1">
+          <a:scrgbClr r="0" g="0" b="0"/>
+        </a:fillRef>
+        <a:effectRef idx="0">
+          <a:scrgbClr r="0" g="0" b="0"/>
+        </a:effectRef>
+        <a:fontRef idx="minor">
+          <a:schemeClr val="lt1"/>
+        </a:fontRef>
+      </dsp:style>
+      <dsp:txBody>
+        <a:bodyPr spcFirstLastPara="0" vert="horz" wrap="square" lIns="6985" tIns="6985" rIns="6985" bIns="6985" numCol="1" spcCol="1270" anchor="ctr" anchorCtr="0">
+          <a:noAutofit/>
+        </a:bodyPr>
+        <a:lstStyle/>
+        <a:p>
+          <a:pPr marL="0" lvl="0" indent="0" algn="ctr" defTabSz="488950">
+            <a:lnSpc>
+              <a:spcPct val="90000"/>
+            </a:lnSpc>
+            <a:spcBef>
+              <a:spcPct val="0"/>
+            </a:spcBef>
+            <a:spcAft>
+              <a:spcPct val="35000"/>
+            </a:spcAft>
+            <a:buFont typeface="+mj-lt"/>
+            <a:buNone/>
+          </a:pPr>
+          <a:r>
+            <a:rPr lang="en-US" sz="1100" b="1" kern="1200" dirty="0"/>
+            <a:t>5. Loss Budget</a:t>
+          </a:r>
+        </a:p>
+        <a:p>
+          <a:pPr marL="0" lvl="0" indent="0" algn="ctr" defTabSz="488950">
+            <a:lnSpc>
+              <a:spcPct val="90000"/>
+            </a:lnSpc>
+            <a:spcBef>
+              <a:spcPct val="0"/>
+            </a:spcBef>
+            <a:spcAft>
+              <a:spcPct val="35000"/>
+            </a:spcAft>
+            <a:buFont typeface="+mj-lt"/>
+            <a:buNone/>
+          </a:pPr>
+          <a:r>
+            <a:rPr lang="en-US" sz="1100" b="0" i="0" kern="1200" dirty="0"/>
+            <a:t>✓</a:t>
+          </a:r>
+          <a:r>
+            <a:rPr lang="en-US" sz="1100" b="1" kern="1200" dirty="0"/>
+            <a:t> </a:t>
+          </a:r>
+        </a:p>
+      </dsp:txBody>
+      <dsp:txXfrm>
+        <a:off x="5811703" y="1045312"/>
+        <a:ext cx="1018448" cy="1018448"/>
+      </dsp:txXfrm>
+    </dsp:sp>
+    <dsp:sp modelId="{3C3F841D-B84E-439D-A70D-DACE222F23B4}">
+      <dsp:nvSpPr>
+        <dsp:cNvPr id="0" name=""/>
+        <dsp:cNvSpPr/>
+      </dsp:nvSpPr>
+      <dsp:spPr>
+        <a:xfrm rot="771429">
+          <a:off x="5323839" y="3128901"/>
+          <a:ext cx="721467" cy="27992"/>
+        </a:xfrm>
+        <a:custGeom>
+          <a:avLst/>
+          <a:gdLst/>
+          <a:ahLst/>
+          <a:cxnLst/>
+          <a:rect l="0" t="0" r="0" b="0"/>
+          <a:pathLst>
+            <a:path>
+              <a:moveTo>
+                <a:pt x="0" y="13996"/>
+              </a:moveTo>
+              <a:lnTo>
+                <a:pt x="721467" y="13996"/>
+              </a:lnTo>
+            </a:path>
+          </a:pathLst>
+        </a:custGeom>
+        <a:noFill/>
+        <a:ln w="19050" cap="flat" cmpd="sng" algn="ctr">
+          <a:solidFill>
+            <a:schemeClr val="accent5">
+              <a:hueOff val="0"/>
+              <a:satOff val="0"/>
+              <a:lumOff val="0"/>
+              <a:alphaOff val="0"/>
+            </a:schemeClr>
+          </a:solidFill>
+          <a:prstDash val="solid"/>
+          <a:miter lim="800000"/>
+        </a:ln>
+        <a:effectLst/>
+      </dsp:spPr>
+      <dsp:style>
+        <a:lnRef idx="2">
+          <a:scrgbClr r="0" g="0" b="0"/>
+        </a:lnRef>
+        <a:fillRef idx="0">
+          <a:scrgbClr r="0" g="0" b="0"/>
+        </a:fillRef>
+        <a:effectRef idx="0">
+          <a:scrgbClr r="0" g="0" b="0"/>
+        </a:effectRef>
+        <a:fontRef idx="minor"/>
+      </dsp:style>
+      <dsp:txBody>
+        <a:bodyPr spcFirstLastPara="0" vert="horz" wrap="square" lIns="12700" tIns="0" rIns="12700" bIns="0" numCol="1" spcCol="1270" anchor="ctr" anchorCtr="0">
+          <a:noAutofit/>
+        </a:bodyPr>
+        <a:lstStyle/>
+        <a:p>
           <a:pPr marL="0" lvl="0" indent="0" algn="ctr" defTabSz="466725">
             <a:lnSpc>
               <a:spcPct val="90000"/>
@@ -12455,8 +12397,8 @@
         </a:p>
       </dsp:txBody>
       <dsp:txXfrm>
-        <a:off x="5327053" y="1974916"/>
-        <a:ext cx="53354" cy="53354"/>
+        <a:off x="5666536" y="3124861"/>
+        <a:ext cx="36073" cy="36073"/>
       </dsp:txXfrm>
     </dsp:sp>
     <dsp:sp modelId="{CB79E053-F38E-4A67-BA83-A4800638DD26}">
@@ -12466,8 +12408,578 @@
       </dsp:nvSpPr>
       <dsp:spPr>
         <a:xfrm>
-          <a:off x="5485522" y="548871"/>
-          <a:ext cx="1182304" cy="1182304"/>
+          <a:off x="6018206" y="2663266"/>
+          <a:ext cx="1440302" cy="1440302"/>
+        </a:xfrm>
+        <a:prstGeom prst="ellipse">
+          <a:avLst/>
+        </a:prstGeom>
+        <a:solidFill>
+          <a:srgbClr val="4EA72E"/>
+        </a:solidFill>
+        <a:ln w="19050" cap="flat" cmpd="sng" algn="ctr">
+          <a:solidFill>
+            <a:prstClr val="white">
+              <a:hueOff val="0"/>
+              <a:satOff val="0"/>
+              <a:lumOff val="0"/>
+              <a:alphaOff val="0"/>
+            </a:prstClr>
+          </a:solidFill>
+          <a:prstDash val="solid"/>
+          <a:miter lim="800000"/>
+        </a:ln>
+        <a:effectLst/>
+      </dsp:spPr>
+      <dsp:style>
+        <a:lnRef idx="2">
+          <a:scrgbClr r="0" g="0" b="0"/>
+        </a:lnRef>
+        <a:fillRef idx="1">
+          <a:scrgbClr r="0" g="0" b="0"/>
+        </a:fillRef>
+        <a:effectRef idx="0">
+          <a:scrgbClr r="0" g="0" b="0"/>
+        </a:effectRef>
+        <a:fontRef idx="minor">
+          <a:schemeClr val="lt1"/>
+        </a:fontRef>
+      </dsp:style>
+      <dsp:txBody>
+        <a:bodyPr spcFirstLastPara="0" vert="horz" wrap="square" lIns="6985" tIns="6985" rIns="6985" bIns="6985" numCol="1" spcCol="1270" anchor="ctr" anchorCtr="0">
+          <a:noAutofit/>
+        </a:bodyPr>
+        <a:lstStyle/>
+        <a:p>
+          <a:pPr marL="0" lvl="0" indent="0" algn="ctr" defTabSz="488950">
+            <a:lnSpc>
+              <a:spcPct val="90000"/>
+            </a:lnSpc>
+            <a:spcBef>
+              <a:spcPct val="0"/>
+            </a:spcBef>
+            <a:spcAft>
+              <a:spcPct val="35000"/>
+            </a:spcAft>
+            <a:buFont typeface="+mj-lt"/>
+            <a:buNone/>
+          </a:pPr>
+          <a:r>
+            <a:rPr lang="en-US" sz="1100" b="1" kern="1200" dirty="0">
+              <a:solidFill>
+                <a:prstClr val="white"/>
+              </a:solidFill>
+              <a:latin typeface="Aptos" panose="02110004020202020204"/>
+              <a:ea typeface="+mn-ea"/>
+              <a:cs typeface="+mn-cs"/>
+            </a:rPr>
+            <a:t>2. Dynamic Range</a:t>
+          </a:r>
+        </a:p>
+        <a:p>
+          <a:pPr marL="0" lvl="0" indent="0" algn="ctr" defTabSz="488950">
+            <a:lnSpc>
+              <a:spcPct val="90000"/>
+            </a:lnSpc>
+            <a:spcBef>
+              <a:spcPct val="0"/>
+            </a:spcBef>
+            <a:spcAft>
+              <a:spcPct val="35000"/>
+            </a:spcAft>
+            <a:buFont typeface="+mj-lt"/>
+            <a:buNone/>
+          </a:pPr>
+          <a:r>
+            <a:rPr lang="en-US" sz="1100" b="0" i="0" kern="1200" dirty="0"/>
+            <a:t>✓</a:t>
+          </a:r>
+          <a:r>
+            <a:rPr lang="en-US" sz="1100" b="1" kern="1200" dirty="0">
+              <a:solidFill>
+                <a:prstClr val="white"/>
+              </a:solidFill>
+              <a:latin typeface="Aptos" panose="02110004020202020204"/>
+              <a:ea typeface="+mn-ea"/>
+              <a:cs typeface="+mn-cs"/>
+            </a:rPr>
+            <a:t> </a:t>
+          </a:r>
+        </a:p>
+      </dsp:txBody>
+      <dsp:txXfrm>
+        <a:off x="6229133" y="2874193"/>
+        <a:ext cx="1018448" cy="1018448"/>
+      </dsp:txXfrm>
+    </dsp:sp>
+    <dsp:sp modelId="{21F3E271-E659-4F2A-B5D3-98DDE2FF03DA}">
+      <dsp:nvSpPr>
+        <dsp:cNvPr id="0" name=""/>
+        <dsp:cNvSpPr/>
+      </dsp:nvSpPr>
+      <dsp:spPr>
+        <a:xfrm rot="3857143">
+          <a:off x="4739032" y="3862225"/>
+          <a:ext cx="721467" cy="27992"/>
+        </a:xfrm>
+        <a:custGeom>
+          <a:avLst/>
+          <a:gdLst/>
+          <a:ahLst/>
+          <a:cxnLst/>
+          <a:rect l="0" t="0" r="0" b="0"/>
+          <a:pathLst>
+            <a:path>
+              <a:moveTo>
+                <a:pt x="0" y="13996"/>
+              </a:moveTo>
+              <a:lnTo>
+                <a:pt x="721467" y="13996"/>
+              </a:lnTo>
+            </a:path>
+          </a:pathLst>
+        </a:custGeom>
+        <a:noFill/>
+        <a:ln w="19050" cap="flat" cmpd="sng" algn="ctr">
+          <a:solidFill>
+            <a:schemeClr val="accent5">
+              <a:hueOff val="0"/>
+              <a:satOff val="0"/>
+              <a:lumOff val="0"/>
+              <a:alphaOff val="0"/>
+            </a:schemeClr>
+          </a:solidFill>
+          <a:prstDash val="solid"/>
+          <a:miter lim="800000"/>
+        </a:ln>
+        <a:effectLst/>
+      </dsp:spPr>
+      <dsp:style>
+        <a:lnRef idx="2">
+          <a:scrgbClr r="0" g="0" b="0"/>
+        </a:lnRef>
+        <a:fillRef idx="0">
+          <a:scrgbClr r="0" g="0" b="0"/>
+        </a:fillRef>
+        <a:effectRef idx="0">
+          <a:scrgbClr r="0" g="0" b="0"/>
+        </a:effectRef>
+        <a:fontRef idx="minor"/>
+      </dsp:style>
+      <dsp:txBody>
+        <a:bodyPr spcFirstLastPara="0" vert="horz" wrap="square" lIns="12700" tIns="0" rIns="12700" bIns="0" numCol="1" spcCol="1270" anchor="ctr" anchorCtr="0">
+          <a:noAutofit/>
+        </a:bodyPr>
+        <a:lstStyle/>
+        <a:p>
+          <a:pPr marL="0" lvl="0" indent="0" algn="ctr" defTabSz="222250">
+            <a:lnSpc>
+              <a:spcPct val="90000"/>
+            </a:lnSpc>
+            <a:spcBef>
+              <a:spcPct val="0"/>
+            </a:spcBef>
+            <a:spcAft>
+              <a:spcPct val="35000"/>
+            </a:spcAft>
+            <a:buNone/>
+          </a:pPr>
+          <a:endParaRPr lang="en-US" sz="500" kern="1200"/>
+        </a:p>
+      </dsp:txBody>
+      <dsp:txXfrm>
+        <a:off x="5081729" y="3858185"/>
+        <a:ext cx="36073" cy="36073"/>
+      </dsp:txXfrm>
+    </dsp:sp>
+    <dsp:sp modelId="{381951C3-DC69-4329-A787-F6F20281D3F6}">
+      <dsp:nvSpPr>
+        <dsp:cNvPr id="0" name=""/>
+        <dsp:cNvSpPr/>
+      </dsp:nvSpPr>
+      <dsp:spPr>
+        <a:xfrm>
+          <a:off x="4848593" y="4129914"/>
+          <a:ext cx="1440302" cy="1440302"/>
+        </a:xfrm>
+        <a:prstGeom prst="ellipse">
+          <a:avLst/>
+        </a:prstGeom>
+        <a:solidFill>
+          <a:srgbClr val="4EA72E"/>
+        </a:solidFill>
+        <a:ln w="19050" cap="flat" cmpd="sng" algn="ctr">
+          <a:solidFill>
+            <a:prstClr val="white">
+              <a:hueOff val="0"/>
+              <a:satOff val="0"/>
+              <a:lumOff val="0"/>
+              <a:alphaOff val="0"/>
+            </a:prstClr>
+          </a:solidFill>
+          <a:prstDash val="solid"/>
+          <a:miter lim="800000"/>
+        </a:ln>
+        <a:effectLst/>
+      </dsp:spPr>
+      <dsp:style>
+        <a:lnRef idx="2">
+          <a:scrgbClr r="0" g="0" b="0"/>
+        </a:lnRef>
+        <a:fillRef idx="1">
+          <a:scrgbClr r="0" g="0" b="0"/>
+        </a:fillRef>
+        <a:effectRef idx="0">
+          <a:scrgbClr r="0" g="0" b="0"/>
+        </a:effectRef>
+        <a:fontRef idx="minor">
+          <a:schemeClr val="lt1"/>
+        </a:fontRef>
+      </dsp:style>
+      <dsp:txBody>
+        <a:bodyPr spcFirstLastPara="0" vert="horz" wrap="square" lIns="6985" tIns="6985" rIns="6985" bIns="6985" numCol="1" spcCol="1270" anchor="ctr" anchorCtr="0">
+          <a:noAutofit/>
+        </a:bodyPr>
+        <a:lstStyle/>
+        <a:p>
+          <a:pPr marL="0" lvl="0" indent="0" algn="ctr" defTabSz="488950">
+            <a:lnSpc>
+              <a:spcPct val="90000"/>
+            </a:lnSpc>
+            <a:spcBef>
+              <a:spcPct val="0"/>
+            </a:spcBef>
+            <a:spcAft>
+              <a:spcPct val="35000"/>
+            </a:spcAft>
+            <a:buFont typeface="+mj-lt"/>
+            <a:buNone/>
+          </a:pPr>
+          <a:r>
+            <a:rPr lang="en-US" sz="1100" b="1" kern="1200" dirty="0">
+              <a:solidFill>
+                <a:prstClr val="white"/>
+              </a:solidFill>
+              <a:latin typeface="Aptos" panose="02110004020202020204"/>
+              <a:ea typeface="+mn-ea"/>
+              <a:cs typeface="+mn-cs"/>
+            </a:rPr>
+            <a:t>4. Fidelity</a:t>
+          </a:r>
+        </a:p>
+        <a:p>
+          <a:pPr marL="0" lvl="0" indent="0" algn="ctr" defTabSz="488950">
+            <a:lnSpc>
+              <a:spcPct val="90000"/>
+            </a:lnSpc>
+            <a:spcBef>
+              <a:spcPct val="0"/>
+            </a:spcBef>
+            <a:spcAft>
+              <a:spcPct val="35000"/>
+            </a:spcAft>
+            <a:buFont typeface="+mj-lt"/>
+            <a:buNone/>
+          </a:pPr>
+          <a:r>
+            <a:rPr lang="en-US" sz="1100" b="0" i="0" kern="1200" dirty="0"/>
+            <a:t>✓</a:t>
+          </a:r>
+          <a:endParaRPr lang="en-US" sz="1100" b="1" kern="1200" dirty="0">
+            <a:solidFill>
+              <a:prstClr val="white"/>
+            </a:solidFill>
+            <a:latin typeface="Aptos" panose="02110004020202020204"/>
+            <a:ea typeface="+mn-ea"/>
+            <a:cs typeface="+mn-cs"/>
+          </a:endParaRPr>
+        </a:p>
+      </dsp:txBody>
+      <dsp:txXfrm>
+        <a:off x="5059520" y="4340841"/>
+        <a:ext cx="1018448" cy="1018448"/>
+      </dsp:txXfrm>
+    </dsp:sp>
+    <dsp:sp modelId="{97AB2DA7-3196-4812-85DB-C0730E66FABE}">
+      <dsp:nvSpPr>
+        <dsp:cNvPr id="0" name=""/>
+        <dsp:cNvSpPr/>
+      </dsp:nvSpPr>
+      <dsp:spPr>
+        <a:xfrm rot="6942857">
+          <a:off x="3801075" y="3862225"/>
+          <a:ext cx="721467" cy="27992"/>
+        </a:xfrm>
+        <a:custGeom>
+          <a:avLst/>
+          <a:gdLst/>
+          <a:ahLst/>
+          <a:cxnLst/>
+          <a:rect l="0" t="0" r="0" b="0"/>
+          <a:pathLst>
+            <a:path>
+              <a:moveTo>
+                <a:pt x="0" y="13996"/>
+              </a:moveTo>
+              <a:lnTo>
+                <a:pt x="721467" y="13996"/>
+              </a:lnTo>
+            </a:path>
+          </a:pathLst>
+        </a:custGeom>
+        <a:noFill/>
+        <a:ln w="19050" cap="flat" cmpd="sng" algn="ctr">
+          <a:solidFill>
+            <a:schemeClr val="accent5">
+              <a:hueOff val="0"/>
+              <a:satOff val="0"/>
+              <a:lumOff val="0"/>
+              <a:alphaOff val="0"/>
+            </a:schemeClr>
+          </a:solidFill>
+          <a:prstDash val="solid"/>
+          <a:miter lim="800000"/>
+        </a:ln>
+        <a:effectLst/>
+      </dsp:spPr>
+      <dsp:style>
+        <a:lnRef idx="2">
+          <a:scrgbClr r="0" g="0" b="0"/>
+        </a:lnRef>
+        <a:fillRef idx="0">
+          <a:scrgbClr r="0" g="0" b="0"/>
+        </a:fillRef>
+        <a:effectRef idx="0">
+          <a:scrgbClr r="0" g="0" b="0"/>
+        </a:effectRef>
+        <a:fontRef idx="minor"/>
+      </dsp:style>
+      <dsp:txBody>
+        <a:bodyPr spcFirstLastPara="0" vert="horz" wrap="square" lIns="12700" tIns="0" rIns="12700" bIns="0" numCol="1" spcCol="1270" anchor="ctr" anchorCtr="0">
+          <a:noAutofit/>
+        </a:bodyPr>
+        <a:lstStyle/>
+        <a:p>
+          <a:pPr marL="0" lvl="0" indent="0" algn="ctr" defTabSz="222250">
+            <a:lnSpc>
+              <a:spcPct val="90000"/>
+            </a:lnSpc>
+            <a:spcBef>
+              <a:spcPct val="0"/>
+            </a:spcBef>
+            <a:spcAft>
+              <a:spcPct val="35000"/>
+            </a:spcAft>
+            <a:buNone/>
+          </a:pPr>
+          <a:endParaRPr lang="en-US" sz="500" kern="1200"/>
+        </a:p>
+      </dsp:txBody>
+      <dsp:txXfrm rot="10800000">
+        <a:off x="4143772" y="3858185"/>
+        <a:ext cx="36073" cy="36073"/>
+      </dsp:txXfrm>
+    </dsp:sp>
+    <dsp:sp modelId="{13F65213-867A-4369-9543-F3799FB5E0F8}">
+      <dsp:nvSpPr>
+        <dsp:cNvPr id="0" name=""/>
+        <dsp:cNvSpPr/>
+      </dsp:nvSpPr>
+      <dsp:spPr>
+        <a:xfrm>
+          <a:off x="2972679" y="4129914"/>
+          <a:ext cx="1440302" cy="1440302"/>
+        </a:xfrm>
+        <a:prstGeom prst="ellipse">
+          <a:avLst/>
+        </a:prstGeom>
+        <a:solidFill>
+          <a:srgbClr val="4EA72E"/>
+        </a:solidFill>
+        <a:ln w="19050" cap="flat" cmpd="sng" algn="ctr">
+          <a:solidFill>
+            <a:prstClr val="white">
+              <a:hueOff val="0"/>
+              <a:satOff val="0"/>
+              <a:lumOff val="0"/>
+              <a:alphaOff val="0"/>
+            </a:prstClr>
+          </a:solidFill>
+          <a:prstDash val="solid"/>
+          <a:miter lim="800000"/>
+        </a:ln>
+        <a:effectLst/>
+      </dsp:spPr>
+      <dsp:style>
+        <a:lnRef idx="2">
+          <a:scrgbClr r="0" g="0" b="0"/>
+        </a:lnRef>
+        <a:fillRef idx="1">
+          <a:scrgbClr r="0" g="0" b="0"/>
+        </a:fillRef>
+        <a:effectRef idx="0">
+          <a:scrgbClr r="0" g="0" b="0"/>
+        </a:effectRef>
+        <a:fontRef idx="minor">
+          <a:schemeClr val="lt1"/>
+        </a:fontRef>
+      </dsp:style>
+      <dsp:txBody>
+        <a:bodyPr spcFirstLastPara="0" vert="horz" wrap="square" lIns="6985" tIns="6985" rIns="6985" bIns="6985" numCol="1" spcCol="1270" anchor="ctr" anchorCtr="0">
+          <a:noAutofit/>
+        </a:bodyPr>
+        <a:lstStyle/>
+        <a:p>
+          <a:pPr marL="0" lvl="0" indent="0" algn="ctr" defTabSz="488950">
+            <a:lnSpc>
+              <a:spcPct val="90000"/>
+            </a:lnSpc>
+            <a:spcBef>
+              <a:spcPct val="0"/>
+            </a:spcBef>
+            <a:spcAft>
+              <a:spcPct val="35000"/>
+            </a:spcAft>
+            <a:buFont typeface="+mj-lt"/>
+            <a:buNone/>
+          </a:pPr>
+          <a:r>
+            <a:rPr lang="en-US" sz="1100" b="1" kern="1200" dirty="0">
+              <a:solidFill>
+                <a:prstClr val="white"/>
+              </a:solidFill>
+              <a:latin typeface="Aptos" panose="02110004020202020204"/>
+              <a:ea typeface="+mn-ea"/>
+              <a:cs typeface="+mn-cs"/>
+            </a:rPr>
+            <a:t>7. Cross Talk</a:t>
+          </a:r>
+        </a:p>
+        <a:p>
+          <a:pPr marL="0" lvl="0" indent="0" algn="ctr" defTabSz="488950">
+            <a:lnSpc>
+              <a:spcPct val="90000"/>
+            </a:lnSpc>
+            <a:spcBef>
+              <a:spcPct val="0"/>
+            </a:spcBef>
+            <a:spcAft>
+              <a:spcPct val="35000"/>
+            </a:spcAft>
+            <a:buFont typeface="+mj-lt"/>
+            <a:buNone/>
+          </a:pPr>
+          <a:r>
+            <a:rPr lang="en-US" sz="1100" b="0" i="0" kern="1200" dirty="0"/>
+            <a:t>✓</a:t>
+          </a:r>
+          <a:r>
+            <a:rPr lang="en-US" sz="1100" b="1" kern="1200" dirty="0">
+              <a:solidFill>
+                <a:prstClr val="white"/>
+              </a:solidFill>
+              <a:latin typeface="Aptos" panose="02110004020202020204"/>
+              <a:ea typeface="+mn-ea"/>
+              <a:cs typeface="+mn-cs"/>
+            </a:rPr>
+            <a:t> </a:t>
+          </a:r>
+        </a:p>
+      </dsp:txBody>
+      <dsp:txXfrm>
+        <a:off x="3183606" y="4340841"/>
+        <a:ext cx="1018448" cy="1018448"/>
+      </dsp:txXfrm>
+    </dsp:sp>
+    <dsp:sp modelId="{18CBF4D6-765C-4365-B23D-911EEF96DF4B}">
+      <dsp:nvSpPr>
+        <dsp:cNvPr id="0" name=""/>
+        <dsp:cNvSpPr/>
+      </dsp:nvSpPr>
+      <dsp:spPr>
+        <a:xfrm rot="10028571">
+          <a:off x="3216269" y="3128901"/>
+          <a:ext cx="721467" cy="27992"/>
+        </a:xfrm>
+        <a:custGeom>
+          <a:avLst/>
+          <a:gdLst/>
+          <a:ahLst/>
+          <a:cxnLst/>
+          <a:rect l="0" t="0" r="0" b="0"/>
+          <a:pathLst>
+            <a:path>
+              <a:moveTo>
+                <a:pt x="0" y="13996"/>
+              </a:moveTo>
+              <a:lnTo>
+                <a:pt x="721467" y="13996"/>
+              </a:lnTo>
+            </a:path>
+          </a:pathLst>
+        </a:custGeom>
+        <a:noFill/>
+        <a:ln w="19050" cap="flat" cmpd="sng" algn="ctr">
+          <a:solidFill>
+            <a:schemeClr val="accent5">
+              <a:hueOff val="0"/>
+              <a:satOff val="0"/>
+              <a:lumOff val="0"/>
+              <a:alphaOff val="0"/>
+            </a:schemeClr>
+          </a:solidFill>
+          <a:prstDash val="solid"/>
+          <a:miter lim="800000"/>
+        </a:ln>
+        <a:effectLst/>
+      </dsp:spPr>
+      <dsp:style>
+        <a:lnRef idx="2">
+          <a:scrgbClr r="0" g="0" b="0"/>
+        </a:lnRef>
+        <a:fillRef idx="0">
+          <a:scrgbClr r="0" g="0" b="0"/>
+        </a:fillRef>
+        <a:effectRef idx="0">
+          <a:scrgbClr r="0" g="0" b="0"/>
+        </a:effectRef>
+        <a:fontRef idx="minor"/>
+      </dsp:style>
+      <dsp:txBody>
+        <a:bodyPr spcFirstLastPara="0" vert="horz" wrap="square" lIns="12700" tIns="0" rIns="12700" bIns="0" numCol="1" spcCol="1270" anchor="ctr" anchorCtr="0">
+          <a:noAutofit/>
+        </a:bodyPr>
+        <a:lstStyle/>
+        <a:p>
+          <a:pPr marL="0" lvl="0" indent="0" algn="ctr" defTabSz="466725">
+            <a:lnSpc>
+              <a:spcPct val="90000"/>
+            </a:lnSpc>
+            <a:spcBef>
+              <a:spcPct val="0"/>
+            </a:spcBef>
+            <a:spcAft>
+              <a:spcPct val="35000"/>
+            </a:spcAft>
+            <a:buNone/>
+          </a:pPr>
+          <a:endParaRPr lang="en-US" sz="1050" b="1" kern="1200"/>
+        </a:p>
+      </dsp:txBody>
+      <dsp:txXfrm rot="10800000">
+        <a:off x="3558966" y="3124861"/>
+        <a:ext cx="36073" cy="36073"/>
+      </dsp:txXfrm>
+    </dsp:sp>
+    <dsp:sp modelId="{8726FD26-0446-4A34-A789-F609EFF6B576}">
+      <dsp:nvSpPr>
+        <dsp:cNvPr id="0" name=""/>
+        <dsp:cNvSpPr/>
+      </dsp:nvSpPr>
+      <dsp:spPr>
+        <a:xfrm>
+          <a:off x="1803066" y="2663266"/>
+          <a:ext cx="1440302" cy="1440302"/>
         </a:xfrm>
         <a:prstGeom prst="ellipse">
           <a:avLst/>
@@ -12526,24 +13038,24 @@
           </a:pPr>
           <a:r>
             <a:rPr lang="en-US" sz="1100" b="1" kern="1200" dirty="0"/>
-            <a:t>2. Dynamic Range </a:t>
+            <a:t>3. Frequency Response </a:t>
           </a:r>
         </a:p>
       </dsp:txBody>
       <dsp:txXfrm>
-        <a:off x="5658666" y="722015"/>
-        <a:ext cx="836016" cy="836016"/>
+        <a:off x="2013993" y="2874193"/>
+        <a:ext cx="1018448" cy="1018448"/>
       </dsp:txXfrm>
     </dsp:sp>
-    <dsp:sp modelId="{18CBF4D6-765C-4365-B23D-911EEF96DF4B}">
+    <dsp:sp modelId="{0B890D38-9A63-42F6-B391-F93CB128C0AE}">
       <dsp:nvSpPr>
         <dsp:cNvPr id="0" name=""/>
         <dsp:cNvSpPr/>
       </dsp:nvSpPr>
       <dsp:spPr>
-        <a:xfrm rot="21000000">
-          <a:off x="5204853" y="2656373"/>
-          <a:ext cx="1067095" cy="22978"/>
+        <a:xfrm rot="13114286">
+          <a:off x="3424984" y="2214461"/>
+          <a:ext cx="721467" cy="27992"/>
         </a:xfrm>
         <a:custGeom>
           <a:avLst/>
@@ -12554,10 +13066,10 @@
           <a:pathLst>
             <a:path>
               <a:moveTo>
-                <a:pt x="0" y="11489"/>
+                <a:pt x="0" y="13996"/>
               </a:moveTo>
               <a:lnTo>
-                <a:pt x="1067095" y="11489"/>
+                <a:pt x="721467" y="13996"/>
               </a:lnTo>
             </a:path>
           </a:pathLst>
@@ -12610,20 +13122,20 @@
           <a:endParaRPr lang="en-US" sz="1050" b="1" kern="1200"/>
         </a:p>
       </dsp:txBody>
-      <dsp:txXfrm>
-        <a:off x="5711724" y="2641185"/>
-        <a:ext cx="53354" cy="53354"/>
+      <dsp:txXfrm rot="10800000">
+        <a:off x="3767681" y="2210420"/>
+        <a:ext cx="36073" cy="36073"/>
       </dsp:txXfrm>
     </dsp:sp>
-    <dsp:sp modelId="{8726FD26-0446-4A34-A789-F609EFF6B576}">
+    <dsp:sp modelId="{01EEE674-D7A4-44BB-95E6-EEE4B45DB353}">
       <dsp:nvSpPr>
         <dsp:cNvPr id="0" name=""/>
         <dsp:cNvSpPr/>
       </dsp:nvSpPr>
       <dsp:spPr>
         <a:xfrm>
-          <a:off x="6254862" y="1881408"/>
-          <a:ext cx="1182304" cy="1182304"/>
+          <a:off x="2220496" y="834385"/>
+          <a:ext cx="1440302" cy="1440302"/>
         </a:xfrm>
         <a:prstGeom prst="ellipse">
           <a:avLst/>
@@ -12682,948 +13194,13 @@
           </a:pPr>
           <a:r>
             <a:rPr lang="en-US" sz="1100" b="1" kern="1200" dirty="0"/>
-            <a:t>3. Frequency Response </a:t>
+            <a:t>6. Spatial Resolution </a:t>
           </a:r>
         </a:p>
       </dsp:txBody>
       <dsp:txXfrm>
-        <a:off x="6428006" y="2054552"/>
-        <a:ext cx="836016" cy="836016"/>
-      </dsp:txXfrm>
-    </dsp:sp>
-    <dsp:sp modelId="{A4B0FFB8-DED8-4744-B603-55DEBAECB8CE}">
-      <dsp:nvSpPr>
-        <dsp:cNvPr id="0" name=""/>
-        <dsp:cNvSpPr/>
-      </dsp:nvSpPr>
-      <dsp:spPr>
-        <a:xfrm rot="1800000">
-          <a:off x="5071258" y="3414025"/>
-          <a:ext cx="1067095" cy="22978"/>
-        </a:xfrm>
-        <a:custGeom>
-          <a:avLst/>
-          <a:gdLst/>
-          <a:ahLst/>
-          <a:cxnLst/>
-          <a:rect l="0" t="0" r="0" b="0"/>
-          <a:pathLst>
-            <a:path>
-              <a:moveTo>
-                <a:pt x="0" y="11489"/>
-              </a:moveTo>
-              <a:lnTo>
-                <a:pt x="1067095" y="11489"/>
-              </a:lnTo>
-            </a:path>
-          </a:pathLst>
-        </a:custGeom>
-        <a:noFill/>
-        <a:ln w="19050" cap="flat" cmpd="sng" algn="ctr">
-          <a:solidFill>
-            <a:schemeClr val="accent5">
-              <a:hueOff val="0"/>
-              <a:satOff val="0"/>
-              <a:lumOff val="0"/>
-              <a:alphaOff val="0"/>
-            </a:schemeClr>
-          </a:solidFill>
-          <a:prstDash val="solid"/>
-          <a:miter lim="800000"/>
-        </a:ln>
-        <a:effectLst/>
-      </dsp:spPr>
-      <dsp:style>
-        <a:lnRef idx="2">
-          <a:scrgbClr r="0" g="0" b="0"/>
-        </a:lnRef>
-        <a:fillRef idx="0">
-          <a:scrgbClr r="0" g="0" b="0"/>
-        </a:fillRef>
-        <a:effectRef idx="0">
-          <a:scrgbClr r="0" g="0" b="0"/>
-        </a:effectRef>
-        <a:fontRef idx="minor"/>
-      </dsp:style>
-      <dsp:txBody>
-        <a:bodyPr spcFirstLastPara="0" vert="horz" wrap="square" lIns="12700" tIns="0" rIns="12700" bIns="0" numCol="1" spcCol="1270" anchor="ctr" anchorCtr="0">
-          <a:noAutofit/>
-        </a:bodyPr>
-        <a:lstStyle/>
-        <a:p>
-          <a:pPr marL="0" lvl="0" indent="0" algn="ctr" defTabSz="466725">
-            <a:lnSpc>
-              <a:spcPct val="90000"/>
-            </a:lnSpc>
-            <a:spcBef>
-              <a:spcPct val="0"/>
-            </a:spcBef>
-            <a:spcAft>
-              <a:spcPct val="35000"/>
-            </a:spcAft>
-            <a:buNone/>
-          </a:pPr>
-          <a:endParaRPr lang="en-US" sz="1050" b="1" kern="1200"/>
-        </a:p>
-      </dsp:txBody>
-      <dsp:txXfrm>
-        <a:off x="5578129" y="3398837"/>
-        <a:ext cx="53354" cy="53354"/>
-      </dsp:txXfrm>
-    </dsp:sp>
-    <dsp:sp modelId="{3BB251B9-BD13-489B-B206-0E76C451EF7E}">
-      <dsp:nvSpPr>
-        <dsp:cNvPr id="0" name=""/>
-        <dsp:cNvSpPr/>
-      </dsp:nvSpPr>
-      <dsp:spPr>
-        <a:xfrm>
-          <a:off x="5987673" y="3396712"/>
-          <a:ext cx="1182304" cy="1182304"/>
-        </a:xfrm>
-        <a:prstGeom prst="ellipse">
-          <a:avLst/>
-        </a:prstGeom>
-        <a:solidFill>
-          <a:schemeClr val="bg2">
-            <a:lumMod val="75000"/>
-          </a:schemeClr>
-        </a:solidFill>
-        <a:ln w="19050" cap="flat" cmpd="sng" algn="ctr">
-          <a:solidFill>
-            <a:schemeClr val="lt1">
-              <a:hueOff val="0"/>
-              <a:satOff val="0"/>
-              <a:lumOff val="0"/>
-              <a:alphaOff val="0"/>
-            </a:schemeClr>
-          </a:solidFill>
-          <a:prstDash val="solid"/>
-          <a:miter lim="800000"/>
-        </a:ln>
-        <a:effectLst/>
-      </dsp:spPr>
-      <dsp:style>
-        <a:lnRef idx="2">
-          <a:scrgbClr r="0" g="0" b="0"/>
-        </a:lnRef>
-        <a:fillRef idx="1">
-          <a:scrgbClr r="0" g="0" b="0"/>
-        </a:fillRef>
-        <a:effectRef idx="0">
-          <a:scrgbClr r="0" g="0" b="0"/>
-        </a:effectRef>
-        <a:fontRef idx="minor">
-          <a:schemeClr val="lt1"/>
-        </a:fontRef>
-      </dsp:style>
-      <dsp:txBody>
-        <a:bodyPr spcFirstLastPara="0" vert="horz" wrap="square" lIns="6985" tIns="6985" rIns="6985" bIns="6985" numCol="1" spcCol="1270" anchor="ctr" anchorCtr="0">
-          <a:noAutofit/>
-        </a:bodyPr>
-        <a:lstStyle/>
-        <a:p>
-          <a:pPr marL="0" lvl="0" indent="0" algn="ctr" defTabSz="488950">
-            <a:lnSpc>
-              <a:spcPct val="90000"/>
-            </a:lnSpc>
-            <a:spcBef>
-              <a:spcPct val="0"/>
-            </a:spcBef>
-            <a:spcAft>
-              <a:spcPct val="35000"/>
-            </a:spcAft>
-            <a:buFont typeface="+mj-lt"/>
-            <a:buNone/>
-          </a:pPr>
-          <a:r>
-            <a:rPr lang="en-US" sz="1100" b="1" kern="1200" dirty="0"/>
-            <a:t>4. Fidelity </a:t>
-          </a:r>
-        </a:p>
-      </dsp:txBody>
-      <dsp:txXfrm>
-        <a:off x="6160817" y="3569856"/>
-        <a:ext cx="836016" cy="836016"/>
-      </dsp:txXfrm>
-    </dsp:sp>
-    <dsp:sp modelId="{EFE45D1F-EFA7-4252-8882-7D528B4AA36B}">
-      <dsp:nvSpPr>
-        <dsp:cNvPr id="0" name=""/>
-        <dsp:cNvSpPr/>
-      </dsp:nvSpPr>
-      <dsp:spPr>
-        <a:xfrm rot="4200000">
-          <a:off x="4481910" y="3908548"/>
-          <a:ext cx="1067095" cy="22978"/>
-        </a:xfrm>
-        <a:custGeom>
-          <a:avLst/>
-          <a:gdLst/>
-          <a:ahLst/>
-          <a:cxnLst/>
-          <a:rect l="0" t="0" r="0" b="0"/>
-          <a:pathLst>
-            <a:path>
-              <a:moveTo>
-                <a:pt x="0" y="11489"/>
-              </a:moveTo>
-              <a:lnTo>
-                <a:pt x="1067095" y="11489"/>
-              </a:lnTo>
-            </a:path>
-          </a:pathLst>
-        </a:custGeom>
-        <a:noFill/>
-        <a:ln w="19050" cap="flat" cmpd="sng" algn="ctr">
-          <a:solidFill>
-            <a:schemeClr val="accent5">
-              <a:hueOff val="0"/>
-              <a:satOff val="0"/>
-              <a:lumOff val="0"/>
-              <a:alphaOff val="0"/>
-            </a:schemeClr>
-          </a:solidFill>
-          <a:prstDash val="solid"/>
-          <a:miter lim="800000"/>
-        </a:ln>
-        <a:effectLst/>
-      </dsp:spPr>
-      <dsp:style>
-        <a:lnRef idx="2">
-          <a:scrgbClr r="0" g="0" b="0"/>
-        </a:lnRef>
-        <a:fillRef idx="0">
-          <a:scrgbClr r="0" g="0" b="0"/>
-        </a:fillRef>
-        <a:effectRef idx="0">
-          <a:scrgbClr r="0" g="0" b="0"/>
-        </a:effectRef>
-        <a:fontRef idx="minor"/>
-      </dsp:style>
-      <dsp:txBody>
-        <a:bodyPr spcFirstLastPara="0" vert="horz" wrap="square" lIns="12700" tIns="0" rIns="12700" bIns="0" numCol="1" spcCol="1270" anchor="ctr" anchorCtr="0">
-          <a:noAutofit/>
-        </a:bodyPr>
-        <a:lstStyle/>
-        <a:p>
-          <a:pPr marL="0" lvl="0" indent="0" algn="ctr" defTabSz="466725">
-            <a:lnSpc>
-              <a:spcPct val="90000"/>
-            </a:lnSpc>
-            <a:spcBef>
-              <a:spcPct val="0"/>
-            </a:spcBef>
-            <a:spcAft>
-              <a:spcPct val="35000"/>
-            </a:spcAft>
-            <a:buNone/>
-          </a:pPr>
-          <a:endParaRPr lang="en-US" sz="1050" b="1" kern="1200"/>
-        </a:p>
-      </dsp:txBody>
-      <dsp:txXfrm>
-        <a:off x="4988780" y="3893359"/>
-        <a:ext cx="53354" cy="53354"/>
-      </dsp:txXfrm>
-    </dsp:sp>
-    <dsp:sp modelId="{D689BA3C-8DC9-4360-A404-B76D4C638032}">
-      <dsp:nvSpPr>
-        <dsp:cNvPr id="0" name=""/>
-        <dsp:cNvSpPr/>
-      </dsp:nvSpPr>
-      <dsp:spPr>
-        <a:xfrm>
-          <a:off x="4808976" y="4385757"/>
-          <a:ext cx="1182304" cy="1182304"/>
-        </a:xfrm>
-        <a:prstGeom prst="ellipse">
-          <a:avLst/>
-        </a:prstGeom>
-        <a:solidFill>
-          <a:schemeClr val="bg2">
-            <a:lumMod val="75000"/>
-          </a:schemeClr>
-        </a:solidFill>
-        <a:ln w="19050" cap="flat" cmpd="sng" algn="ctr">
-          <a:solidFill>
-            <a:schemeClr val="lt1">
-              <a:hueOff val="0"/>
-              <a:satOff val="0"/>
-              <a:lumOff val="0"/>
-              <a:alphaOff val="0"/>
-            </a:schemeClr>
-          </a:solidFill>
-          <a:prstDash val="solid"/>
-          <a:miter lim="800000"/>
-        </a:ln>
-        <a:effectLst/>
-      </dsp:spPr>
-      <dsp:style>
-        <a:lnRef idx="2">
-          <a:scrgbClr r="0" g="0" b="0"/>
-        </a:lnRef>
-        <a:fillRef idx="1">
-          <a:scrgbClr r="0" g="0" b="0"/>
-        </a:fillRef>
-        <a:effectRef idx="0">
-          <a:scrgbClr r="0" g="0" b="0"/>
-        </a:effectRef>
-        <a:fontRef idx="minor">
-          <a:schemeClr val="lt1"/>
-        </a:fontRef>
-      </dsp:style>
-      <dsp:txBody>
-        <a:bodyPr spcFirstLastPara="0" vert="horz" wrap="square" lIns="6985" tIns="6985" rIns="6985" bIns="6985" numCol="1" spcCol="1270" anchor="ctr" anchorCtr="0">
-          <a:noAutofit/>
-        </a:bodyPr>
-        <a:lstStyle/>
-        <a:p>
-          <a:pPr marL="0" lvl="0" indent="0" algn="ctr" defTabSz="488950">
-            <a:lnSpc>
-              <a:spcPct val="90000"/>
-            </a:lnSpc>
-            <a:spcBef>
-              <a:spcPct val="0"/>
-            </a:spcBef>
-            <a:spcAft>
-              <a:spcPct val="35000"/>
-            </a:spcAft>
-            <a:buFont typeface="+mj-lt"/>
-            <a:buNone/>
-          </a:pPr>
-          <a:r>
-            <a:rPr lang="en-US" sz="1100" b="1" kern="1200" dirty="0"/>
-            <a:t>5. Loss Budget</a:t>
-          </a:r>
-        </a:p>
-      </dsp:txBody>
-      <dsp:txXfrm>
-        <a:off x="4982120" y="4558901"/>
-        <a:ext cx="836016" cy="836016"/>
-      </dsp:txXfrm>
-    </dsp:sp>
-    <dsp:sp modelId="{0B890D38-9A63-42F6-B391-F93CB128C0AE}">
-      <dsp:nvSpPr>
-        <dsp:cNvPr id="0" name=""/>
-        <dsp:cNvSpPr/>
-      </dsp:nvSpPr>
-      <dsp:spPr>
-        <a:xfrm rot="6600000">
-          <a:off x="3712569" y="3908548"/>
-          <a:ext cx="1067095" cy="22978"/>
-        </a:xfrm>
-        <a:custGeom>
-          <a:avLst/>
-          <a:gdLst/>
-          <a:ahLst/>
-          <a:cxnLst/>
-          <a:rect l="0" t="0" r="0" b="0"/>
-          <a:pathLst>
-            <a:path>
-              <a:moveTo>
-                <a:pt x="0" y="11489"/>
-              </a:moveTo>
-              <a:lnTo>
-                <a:pt x="1067095" y="11489"/>
-              </a:lnTo>
-            </a:path>
-          </a:pathLst>
-        </a:custGeom>
-        <a:noFill/>
-        <a:ln w="19050" cap="flat" cmpd="sng" algn="ctr">
-          <a:solidFill>
-            <a:schemeClr val="accent5">
-              <a:hueOff val="0"/>
-              <a:satOff val="0"/>
-              <a:lumOff val="0"/>
-              <a:alphaOff val="0"/>
-            </a:schemeClr>
-          </a:solidFill>
-          <a:prstDash val="solid"/>
-          <a:miter lim="800000"/>
-        </a:ln>
-        <a:effectLst/>
-      </dsp:spPr>
-      <dsp:style>
-        <a:lnRef idx="2">
-          <a:scrgbClr r="0" g="0" b="0"/>
-        </a:lnRef>
-        <a:fillRef idx="0">
-          <a:scrgbClr r="0" g="0" b="0"/>
-        </a:fillRef>
-        <a:effectRef idx="0">
-          <a:scrgbClr r="0" g="0" b="0"/>
-        </a:effectRef>
-        <a:fontRef idx="minor"/>
-      </dsp:style>
-      <dsp:txBody>
-        <a:bodyPr spcFirstLastPara="0" vert="horz" wrap="square" lIns="12700" tIns="0" rIns="12700" bIns="0" numCol="1" spcCol="1270" anchor="ctr" anchorCtr="0">
-          <a:noAutofit/>
-        </a:bodyPr>
-        <a:lstStyle/>
-        <a:p>
-          <a:pPr marL="0" lvl="0" indent="0" algn="ctr" defTabSz="466725">
-            <a:lnSpc>
-              <a:spcPct val="90000"/>
-            </a:lnSpc>
-            <a:spcBef>
-              <a:spcPct val="0"/>
-            </a:spcBef>
-            <a:spcAft>
-              <a:spcPct val="35000"/>
-            </a:spcAft>
-            <a:buNone/>
-          </a:pPr>
-          <a:endParaRPr lang="en-US" sz="1050" b="1" kern="1200"/>
-        </a:p>
-      </dsp:txBody>
-      <dsp:txXfrm rot="10800000">
-        <a:off x="4219440" y="3893359"/>
-        <a:ext cx="53354" cy="53354"/>
-      </dsp:txXfrm>
-    </dsp:sp>
-    <dsp:sp modelId="{01EEE674-D7A4-44BB-95E6-EEE4B45DB353}">
-      <dsp:nvSpPr>
-        <dsp:cNvPr id="0" name=""/>
-        <dsp:cNvSpPr/>
-      </dsp:nvSpPr>
-      <dsp:spPr>
-        <a:xfrm>
-          <a:off x="3270295" y="4385757"/>
-          <a:ext cx="1182304" cy="1182304"/>
-        </a:xfrm>
-        <a:prstGeom prst="ellipse">
-          <a:avLst/>
-        </a:prstGeom>
-        <a:solidFill>
-          <a:schemeClr val="bg2">
-            <a:lumMod val="75000"/>
-          </a:schemeClr>
-        </a:solidFill>
-        <a:ln w="19050" cap="flat" cmpd="sng" algn="ctr">
-          <a:solidFill>
-            <a:schemeClr val="lt1">
-              <a:hueOff val="0"/>
-              <a:satOff val="0"/>
-              <a:lumOff val="0"/>
-              <a:alphaOff val="0"/>
-            </a:schemeClr>
-          </a:solidFill>
-          <a:prstDash val="solid"/>
-          <a:miter lim="800000"/>
-        </a:ln>
-        <a:effectLst/>
-      </dsp:spPr>
-      <dsp:style>
-        <a:lnRef idx="2">
-          <a:scrgbClr r="0" g="0" b="0"/>
-        </a:lnRef>
-        <a:fillRef idx="1">
-          <a:scrgbClr r="0" g="0" b="0"/>
-        </a:fillRef>
-        <a:effectRef idx="0">
-          <a:scrgbClr r="0" g="0" b="0"/>
-        </a:effectRef>
-        <a:fontRef idx="minor">
-          <a:schemeClr val="lt1"/>
-        </a:fontRef>
-      </dsp:style>
-      <dsp:txBody>
-        <a:bodyPr spcFirstLastPara="0" vert="horz" wrap="square" lIns="6985" tIns="6985" rIns="6985" bIns="6985" numCol="1" spcCol="1270" anchor="ctr" anchorCtr="0">
-          <a:noAutofit/>
-        </a:bodyPr>
-        <a:lstStyle/>
-        <a:p>
-          <a:pPr marL="0" lvl="0" indent="0" algn="ctr" defTabSz="488950">
-            <a:lnSpc>
-              <a:spcPct val="90000"/>
-            </a:lnSpc>
-            <a:spcBef>
-              <a:spcPct val="0"/>
-            </a:spcBef>
-            <a:spcAft>
-              <a:spcPct val="35000"/>
-            </a:spcAft>
-            <a:buFont typeface="+mj-lt"/>
-            <a:buNone/>
-          </a:pPr>
-          <a:r>
-            <a:rPr lang="en-US" sz="1100" b="1" kern="1200" dirty="0"/>
-            <a:t>6. Spatial Resolution </a:t>
-          </a:r>
-        </a:p>
-      </dsp:txBody>
-      <dsp:txXfrm>
-        <a:off x="3443439" y="4558901"/>
-        <a:ext cx="836016" cy="836016"/>
-      </dsp:txXfrm>
-    </dsp:sp>
-    <dsp:sp modelId="{77D3530B-84AC-4AF5-9D4D-0D2117A63E3D}">
-      <dsp:nvSpPr>
-        <dsp:cNvPr id="0" name=""/>
-        <dsp:cNvSpPr/>
-      </dsp:nvSpPr>
-      <dsp:spPr>
-        <a:xfrm rot="9000000">
-          <a:off x="3123221" y="3414025"/>
-          <a:ext cx="1067095" cy="22978"/>
-        </a:xfrm>
-        <a:custGeom>
-          <a:avLst/>
-          <a:gdLst/>
-          <a:ahLst/>
-          <a:cxnLst/>
-          <a:rect l="0" t="0" r="0" b="0"/>
-          <a:pathLst>
-            <a:path>
-              <a:moveTo>
-                <a:pt x="0" y="11489"/>
-              </a:moveTo>
-              <a:lnTo>
-                <a:pt x="1067095" y="11489"/>
-              </a:lnTo>
-            </a:path>
-          </a:pathLst>
-        </a:custGeom>
-        <a:noFill/>
-        <a:ln w="19050" cap="flat" cmpd="sng" algn="ctr">
-          <a:solidFill>
-            <a:schemeClr val="accent5">
-              <a:hueOff val="0"/>
-              <a:satOff val="0"/>
-              <a:lumOff val="0"/>
-              <a:alphaOff val="0"/>
-            </a:schemeClr>
-          </a:solidFill>
-          <a:prstDash val="solid"/>
-          <a:miter lim="800000"/>
-        </a:ln>
-        <a:effectLst/>
-      </dsp:spPr>
-      <dsp:style>
-        <a:lnRef idx="2">
-          <a:scrgbClr r="0" g="0" b="0"/>
-        </a:lnRef>
-        <a:fillRef idx="0">
-          <a:scrgbClr r="0" g="0" b="0"/>
-        </a:fillRef>
-        <a:effectRef idx="0">
-          <a:scrgbClr r="0" g="0" b="0"/>
-        </a:effectRef>
-        <a:fontRef idx="minor"/>
-      </dsp:style>
-      <dsp:txBody>
-        <a:bodyPr spcFirstLastPara="0" vert="horz" wrap="square" lIns="12700" tIns="0" rIns="12700" bIns="0" numCol="1" spcCol="1270" anchor="ctr" anchorCtr="0">
-          <a:noAutofit/>
-        </a:bodyPr>
-        <a:lstStyle/>
-        <a:p>
-          <a:pPr marL="0" lvl="0" indent="0" algn="ctr" defTabSz="466725">
-            <a:lnSpc>
-              <a:spcPct val="90000"/>
-            </a:lnSpc>
-            <a:spcBef>
-              <a:spcPct val="0"/>
-            </a:spcBef>
-            <a:spcAft>
-              <a:spcPct val="35000"/>
-            </a:spcAft>
-            <a:buNone/>
-          </a:pPr>
-          <a:endParaRPr lang="en-US" sz="1050" b="1" kern="1200"/>
-        </a:p>
-      </dsp:txBody>
-      <dsp:txXfrm rot="10800000">
-        <a:off x="3630091" y="3398837"/>
-        <a:ext cx="53354" cy="53354"/>
-      </dsp:txXfrm>
-    </dsp:sp>
-    <dsp:sp modelId="{601EE436-9078-4764-A58D-03556FC85C0E}">
-      <dsp:nvSpPr>
-        <dsp:cNvPr id="0" name=""/>
-        <dsp:cNvSpPr/>
-      </dsp:nvSpPr>
-      <dsp:spPr>
-        <a:xfrm>
-          <a:off x="2091597" y="3396712"/>
-          <a:ext cx="1182304" cy="1182304"/>
-        </a:xfrm>
-        <a:prstGeom prst="ellipse">
-          <a:avLst/>
-        </a:prstGeom>
-        <a:solidFill>
-          <a:schemeClr val="bg2">
-            <a:lumMod val="75000"/>
-          </a:schemeClr>
-        </a:solidFill>
-        <a:ln w="19050" cap="flat" cmpd="sng" algn="ctr">
-          <a:solidFill>
-            <a:schemeClr val="lt1">
-              <a:hueOff val="0"/>
-              <a:satOff val="0"/>
-              <a:lumOff val="0"/>
-              <a:alphaOff val="0"/>
-            </a:schemeClr>
-          </a:solidFill>
-          <a:prstDash val="solid"/>
-          <a:miter lim="800000"/>
-        </a:ln>
-        <a:effectLst/>
-      </dsp:spPr>
-      <dsp:style>
-        <a:lnRef idx="2">
-          <a:scrgbClr r="0" g="0" b="0"/>
-        </a:lnRef>
-        <a:fillRef idx="1">
-          <a:scrgbClr r="0" g="0" b="0"/>
-        </a:fillRef>
-        <a:effectRef idx="0">
-          <a:scrgbClr r="0" g="0" b="0"/>
-        </a:effectRef>
-        <a:fontRef idx="minor">
-          <a:schemeClr val="lt1"/>
-        </a:fontRef>
-      </dsp:style>
-      <dsp:txBody>
-        <a:bodyPr spcFirstLastPara="0" vert="horz" wrap="square" lIns="6985" tIns="6985" rIns="6985" bIns="6985" numCol="1" spcCol="1270" anchor="ctr" anchorCtr="0">
-          <a:noAutofit/>
-        </a:bodyPr>
-        <a:lstStyle/>
-        <a:p>
-          <a:pPr marL="0" lvl="0" indent="0" algn="ctr" defTabSz="488950">
-            <a:lnSpc>
-              <a:spcPct val="90000"/>
-            </a:lnSpc>
-            <a:spcBef>
-              <a:spcPct val="0"/>
-            </a:spcBef>
-            <a:spcAft>
-              <a:spcPct val="35000"/>
-            </a:spcAft>
-            <a:buFont typeface="+mj-lt"/>
-            <a:buNone/>
-          </a:pPr>
-          <a:r>
-            <a:rPr lang="en-US" sz="1100" b="1" kern="1200" dirty="0"/>
-            <a:t>7. Cross Talk </a:t>
-          </a:r>
-        </a:p>
-      </dsp:txBody>
-      <dsp:txXfrm>
-        <a:off x="2264741" y="3569856"/>
-        <a:ext cx="836016" cy="836016"/>
-      </dsp:txXfrm>
-    </dsp:sp>
-    <dsp:sp modelId="{A65C0F46-E587-4092-997F-FB96F0CDF18F}">
-      <dsp:nvSpPr>
-        <dsp:cNvPr id="0" name=""/>
-        <dsp:cNvSpPr/>
-      </dsp:nvSpPr>
-      <dsp:spPr>
-        <a:xfrm rot="11400000">
-          <a:off x="2989626" y="2656373"/>
-          <a:ext cx="1067095" cy="22978"/>
-        </a:xfrm>
-        <a:custGeom>
-          <a:avLst/>
-          <a:gdLst/>
-          <a:ahLst/>
-          <a:cxnLst/>
-          <a:rect l="0" t="0" r="0" b="0"/>
-          <a:pathLst>
-            <a:path>
-              <a:moveTo>
-                <a:pt x="0" y="11489"/>
-              </a:moveTo>
-              <a:lnTo>
-                <a:pt x="1067095" y="11489"/>
-              </a:lnTo>
-            </a:path>
-          </a:pathLst>
-        </a:custGeom>
-        <a:noFill/>
-        <a:ln w="19050" cap="flat" cmpd="sng" algn="ctr">
-          <a:solidFill>
-            <a:schemeClr val="accent5">
-              <a:hueOff val="0"/>
-              <a:satOff val="0"/>
-              <a:lumOff val="0"/>
-              <a:alphaOff val="0"/>
-            </a:schemeClr>
-          </a:solidFill>
-          <a:prstDash val="solid"/>
-          <a:miter lim="800000"/>
-        </a:ln>
-        <a:effectLst/>
-      </dsp:spPr>
-      <dsp:style>
-        <a:lnRef idx="2">
-          <a:scrgbClr r="0" g="0" b="0"/>
-        </a:lnRef>
-        <a:fillRef idx="0">
-          <a:scrgbClr r="0" g="0" b="0"/>
-        </a:fillRef>
-        <a:effectRef idx="0">
-          <a:scrgbClr r="0" g="0" b="0"/>
-        </a:effectRef>
-        <a:fontRef idx="minor"/>
-      </dsp:style>
-      <dsp:txBody>
-        <a:bodyPr spcFirstLastPara="0" vert="horz" wrap="square" lIns="12700" tIns="0" rIns="12700" bIns="0" numCol="1" spcCol="1270" anchor="ctr" anchorCtr="0">
-          <a:noAutofit/>
-        </a:bodyPr>
-        <a:lstStyle/>
-        <a:p>
-          <a:pPr marL="0" lvl="0" indent="0" algn="ctr" defTabSz="466725">
-            <a:lnSpc>
-              <a:spcPct val="90000"/>
-            </a:lnSpc>
-            <a:spcBef>
-              <a:spcPct val="0"/>
-            </a:spcBef>
-            <a:spcAft>
-              <a:spcPct val="35000"/>
-            </a:spcAft>
-            <a:buNone/>
-          </a:pPr>
-          <a:endParaRPr lang="en-US" sz="1050" b="1" kern="1200"/>
-        </a:p>
-      </dsp:txBody>
-      <dsp:txXfrm rot="10800000">
-        <a:off x="3496497" y="2641185"/>
-        <a:ext cx="53354" cy="53354"/>
-      </dsp:txXfrm>
-    </dsp:sp>
-    <dsp:sp modelId="{1198E2ED-5E7F-476B-8AA1-8FAE860229B8}">
-      <dsp:nvSpPr>
-        <dsp:cNvPr id="0" name=""/>
-        <dsp:cNvSpPr/>
-      </dsp:nvSpPr>
-      <dsp:spPr>
-        <a:xfrm>
-          <a:off x="1824408" y="1881408"/>
-          <a:ext cx="1182304" cy="1182304"/>
-        </a:xfrm>
-        <a:prstGeom prst="ellipse">
-          <a:avLst/>
-        </a:prstGeom>
-        <a:solidFill>
-          <a:schemeClr val="bg2">
-            <a:lumMod val="75000"/>
-          </a:schemeClr>
-        </a:solidFill>
-        <a:ln w="19050" cap="flat" cmpd="sng" algn="ctr">
-          <a:solidFill>
-            <a:schemeClr val="lt1">
-              <a:hueOff val="0"/>
-              <a:satOff val="0"/>
-              <a:lumOff val="0"/>
-              <a:alphaOff val="0"/>
-            </a:schemeClr>
-          </a:solidFill>
-          <a:prstDash val="solid"/>
-          <a:miter lim="800000"/>
-        </a:ln>
-        <a:effectLst/>
-      </dsp:spPr>
-      <dsp:style>
-        <a:lnRef idx="2">
-          <a:scrgbClr r="0" g="0" b="0"/>
-        </a:lnRef>
-        <a:fillRef idx="1">
-          <a:scrgbClr r="0" g="0" b="0"/>
-        </a:fillRef>
-        <a:effectRef idx="0">
-          <a:scrgbClr r="0" g="0" b="0"/>
-        </a:effectRef>
-        <a:fontRef idx="minor">
-          <a:schemeClr val="lt1"/>
-        </a:fontRef>
-      </dsp:style>
-      <dsp:txBody>
-        <a:bodyPr spcFirstLastPara="0" vert="horz" wrap="square" lIns="6985" tIns="6985" rIns="6985" bIns="6985" numCol="1" spcCol="1270" anchor="ctr" anchorCtr="0">
-          <a:noAutofit/>
-        </a:bodyPr>
-        <a:lstStyle/>
-        <a:p>
-          <a:pPr marL="0" lvl="0" indent="0" algn="ctr" defTabSz="488950">
-            <a:lnSpc>
-              <a:spcPct val="90000"/>
-            </a:lnSpc>
-            <a:spcBef>
-              <a:spcPct val="0"/>
-            </a:spcBef>
-            <a:spcAft>
-              <a:spcPct val="35000"/>
-            </a:spcAft>
-            <a:buFont typeface="+mj-lt"/>
-            <a:buNone/>
-          </a:pPr>
-          <a:r>
-            <a:rPr lang="en-US" sz="1100" b="1" kern="1200" dirty="0"/>
-            <a:t>8. LF DAS</a:t>
-          </a:r>
-        </a:p>
-      </dsp:txBody>
-      <dsp:txXfrm>
-        <a:off x="1997552" y="2054552"/>
-        <a:ext cx="836016" cy="836016"/>
-      </dsp:txXfrm>
-    </dsp:sp>
-    <dsp:sp modelId="{DA526968-C5FA-41DD-A5CF-2F61D26924D2}">
-      <dsp:nvSpPr>
-        <dsp:cNvPr id="0" name=""/>
-        <dsp:cNvSpPr/>
-      </dsp:nvSpPr>
-      <dsp:spPr>
-        <a:xfrm rot="13800000">
-          <a:off x="3374296" y="1990105"/>
-          <a:ext cx="1067095" cy="22978"/>
-        </a:xfrm>
-        <a:custGeom>
-          <a:avLst/>
-          <a:gdLst/>
-          <a:ahLst/>
-          <a:cxnLst/>
-          <a:rect l="0" t="0" r="0" b="0"/>
-          <a:pathLst>
-            <a:path>
-              <a:moveTo>
-                <a:pt x="0" y="11489"/>
-              </a:moveTo>
-              <a:lnTo>
-                <a:pt x="1067095" y="11489"/>
-              </a:lnTo>
-            </a:path>
-          </a:pathLst>
-        </a:custGeom>
-        <a:noFill/>
-        <a:ln w="19050" cap="flat" cmpd="sng" algn="ctr">
-          <a:solidFill>
-            <a:schemeClr val="accent5">
-              <a:hueOff val="0"/>
-              <a:satOff val="0"/>
-              <a:lumOff val="0"/>
-              <a:alphaOff val="0"/>
-            </a:schemeClr>
-          </a:solidFill>
-          <a:prstDash val="solid"/>
-          <a:miter lim="800000"/>
-        </a:ln>
-        <a:effectLst/>
-      </dsp:spPr>
-      <dsp:style>
-        <a:lnRef idx="2">
-          <a:scrgbClr r="0" g="0" b="0"/>
-        </a:lnRef>
-        <a:fillRef idx="0">
-          <a:scrgbClr r="0" g="0" b="0"/>
-        </a:fillRef>
-        <a:effectRef idx="0">
-          <a:scrgbClr r="0" g="0" b="0"/>
-        </a:effectRef>
-        <a:fontRef idx="minor"/>
-      </dsp:style>
-      <dsp:txBody>
-        <a:bodyPr spcFirstLastPara="0" vert="horz" wrap="square" lIns="12700" tIns="0" rIns="12700" bIns="0" numCol="1" spcCol="1270" anchor="ctr" anchorCtr="0">
-          <a:noAutofit/>
-        </a:bodyPr>
-        <a:lstStyle/>
-        <a:p>
-          <a:pPr marL="0" lvl="0" indent="0" algn="ctr" defTabSz="400050">
-            <a:lnSpc>
-              <a:spcPct val="90000"/>
-            </a:lnSpc>
-            <a:spcBef>
-              <a:spcPct val="0"/>
-            </a:spcBef>
-            <a:spcAft>
-              <a:spcPct val="35000"/>
-            </a:spcAft>
-            <a:buNone/>
-          </a:pPr>
-          <a:endParaRPr lang="en-US" sz="900" b="1" kern="1200"/>
-        </a:p>
-      </dsp:txBody>
-      <dsp:txXfrm rot="10800000">
-        <a:off x="3881167" y="1974916"/>
-        <a:ext cx="53354" cy="53354"/>
-      </dsp:txXfrm>
-    </dsp:sp>
-    <dsp:sp modelId="{6D54B3D7-B1BB-468C-B139-A330C534B0A9}">
-      <dsp:nvSpPr>
-        <dsp:cNvPr id="0" name=""/>
-        <dsp:cNvSpPr/>
-      </dsp:nvSpPr>
-      <dsp:spPr>
-        <a:xfrm>
-          <a:off x="2593749" y="548871"/>
-          <a:ext cx="1182304" cy="1182304"/>
-        </a:xfrm>
-        <a:prstGeom prst="ellipse">
-          <a:avLst/>
-        </a:prstGeom>
-        <a:solidFill>
-          <a:schemeClr val="bg2">
-            <a:lumMod val="75000"/>
-          </a:schemeClr>
-        </a:solidFill>
-        <a:ln w="19050" cap="flat" cmpd="sng" algn="ctr">
-          <a:solidFill>
-            <a:schemeClr val="lt1">
-              <a:hueOff val="0"/>
-              <a:satOff val="0"/>
-              <a:lumOff val="0"/>
-              <a:alphaOff val="0"/>
-            </a:schemeClr>
-          </a:solidFill>
-          <a:prstDash val="solid"/>
-          <a:miter lim="800000"/>
-        </a:ln>
-        <a:effectLst/>
-      </dsp:spPr>
-      <dsp:style>
-        <a:lnRef idx="2">
-          <a:scrgbClr r="0" g="0" b="0"/>
-        </a:lnRef>
-        <a:fillRef idx="1">
-          <a:scrgbClr r="0" g="0" b="0"/>
-        </a:fillRef>
-        <a:effectRef idx="0">
-          <a:scrgbClr r="0" g="0" b="0"/>
-        </a:effectRef>
-        <a:fontRef idx="minor">
-          <a:schemeClr val="lt1"/>
-        </a:fontRef>
-      </dsp:style>
-      <dsp:txBody>
-        <a:bodyPr spcFirstLastPara="0" vert="horz" wrap="square" lIns="6985" tIns="6985" rIns="6985" bIns="6985" numCol="1" spcCol="1270" anchor="ctr" anchorCtr="0">
-          <a:noAutofit/>
-        </a:bodyPr>
-        <a:lstStyle/>
-        <a:p>
-          <a:pPr marL="0" lvl="0" indent="0" algn="ctr" defTabSz="488950">
-            <a:lnSpc>
-              <a:spcPct val="90000"/>
-            </a:lnSpc>
-            <a:spcBef>
-              <a:spcPct val="0"/>
-            </a:spcBef>
-            <a:spcAft>
-              <a:spcPct val="35000"/>
-            </a:spcAft>
-            <a:buNone/>
-          </a:pPr>
-          <a:r>
-            <a:rPr lang="en-US" sz="1100" b="1" kern="1200" dirty="0"/>
-            <a:t>…</a:t>
-          </a:r>
-        </a:p>
-      </dsp:txBody>
-      <dsp:txXfrm>
-        <a:off x="2766893" y="722015"/>
-        <a:ext cx="836016" cy="836016"/>
+        <a:off x="2431423" y="1045312"/>
+        <a:ext cx="1018448" cy="1018448"/>
       </dsp:txXfrm>
     </dsp:sp>
   </dsp:spTree>
@@ -20521,7 +20098,7 @@
           <a:p>
             <a:fld id="{64AF2E3A-0E65-479D-A5E3-03C6FE5A6CB0}" type="datetimeFigureOut">
               <a:rPr lang="en-US" smtClean="0"/>
-              <a:t>11/19/2025</a:t>
+              <a:t>1/11/2026</a:t>
             </a:fld>
             <a:endParaRPr lang="en-US"/>
           </a:p>
@@ -20719,7 +20296,7 @@
           <a:p>
             <a:fld id="{64AF2E3A-0E65-479D-A5E3-03C6FE5A6CB0}" type="datetimeFigureOut">
               <a:rPr lang="en-US" smtClean="0"/>
-              <a:t>11/19/2025</a:t>
+              <a:t>1/11/2026</a:t>
             </a:fld>
             <a:endParaRPr lang="en-US"/>
           </a:p>
@@ -20927,7 +20504,7 @@
           <a:p>
             <a:fld id="{64AF2E3A-0E65-479D-A5E3-03C6FE5A6CB0}" type="datetimeFigureOut">
               <a:rPr lang="en-US" smtClean="0"/>
-              <a:t>11/19/2025</a:t>
+              <a:t>1/11/2026</a:t>
             </a:fld>
             <a:endParaRPr lang="en-US"/>
           </a:p>
@@ -21125,7 +20702,7 @@
           <a:p>
             <a:fld id="{64AF2E3A-0E65-479D-A5E3-03C6FE5A6CB0}" type="datetimeFigureOut">
               <a:rPr lang="en-US" smtClean="0"/>
-              <a:t>11/19/2025</a:t>
+              <a:t>1/11/2026</a:t>
             </a:fld>
             <a:endParaRPr lang="en-US"/>
           </a:p>
@@ -21447,7 +21024,7 @@
           <a:p>
             <a:fld id="{64AF2E3A-0E65-479D-A5E3-03C6FE5A6CB0}" type="datetimeFigureOut">
               <a:rPr lang="en-US" smtClean="0"/>
-              <a:t>11/19/2025</a:t>
+              <a:t>1/11/2026</a:t>
             </a:fld>
             <a:endParaRPr lang="en-US"/>
           </a:p>
@@ -21712,7 +21289,7 @@
           <a:p>
             <a:fld id="{64AF2E3A-0E65-479D-A5E3-03C6FE5A6CB0}" type="datetimeFigureOut">
               <a:rPr lang="en-US" smtClean="0"/>
-              <a:t>11/19/2025</a:t>
+              <a:t>1/11/2026</a:t>
             </a:fld>
             <a:endParaRPr lang="en-US"/>
           </a:p>
@@ -22124,7 +21701,7 @@
           <a:p>
             <a:fld id="{64AF2E3A-0E65-479D-A5E3-03C6FE5A6CB0}" type="datetimeFigureOut">
               <a:rPr lang="en-US" smtClean="0"/>
-              <a:t>11/19/2025</a:t>
+              <a:t>1/11/2026</a:t>
             </a:fld>
             <a:endParaRPr lang="en-US"/>
           </a:p>
@@ -22265,7 +21842,7 @@
           <a:p>
             <a:fld id="{64AF2E3A-0E65-479D-A5E3-03C6FE5A6CB0}" type="datetimeFigureOut">
               <a:rPr lang="en-US" smtClean="0"/>
-              <a:t>11/19/2025</a:t>
+              <a:t>1/11/2026</a:t>
             </a:fld>
             <a:endParaRPr lang="en-US"/>
           </a:p>
@@ -22378,7 +21955,7 @@
           <a:p>
             <a:fld id="{64AF2E3A-0E65-479D-A5E3-03C6FE5A6CB0}" type="datetimeFigureOut">
               <a:rPr lang="en-US" smtClean="0"/>
-              <a:t>11/19/2025</a:t>
+              <a:t>1/11/2026</a:t>
             </a:fld>
             <a:endParaRPr lang="en-US"/>
           </a:p>
@@ -22689,7 +22266,7 @@
           <a:p>
             <a:fld id="{64AF2E3A-0E65-479D-A5E3-03C6FE5A6CB0}" type="datetimeFigureOut">
               <a:rPr lang="en-US" smtClean="0"/>
-              <a:t>11/19/2025</a:t>
+              <a:t>1/11/2026</a:t>
             </a:fld>
             <a:endParaRPr lang="en-US"/>
           </a:p>
@@ -22977,7 +22554,7 @@
           <a:p>
             <a:fld id="{64AF2E3A-0E65-479D-A5E3-03C6FE5A6CB0}" type="datetimeFigureOut">
               <a:rPr lang="en-US" smtClean="0"/>
-              <a:t>11/19/2025</a:t>
+              <a:t>1/11/2026</a:t>
             </a:fld>
             <a:endParaRPr lang="en-US"/>
           </a:p>
@@ -23218,7 +22795,7 @@
           <a:p>
             <a:fld id="{64AF2E3A-0E65-479D-A5E3-03C6FE5A6CB0}" type="datetimeFigureOut">
               <a:rPr lang="en-US" smtClean="0"/>
-              <a:t>11/19/2025</a:t>
+              <a:t>1/11/2026</a:t>
             </a:fld>
             <a:endParaRPr lang="en-US"/>
           </a:p>
@@ -25810,7 +25387,7 @@
           <p:nvPr>
             <p:extLst>
               <p:ext uri="{D42A27DB-BD31-4B8C-83A1-F6EECF244321}">
-                <p14:modId xmlns:p14="http://schemas.microsoft.com/office/powerpoint/2010/main" val="1892772076"/>
+                <p14:modId xmlns:p14="http://schemas.microsoft.com/office/powerpoint/2010/main" val="1587030261"/>
               </p:ext>
             </p:extLst>
           </p:nvPr>
@@ -25991,8 +25568,8 @@
           </a:stretch>
         </p:blipFill>
         <p:spPr bwMode="auto">
-          <a:xfrm rot="588672" flipH="1">
-            <a:off x="2247614" y="2929621"/>
+          <a:xfrm rot="18752489" flipH="1">
+            <a:off x="2131309" y="2961709"/>
             <a:ext cx="1322780" cy="1322780"/>
           </a:xfrm>
           <a:prstGeom prst="rect">
@@ -26008,6 +25585,36 @@
               </a14:hiddenFill>
             </a:ext>
           </a:extLst>
+        </p:spPr>
+      </p:pic>
+      <p:pic>
+        <p:nvPicPr>
+          <p:cNvPr id="5" name="Picture 4">
+            <a:extLst>
+              <a:ext uri="{FF2B5EF4-FFF2-40B4-BE49-F238E27FC236}">
+                <a16:creationId xmlns:a16="http://schemas.microsoft.com/office/drawing/2014/main" id="{4F541BD6-DD7D-990B-BC10-2FFD4339654B}"/>
+              </a:ext>
+            </a:extLst>
+          </p:cNvPr>
+          <p:cNvPicPr>
+            <a:picLocks noChangeAspect="1"/>
+          </p:cNvPicPr>
+          <p:nvPr/>
+        </p:nvPicPr>
+        <p:blipFill>
+          <a:blip r:embed="rId13"/>
+          <a:stretch>
+            <a:fillRect/>
+          </a:stretch>
+        </p:blipFill>
+        <p:spPr>
+          <a:xfrm>
+            <a:off x="5879433" y="5078430"/>
+            <a:ext cx="2438525" cy="914447"/>
+          </a:xfrm>
+          <a:prstGeom prst="rect">
+            <a:avLst/>
+          </a:prstGeom>
         </p:spPr>
       </p:pic>
     </p:spTree>

</xml_diff>